<commit_message>
Removed some slides, re-generated PDF.
</commit_message>
<xml_diff>
--- a/acm_imbalance_datasets.pptx
+++ b/acm_imbalance_datasets.pptx
@@ -5,35 +5,33 @@
     <p:sldMasterId id="2147483941" r:id="rId1"/>
   </p:sldMasterIdLst>
   <p:notesMasterIdLst>
-    <p:notesMasterId r:id="rId28"/>
+    <p:notesMasterId r:id="rId26"/>
   </p:notesMasterIdLst>
   <p:sldIdLst>
     <p:sldId id="256" r:id="rId2"/>
     <p:sldId id="265" r:id="rId3"/>
-    <p:sldId id="295" r:id="rId4"/>
-    <p:sldId id="296" r:id="rId5"/>
-    <p:sldId id="267" r:id="rId6"/>
-    <p:sldId id="272" r:id="rId7"/>
-    <p:sldId id="279" r:id="rId8"/>
-    <p:sldId id="273" r:id="rId9"/>
-    <p:sldId id="282" r:id="rId10"/>
-    <p:sldId id="293" r:id="rId11"/>
-    <p:sldId id="294" r:id="rId12"/>
-    <p:sldId id="297" r:id="rId13"/>
-    <p:sldId id="281" r:id="rId14"/>
-    <p:sldId id="289" r:id="rId15"/>
-    <p:sldId id="284" r:id="rId16"/>
-    <p:sldId id="269" r:id="rId17"/>
-    <p:sldId id="292" r:id="rId18"/>
-    <p:sldId id="276" r:id="rId19"/>
-    <p:sldId id="291" r:id="rId20"/>
-    <p:sldId id="278" r:id="rId21"/>
-    <p:sldId id="280" r:id="rId22"/>
-    <p:sldId id="288" r:id="rId23"/>
-    <p:sldId id="298" r:id="rId24"/>
-    <p:sldId id="271" r:id="rId25"/>
-    <p:sldId id="268" r:id="rId26"/>
-    <p:sldId id="266" r:id="rId27"/>
+    <p:sldId id="267" r:id="rId4"/>
+    <p:sldId id="272" r:id="rId5"/>
+    <p:sldId id="279" r:id="rId6"/>
+    <p:sldId id="273" r:id="rId7"/>
+    <p:sldId id="282" r:id="rId8"/>
+    <p:sldId id="293" r:id="rId9"/>
+    <p:sldId id="294" r:id="rId10"/>
+    <p:sldId id="297" r:id="rId11"/>
+    <p:sldId id="281" r:id="rId12"/>
+    <p:sldId id="289" r:id="rId13"/>
+    <p:sldId id="284" r:id="rId14"/>
+    <p:sldId id="269" r:id="rId15"/>
+    <p:sldId id="292" r:id="rId16"/>
+    <p:sldId id="276" r:id="rId17"/>
+    <p:sldId id="291" r:id="rId18"/>
+    <p:sldId id="278" r:id="rId19"/>
+    <p:sldId id="280" r:id="rId20"/>
+    <p:sldId id="288" r:id="rId21"/>
+    <p:sldId id="298" r:id="rId22"/>
+    <p:sldId id="271" r:id="rId23"/>
+    <p:sldId id="268" r:id="rId24"/>
+    <p:sldId id="266" r:id="rId25"/>
   </p:sldIdLst>
   <p:sldSz cx="12192000" cy="6858000"/>
   <p:notesSz cx="6858000" cy="9144000"/>
@@ -723,175 +721,7 @@
           <a:p>
             <a:fld id="{6A09C56D-3BE6-1241-8AF9-9E29CFCA43EE}" type="slidenum">
               <a:rPr lang="en-US" smtClean="0"/>
-              <a:t>3</a:t>
-            </a:fld>
-            <a:endParaRPr lang="en-US"/>
-          </a:p>
-        </p:txBody>
-      </p:sp>
-    </p:spTree>
-    <p:extLst>
-      <p:ext uri="{BB962C8B-B14F-4D97-AF65-F5344CB8AC3E}">
-        <p14:creationId xmlns:p14="http://schemas.microsoft.com/office/powerpoint/2010/main" val="214485797"/>
-      </p:ext>
-    </p:extLst>
-  </p:cSld>
-  <p:clrMapOvr>
-    <a:masterClrMapping/>
-  </p:clrMapOvr>
-</p:notes>
-</file>
-
-<file path=ppt/notesSlides/notesSlide4.xml><?xml version="1.0" encoding="utf-8"?>
-<p:notes xmlns:a="http://schemas.openxmlformats.org/drawingml/2006/main" xmlns:r="http://schemas.openxmlformats.org/officeDocument/2006/relationships" xmlns:p="http://schemas.openxmlformats.org/presentationml/2006/main">
-  <p:cSld>
-    <p:spTree>
-      <p:nvGrpSpPr>
-        <p:cNvPr id="1" name=""/>
-        <p:cNvGrpSpPr/>
-        <p:nvPr/>
-      </p:nvGrpSpPr>
-      <p:grpSpPr>
-        <a:xfrm>
-          <a:off x="0" y="0"/>
-          <a:ext cx="0" cy="0"/>
-          <a:chOff x="0" y="0"/>
-          <a:chExt cx="0" cy="0"/>
-        </a:xfrm>
-      </p:grpSpPr>
-      <p:sp>
-        <p:nvSpPr>
-          <p:cNvPr id="2" name="Slide Image Placeholder 1"/>
-          <p:cNvSpPr>
-            <a:spLocks noGrp="1" noRot="1" noChangeAspect="1"/>
-          </p:cNvSpPr>
-          <p:nvPr>
-            <p:ph type="sldImg"/>
-          </p:nvPr>
-        </p:nvSpPr>
-        <p:spPr/>
-      </p:sp>
-      <p:sp>
-        <p:nvSpPr>
-          <p:cNvPr id="3" name="Notes Placeholder 2"/>
-          <p:cNvSpPr>
-            <a:spLocks noGrp="1"/>
-          </p:cNvSpPr>
-          <p:nvPr>
-            <p:ph type="body" idx="1"/>
-          </p:nvPr>
-        </p:nvSpPr>
-        <p:spPr/>
-        <p:txBody>
-          <a:bodyPr/>
-          <a:lstStyle/>
-          <a:p>
-            <a:endParaRPr lang="en-US" dirty="0"/>
-          </a:p>
-        </p:txBody>
-      </p:sp>
-      <p:sp>
-        <p:nvSpPr>
-          <p:cNvPr id="4" name="Slide Number Placeholder 3"/>
-          <p:cNvSpPr>
-            <a:spLocks noGrp="1"/>
-          </p:cNvSpPr>
-          <p:nvPr>
-            <p:ph type="sldNum" sz="quarter" idx="10"/>
-          </p:nvPr>
-        </p:nvSpPr>
-        <p:spPr/>
-        <p:txBody>
-          <a:bodyPr/>
-          <a:lstStyle/>
-          <a:p>
-            <a:fld id="{6A09C56D-3BE6-1241-8AF9-9E29CFCA43EE}" type="slidenum">
-              <a:rPr lang="en-US" smtClean="0"/>
-              <a:t>4</a:t>
-            </a:fld>
-            <a:endParaRPr lang="en-US"/>
-          </a:p>
-        </p:txBody>
-      </p:sp>
-    </p:spTree>
-    <p:extLst>
-      <p:ext uri="{BB962C8B-B14F-4D97-AF65-F5344CB8AC3E}">
-        <p14:creationId xmlns:p14="http://schemas.microsoft.com/office/powerpoint/2010/main" val="1674437859"/>
-      </p:ext>
-    </p:extLst>
-  </p:cSld>
-  <p:clrMapOvr>
-    <a:masterClrMapping/>
-  </p:clrMapOvr>
-</p:notes>
-</file>
-
-<file path=ppt/notesSlides/notesSlide5.xml><?xml version="1.0" encoding="utf-8"?>
-<p:notes xmlns:a="http://schemas.openxmlformats.org/drawingml/2006/main" xmlns:r="http://schemas.openxmlformats.org/officeDocument/2006/relationships" xmlns:p="http://schemas.openxmlformats.org/presentationml/2006/main">
-  <p:cSld>
-    <p:spTree>
-      <p:nvGrpSpPr>
-        <p:cNvPr id="1" name=""/>
-        <p:cNvGrpSpPr/>
-        <p:nvPr/>
-      </p:nvGrpSpPr>
-      <p:grpSpPr>
-        <a:xfrm>
-          <a:off x="0" y="0"/>
-          <a:ext cx="0" cy="0"/>
-          <a:chOff x="0" y="0"/>
-          <a:chExt cx="0" cy="0"/>
-        </a:xfrm>
-      </p:grpSpPr>
-      <p:sp>
-        <p:nvSpPr>
-          <p:cNvPr id="2" name="Slide Image Placeholder 1"/>
-          <p:cNvSpPr>
-            <a:spLocks noGrp="1" noRot="1" noChangeAspect="1"/>
-          </p:cNvSpPr>
-          <p:nvPr>
-            <p:ph type="sldImg"/>
-          </p:nvPr>
-        </p:nvSpPr>
-        <p:spPr/>
-      </p:sp>
-      <p:sp>
-        <p:nvSpPr>
-          <p:cNvPr id="3" name="Notes Placeholder 2"/>
-          <p:cNvSpPr>
-            <a:spLocks noGrp="1"/>
-          </p:cNvSpPr>
-          <p:nvPr>
-            <p:ph type="body" idx="1"/>
-          </p:nvPr>
-        </p:nvSpPr>
-        <p:spPr/>
-        <p:txBody>
-          <a:bodyPr/>
-          <a:lstStyle/>
-          <a:p>
-            <a:endParaRPr lang="en-US" dirty="0"/>
-          </a:p>
-        </p:txBody>
-      </p:sp>
-      <p:sp>
-        <p:nvSpPr>
-          <p:cNvPr id="4" name="Slide Number Placeholder 3"/>
-          <p:cNvSpPr>
-            <a:spLocks noGrp="1"/>
-          </p:cNvSpPr>
-          <p:nvPr>
-            <p:ph type="sldNum" sz="quarter" idx="10"/>
-          </p:nvPr>
-        </p:nvSpPr>
-        <p:spPr/>
-        <p:txBody>
-          <a:bodyPr/>
-          <a:lstStyle/>
-          <a:p>
-            <a:fld id="{6A09C56D-3BE6-1241-8AF9-9E29CFCA43EE}" type="slidenum">
-              <a:rPr lang="en-US" smtClean="0"/>
-              <a:t>18</a:t>
+              <a:t>16</a:t>
             </a:fld>
             <a:endParaRPr lang="en-US"/>
           </a:p>
@@ -3819,40 +3649,66 @@
           <a:p>
             <a:r>
               <a:rPr lang="en-US" sz="3200" dirty="0" smtClean="0"/>
-              <a:t>Session 7: Imbalanced Learning</a:t>
-            </a:r>
-          </a:p>
-          <a:p>
-            <a:endParaRPr lang="en-US" sz="3200" dirty="0"/>
-          </a:p>
-          <a:p>
-            <a:r>
-              <a:rPr lang="en-US" sz="3200" dirty="0" smtClean="0">
-                <a:solidFill>
-                  <a:srgbClr val="FF0000"/>
-                </a:solidFill>
+              <a:t>Session 7: Imbalanced </a:t>
+            </a:r>
+            <a:r>
+              <a:rPr lang="en-US" sz="3200" dirty="0" smtClean="0"/>
+              <a:t>Learning</a:t>
+            </a:r>
+          </a:p>
+          <a:p>
+            <a:endParaRPr lang="en-US" sz="3200" dirty="0" smtClean="0"/>
+          </a:p>
+          <a:p>
+            <a:r>
+              <a:rPr lang="en-US" dirty="0">
+                <a:hlinkClick r:id="rId3"/>
               </a:rPr>
-              <a:t>Add instructions to clone the </a:t>
-            </a:r>
-            <a:r>
-              <a:rPr lang="en-US" sz="3200" dirty="0" err="1" smtClean="0">
-                <a:solidFill>
-                  <a:srgbClr val="FF0000"/>
-                </a:solidFill>
+              <a:t>https://</a:t>
+            </a:r>
+            <a:r>
+              <a:rPr lang="en-US" dirty="0" smtClean="0">
+                <a:hlinkClick r:id="rId3"/>
               </a:rPr>
-              <a:t>github</a:t>
-            </a:r>
-            <a:r>
-              <a:rPr lang="en-US" sz="3200" dirty="0" smtClean="0">
-                <a:solidFill>
-                  <a:srgbClr val="FF0000"/>
-                </a:solidFill>
-              </a:rPr>
-              <a:t> repo here ..</a:t>
-            </a:r>
-          </a:p>
-        </p:txBody>
-      </p:sp>
+              <a:t>github.com/timgasser/acm_imbalanced_learning</a:t>
+            </a:r>
+            <a:r>
+              <a:rPr lang="en-US" dirty="0" smtClean="0"/>
+              <a:t> </a:t>
+            </a:r>
+          </a:p>
+        </p:txBody>
+      </p:sp>
+      <p:pic>
+        <p:nvPicPr>
+          <p:cNvPr id="4" name="Picture 3"/>
+          <p:cNvPicPr>
+            <a:picLocks noChangeAspect="1"/>
+          </p:cNvPicPr>
+          <p:nvPr/>
+        </p:nvPicPr>
+        <p:blipFill>
+          <a:blip r:embed="rId4">
+            <a:extLst>
+              <a:ext uri="{28A0092B-C50C-407E-A947-70E740481C1C}">
+                <a14:useLocalDpi xmlns:a14="http://schemas.microsoft.com/office/drawing/2010/main" val="0"/>
+              </a:ext>
+            </a:extLst>
+          </a:blip>
+          <a:stretch>
+            <a:fillRect/>
+          </a:stretch>
+        </p:blipFill>
+        <p:spPr>
+          <a:xfrm>
+            <a:off x="1524000" y="5038601"/>
+            <a:ext cx="762000" cy="762000"/>
+          </a:xfrm>
+          <a:prstGeom prst="rect">
+            <a:avLst/>
+          </a:prstGeom>
+        </p:spPr>
+      </p:pic>
     </p:spTree>
     <p:extLst>
       <p:ext uri="{BB962C8B-B14F-4D97-AF65-F5344CB8AC3E}">
@@ -3907,7 +3763,7 @@
           <a:p>
             <a:r>
               <a:rPr lang="en-US" dirty="0" smtClean="0"/>
-              <a:t>Area under Roc Curve</a:t>
+              <a:t>Imbalanced learning techniques</a:t>
             </a:r>
             <a:endParaRPr lang="en-US" dirty="0"/>
           </a:p>
@@ -3915,109 +3771,27 @@
       </p:sp>
       <p:sp>
         <p:nvSpPr>
-          <p:cNvPr id="3" name="Content Placeholder 2"/>
-          <p:cNvSpPr>
-            <a:spLocks noGrp="1"/>
-          </p:cNvSpPr>
-          <p:nvPr>
-            <p:ph idx="1"/>
-          </p:nvPr>
-        </p:nvSpPr>
-        <p:spPr>
-          <a:xfrm>
-            <a:off x="838200" y="1447800"/>
-            <a:ext cx="6824795" cy="4724400"/>
-          </a:xfrm>
-        </p:spPr>
-        <p:txBody>
-          <a:bodyPr>
-            <a:normAutofit fontScale="92500" lnSpcReduction="10000"/>
-          </a:bodyPr>
-          <a:lstStyle/>
-          <a:p>
-            <a:r>
-              <a:rPr lang="en-US" dirty="0"/>
-              <a:t>The classification algorithm outputs a probability of the example being a positive case (between 0 and 1).</a:t>
-            </a:r>
-          </a:p>
-          <a:p>
-            <a:r>
-              <a:rPr lang="en-US" dirty="0" smtClean="0"/>
-              <a:t>This probability is converted into a positive/negative by applying a decision threshold.</a:t>
-            </a:r>
-          </a:p>
-          <a:p>
-            <a:r>
-              <a:rPr lang="en-US" dirty="0" smtClean="0"/>
-              <a:t>The ROC Curve shows how the FPR and TPR vary as this threshold is varied from 0 (top right) to 1 (bottom left).</a:t>
-            </a:r>
-          </a:p>
-          <a:p>
-            <a:r>
-              <a:rPr lang="en-US" dirty="0" smtClean="0"/>
-              <a:t>The area under the curve (AUC) is independent of the threshold, and shows how well the model is performing.</a:t>
-            </a:r>
-          </a:p>
-        </p:txBody>
-      </p:sp>
-      <p:pic>
-        <p:nvPicPr>
-          <p:cNvPr id="4" name="Picture 3"/>
-          <p:cNvPicPr>
-            <a:picLocks noChangeAspect="1"/>
-          </p:cNvPicPr>
-          <p:nvPr/>
-        </p:nvPicPr>
-        <p:blipFill>
-          <a:blip r:embed="rId2"/>
-          <a:stretch>
-            <a:fillRect/>
-          </a:stretch>
-        </p:blipFill>
-        <p:spPr>
-          <a:xfrm>
-            <a:off x="7545519" y="1295400"/>
-            <a:ext cx="4008490" cy="3694782"/>
-          </a:xfrm>
-          <a:prstGeom prst="rect">
-            <a:avLst/>
-          </a:prstGeom>
-        </p:spPr>
-      </p:pic>
-      <p:sp>
-        <p:nvSpPr>
-          <p:cNvPr id="7" name="TextBox 6"/>
-          <p:cNvSpPr txBox="1"/>
-          <p:nvPr/>
-        </p:nvSpPr>
-        <p:spPr>
-          <a:xfrm>
-            <a:off x="7955280" y="5152742"/>
-            <a:ext cx="3587843" cy="369332"/>
-          </a:xfrm>
-          <a:prstGeom prst="rect">
-            <a:avLst/>
-          </a:prstGeom>
-          <a:noFill/>
-        </p:spPr>
-        <p:txBody>
-          <a:bodyPr wrap="square" rtlCol="0">
-            <a:spAutoFit/>
-          </a:bodyPr>
-          <a:lstStyle/>
-          <a:p>
-            <a:r>
-              <a:rPr lang="en-US" i="1" dirty="0" smtClean="0"/>
-              <a:t>Image source[3]</a:t>
-            </a:r>
-            <a:endParaRPr lang="en-US" i="1" dirty="0"/>
+          <p:cNvPr id="3" name="Text Placeholder 2"/>
+          <p:cNvSpPr>
+            <a:spLocks noGrp="1"/>
+          </p:cNvSpPr>
+          <p:nvPr>
+            <p:ph type="body" idx="1"/>
+          </p:nvPr>
+        </p:nvSpPr>
+        <p:spPr/>
+        <p:txBody>
+          <a:bodyPr/>
+          <a:lstStyle/>
+          <a:p>
+            <a:endParaRPr lang="en-US"/>
           </a:p>
         </p:txBody>
       </p:sp>
     </p:spTree>
     <p:extLst>
       <p:ext uri="{BB962C8B-B14F-4D97-AF65-F5344CB8AC3E}">
-        <p14:creationId xmlns:p14="http://schemas.microsoft.com/office/powerpoint/2010/main" val="184925121"/>
+        <p14:creationId xmlns:p14="http://schemas.microsoft.com/office/powerpoint/2010/main" val="1253166985"/>
       </p:ext>
     </p:extLst>
   </p:cSld>
@@ -4068,7 +3842,7 @@
           <a:p>
             <a:r>
               <a:rPr lang="en-US" dirty="0" smtClean="0"/>
-              <a:t>ROC Curves and decision thresholds</a:t>
+              <a:t>Imbalanced learning techniques</a:t>
             </a:r>
             <a:endParaRPr lang="en-US" dirty="0"/>
           </a:p>
@@ -4084,12 +3858,7 @@
             <p:ph idx="1"/>
           </p:nvPr>
         </p:nvSpPr>
-        <p:spPr>
-          <a:xfrm>
-            <a:off x="838200" y="1447800"/>
-            <a:ext cx="6705600" cy="4486505"/>
-          </a:xfrm>
-        </p:spPr>
+        <p:spPr/>
         <p:txBody>
           <a:bodyPr>
             <a:normAutofit/>
@@ -4098,148 +3867,48 @@
           <a:p>
             <a:r>
               <a:rPr lang="en-US" dirty="0" smtClean="0"/>
-              <a:t>The decision threshold can be adjusted based on the relative costs of FPs and TPs.</a:t>
-            </a:r>
-          </a:p>
-          <a:p>
-            <a:r>
-              <a:rPr lang="en-US" dirty="0" smtClean="0"/>
-              <a:t>For example in cancer detection:</a:t>
+              <a:t>To get good predictive performance on imbalanced datasets, you can do the following</a:t>
             </a:r>
           </a:p>
           <a:p>
             <a:pPr lvl="1"/>
             <a:r>
               <a:rPr lang="en-US" dirty="0" smtClean="0"/>
-              <a:t>False Positive: The patient has a further un-necessary scan to confirm the incorrect diagnosis. </a:t>
+              <a:t>Data pre-processing. This modifies the dataset to reduce the imbalance before training the model.</a:t>
             </a:r>
           </a:p>
           <a:p>
             <a:pPr lvl="1"/>
             <a:r>
               <a:rPr lang="en-US" dirty="0" smtClean="0"/>
-              <a:t>True Positive: Cancer is correctly diagnosed.</a:t>
-            </a:r>
-          </a:p>
-          <a:p>
-            <a:r>
-              <a:rPr lang="en-US" dirty="0" smtClean="0"/>
-              <a:t>There is a good case for decreasing the threshold of the model.</a:t>
+              <a:t>Algorithm-specific. Depending on the algorithm used, weighting can be used to increase the penalty for </a:t>
+            </a:r>
+            <a:r>
+              <a:rPr lang="en-US" dirty="0" err="1" smtClean="0"/>
+              <a:t>mis</a:t>
+            </a:r>
+            <a:r>
+              <a:rPr lang="en-US" dirty="0" smtClean="0"/>
+              <a:t>-classifying a minority example.</a:t>
             </a:r>
           </a:p>
           <a:p>
             <a:pPr lvl="1"/>
             <a:r>
               <a:rPr lang="en-US" dirty="0" smtClean="0"/>
-              <a:t>This will increase the TPR, with a small increase in FPR.</a:t>
-            </a:r>
-          </a:p>
-        </p:txBody>
-      </p:sp>
-      <p:pic>
-        <p:nvPicPr>
-          <p:cNvPr id="6" name="Picture 5"/>
-          <p:cNvPicPr>
-            <a:picLocks noChangeAspect="1"/>
-          </p:cNvPicPr>
-          <p:nvPr/>
-        </p:nvPicPr>
-        <p:blipFill>
-          <a:blip r:embed="rId2"/>
-          <a:stretch>
-            <a:fillRect/>
-          </a:stretch>
-        </p:blipFill>
-        <p:spPr>
-          <a:xfrm>
-            <a:off x="7538357" y="1295400"/>
-            <a:ext cx="4008490" cy="3694782"/>
-          </a:xfrm>
-          <a:prstGeom prst="rect">
-            <a:avLst/>
-          </a:prstGeom>
-        </p:spPr>
-      </p:pic>
-      <p:sp>
-        <p:nvSpPr>
-          <p:cNvPr id="8" name="TextBox 7"/>
-          <p:cNvSpPr txBox="1"/>
-          <p:nvPr/>
-        </p:nvSpPr>
-        <p:spPr>
-          <a:xfrm>
-            <a:off x="7959004" y="5105400"/>
-            <a:ext cx="3587843" cy="369332"/>
-          </a:xfrm>
-          <a:prstGeom prst="rect">
-            <a:avLst/>
-          </a:prstGeom>
-          <a:noFill/>
-        </p:spPr>
-        <p:txBody>
-          <a:bodyPr wrap="square" rtlCol="0">
-            <a:spAutoFit/>
-          </a:bodyPr>
-          <a:lstStyle/>
-          <a:p>
-            <a:r>
-              <a:rPr lang="en-US" i="1" dirty="0" smtClean="0"/>
-              <a:t>Image source[3]</a:t>
-            </a:r>
-            <a:endParaRPr lang="en-US" i="1" dirty="0"/>
-          </a:p>
-        </p:txBody>
-      </p:sp>
-      <p:sp>
-        <p:nvSpPr>
-          <p:cNvPr id="5" name="Oval 4"/>
-          <p:cNvSpPr/>
-          <p:nvPr/>
-        </p:nvSpPr>
-        <p:spPr>
-          <a:xfrm>
-            <a:off x="8534400" y="1678942"/>
-            <a:ext cx="457200" cy="381000"/>
-          </a:xfrm>
-          <a:prstGeom prst="ellipse">
-            <a:avLst/>
-          </a:prstGeom>
-          <a:noFill/>
-          <a:ln w="57150">
-            <a:solidFill>
-              <a:schemeClr val="tx1"/>
-            </a:solidFill>
-          </a:ln>
-        </p:spPr>
-        <p:style>
-          <a:lnRef idx="2">
-            <a:schemeClr val="accent1">
-              <a:shade val="50000"/>
-            </a:schemeClr>
-          </a:lnRef>
-          <a:fillRef idx="1">
-            <a:schemeClr val="accent1"/>
-          </a:fillRef>
-          <a:effectRef idx="0">
-            <a:schemeClr val="accent1"/>
-          </a:effectRef>
-          <a:fontRef idx="minor">
-            <a:schemeClr val="lt1"/>
-          </a:fontRef>
-        </p:style>
-        <p:txBody>
-          <a:bodyPr rtlCol="0" anchor="ctr"/>
-          <a:lstStyle/>
-          <a:p>
-            <a:pPr algn="ctr"/>
-            <a:endParaRPr lang="en-US"/>
+              <a:t>Ensemble. By training multiple models and combining the results, performance can be increased over a single model. This is not just true for imbalanced datasets.</a:t>
+            </a:r>
+          </a:p>
+          <a:p>
+            <a:pPr lvl="1"/>
+            <a:endParaRPr lang="en-US" dirty="0" smtClean="0"/>
           </a:p>
         </p:txBody>
       </p:sp>
     </p:spTree>
     <p:extLst>
       <p:ext uri="{BB962C8B-B14F-4D97-AF65-F5344CB8AC3E}">
-        <p14:creationId xmlns:p14="http://schemas.microsoft.com/office/powerpoint/2010/main" val="868979994"/>
+        <p14:creationId xmlns:p14="http://schemas.microsoft.com/office/powerpoint/2010/main" val="299045113"/>
       </p:ext>
     </p:extLst>
   </p:cSld>
@@ -4290,7 +3959,7 @@
           <a:p>
             <a:r>
               <a:rPr lang="en-US" dirty="0" smtClean="0"/>
-              <a:t>Imbalanced learning techniques</a:t>
+              <a:t>Data pre-processing</a:t>
             </a:r>
             <a:endParaRPr lang="en-US" dirty="0"/>
           </a:p>
@@ -4318,7 +3987,7 @@
     </p:spTree>
     <p:extLst>
       <p:ext uri="{BB962C8B-B14F-4D97-AF65-F5344CB8AC3E}">
-        <p14:creationId xmlns:p14="http://schemas.microsoft.com/office/powerpoint/2010/main" val="1253166985"/>
+        <p14:creationId xmlns:p14="http://schemas.microsoft.com/office/powerpoint/2010/main" val="983648962"/>
       </p:ext>
     </p:extLst>
   </p:cSld>
@@ -4369,7 +4038,7 @@
           <a:p>
             <a:r>
               <a:rPr lang="en-US" dirty="0" smtClean="0"/>
-              <a:t>Imbalanced learning techniques</a:t>
+              <a:t>Data pre-processing</a:t>
             </a:r>
             <a:endParaRPr lang="en-US" dirty="0"/>
           </a:p>
@@ -4394,48 +4063,87 @@
           <a:p>
             <a:r>
               <a:rPr lang="en-US" dirty="0" smtClean="0"/>
-              <a:t>To get good predictive performance on imbalanced datasets, you can do the following</a:t>
+              <a:t>There are two options to generate a 50:50 balanced dataset from an imbalanced one</a:t>
             </a:r>
           </a:p>
           <a:p>
             <a:pPr lvl="1"/>
             <a:r>
               <a:rPr lang="en-US" dirty="0" smtClean="0"/>
-              <a:t>Data pre-processing. This modifies the dataset to reduce the imbalance before training the model.</a:t>
+              <a:t>Oversampling: Generate new minority class examples. </a:t>
             </a:r>
           </a:p>
           <a:p>
             <a:pPr lvl="1"/>
             <a:r>
-              <a:rPr lang="en-US" dirty="0" smtClean="0"/>
-              <a:t>Algorithm-specific. Depending on the algorithm used, weighting can be used to increase the penalty for </a:t>
-            </a:r>
-            <a:r>
               <a:rPr lang="en-US" dirty="0" err="1" smtClean="0"/>
-              <a:t>mis</a:t>
-            </a:r>
-            <a:r>
-              <a:rPr lang="en-US" dirty="0" smtClean="0"/>
-              <a:t>-classifying a minority example.</a:t>
+              <a:t>Undersampling</a:t>
+            </a:r>
+            <a:r>
+              <a:rPr lang="en-US" dirty="0" smtClean="0"/>
+              <a:t>: </a:t>
+            </a:r>
+            <a:r>
+              <a:rPr lang="en-US" dirty="0"/>
+              <a:t>Remove majority class </a:t>
+            </a:r>
+            <a:r>
+              <a:rPr lang="en-US" dirty="0" smtClean="0"/>
+              <a:t>examples.</a:t>
+            </a:r>
+          </a:p>
+          <a:p>
+            <a:r>
+              <a:rPr lang="en-US" dirty="0" smtClean="0"/>
+              <a:t>These can be done at random, but there are issues </a:t>
             </a:r>
           </a:p>
           <a:p>
             <a:pPr lvl="1"/>
             <a:r>
               <a:rPr lang="en-US" dirty="0" smtClean="0"/>
-              <a:t>Ensemble. By training multiple models and combining the results, performance can be increased over a single model. This is not just true for imbalanced datasets.</a:t>
+              <a:t>Random oversampling </a:t>
+            </a:r>
+            <a:r>
+              <a:rPr lang="en-US" dirty="0"/>
+              <a:t>gives issues with overfitting, as there will be many identical duplicated minority examples.</a:t>
             </a:r>
           </a:p>
           <a:p>
             <a:pPr lvl="1"/>
-            <a:endParaRPr lang="en-US" dirty="0" smtClean="0"/>
+            <a:r>
+              <a:rPr lang="en-US" dirty="0" smtClean="0"/>
+              <a:t>Random </a:t>
+            </a:r>
+            <a:r>
+              <a:rPr lang="en-US" dirty="0" err="1" smtClean="0"/>
+              <a:t>undersampling</a:t>
+            </a:r>
+            <a:r>
+              <a:rPr lang="en-US" dirty="0" smtClean="0"/>
+              <a:t> means you throw away good majority data.</a:t>
+            </a:r>
+          </a:p>
+          <a:p>
+            <a:r>
+              <a:rPr lang="en-US" dirty="0" smtClean="0"/>
+              <a:t>To improve on the performance of random under and oversampling, </a:t>
+            </a:r>
+            <a:r>
+              <a:rPr lang="en-US" dirty="0" err="1" smtClean="0"/>
+              <a:t>kNN</a:t>
+            </a:r>
+            <a:r>
+              <a:rPr lang="en-US" dirty="0" smtClean="0"/>
+              <a:t>-based methods selectively add or remove data.</a:t>
+            </a:r>
           </a:p>
         </p:txBody>
       </p:sp>
     </p:spTree>
     <p:extLst>
       <p:ext uri="{BB962C8B-B14F-4D97-AF65-F5344CB8AC3E}">
-        <p14:creationId xmlns:p14="http://schemas.microsoft.com/office/powerpoint/2010/main" val="299045113"/>
+        <p14:creationId xmlns:p14="http://schemas.microsoft.com/office/powerpoint/2010/main" val="601895022"/>
       </p:ext>
     </p:extLst>
   </p:cSld>
@@ -4486,7 +4194,7 @@
           <a:p>
             <a:r>
               <a:rPr lang="en-US" dirty="0" smtClean="0"/>
-              <a:t>Data pre-processing</a:t>
+              <a:t>Oversampling methods</a:t>
             </a:r>
             <a:endParaRPr lang="en-US" dirty="0"/>
           </a:p>
@@ -4494,12 +4202,12 @@
       </p:sp>
       <p:sp>
         <p:nvSpPr>
-          <p:cNvPr id="3" name="Text Placeholder 2"/>
-          <p:cNvSpPr>
-            <a:spLocks noGrp="1"/>
-          </p:cNvSpPr>
-          <p:nvPr>
-            <p:ph type="body" idx="1"/>
+          <p:cNvPr id="3" name="Content Placeholder 2"/>
+          <p:cNvSpPr>
+            <a:spLocks noGrp="1"/>
+          </p:cNvSpPr>
+          <p:nvPr>
+            <p:ph idx="1"/>
           </p:nvPr>
         </p:nvSpPr>
         <p:spPr/>
@@ -4507,14 +4215,121 @@
           <a:bodyPr/>
           <a:lstStyle/>
           <a:p>
-            <a:endParaRPr lang="en-US"/>
+            <a:r>
+              <a:rPr lang="en-US" dirty="0" smtClean="0"/>
+              <a:t>Synthetic Minority Oversampling Technique (SMOTE)</a:t>
+            </a:r>
+          </a:p>
+          <a:p>
+            <a:r>
+              <a:rPr lang="en-US" dirty="0" smtClean="0"/>
+              <a:t>For each minority example</a:t>
+            </a:r>
+          </a:p>
+          <a:p>
+            <a:pPr lvl="1"/>
+            <a:r>
+              <a:rPr lang="en-US" dirty="0" smtClean="0"/>
+              <a:t>Randomly chose one of the k nearest </a:t>
+            </a:r>
+            <a:r>
+              <a:rPr lang="en-US" dirty="0" err="1" smtClean="0"/>
+              <a:t>neighbours</a:t>
+            </a:r>
+            <a:r>
+              <a:rPr lang="en-US" dirty="0" smtClean="0"/>
+              <a:t> (majority or minority)</a:t>
+            </a:r>
+          </a:p>
+          <a:p>
+            <a:pPr lvl="1"/>
+            <a:r>
+              <a:rPr lang="en-US" dirty="0" smtClean="0"/>
+              <a:t>Create a new sample a random distance between the minority example and the nearest </a:t>
+            </a:r>
+            <a:r>
+              <a:rPr lang="en-US" dirty="0" err="1" smtClean="0"/>
+              <a:t>neighbour</a:t>
+            </a:r>
+            <a:r>
+              <a:rPr lang="en-US" dirty="0" smtClean="0"/>
+              <a:t>.</a:t>
+            </a:r>
+          </a:p>
+          <a:p>
+            <a:pPr lvl="1"/>
+            <a:r>
+              <a:rPr lang="en-US" dirty="0" smtClean="0"/>
+              <a:t>This allows the minority example class space to be expanded.</a:t>
+            </a:r>
+            <a:endParaRPr lang="en-US" dirty="0"/>
+          </a:p>
+          <a:p>
+            <a:pPr marL="0" indent="0">
+              <a:buNone/>
+            </a:pPr>
+            <a:endParaRPr lang="en-US" dirty="0"/>
+          </a:p>
+        </p:txBody>
+      </p:sp>
+      <p:pic>
+        <p:nvPicPr>
+          <p:cNvPr id="5" name="Picture 4"/>
+          <p:cNvPicPr>
+            <a:picLocks noChangeAspect="1"/>
+          </p:cNvPicPr>
+          <p:nvPr/>
+        </p:nvPicPr>
+        <p:blipFill>
+          <a:blip r:embed="rId2"/>
+          <a:stretch>
+            <a:fillRect/>
+          </a:stretch>
+        </p:blipFill>
+        <p:spPr>
+          <a:xfrm>
+            <a:off x="3381305" y="3908620"/>
+            <a:ext cx="5429390" cy="2268343"/>
+          </a:xfrm>
+          <a:prstGeom prst="rect">
+            <a:avLst/>
+          </a:prstGeom>
+        </p:spPr>
+      </p:pic>
+      <p:sp>
+        <p:nvSpPr>
+          <p:cNvPr id="6" name="TextBox 5"/>
+          <p:cNvSpPr txBox="1"/>
+          <p:nvPr/>
+        </p:nvSpPr>
+        <p:spPr>
+          <a:xfrm>
+            <a:off x="3381305" y="6176963"/>
+            <a:ext cx="5429390" cy="369332"/>
+          </a:xfrm>
+          <a:prstGeom prst="rect">
+            <a:avLst/>
+          </a:prstGeom>
+          <a:noFill/>
+        </p:spPr>
+        <p:txBody>
+          <a:bodyPr wrap="square" rtlCol="0">
+            <a:spAutoFit/>
+          </a:bodyPr>
+          <a:lstStyle/>
+          <a:p>
+            <a:r>
+              <a:rPr lang="en-US" i="1" dirty="0" smtClean="0"/>
+              <a:t>Image source[2]</a:t>
+            </a:r>
+            <a:endParaRPr lang="en-US" i="1" dirty="0"/>
           </a:p>
         </p:txBody>
       </p:sp>
     </p:spTree>
     <p:extLst>
       <p:ext uri="{BB962C8B-B14F-4D97-AF65-F5344CB8AC3E}">
-        <p14:creationId xmlns:p14="http://schemas.microsoft.com/office/powerpoint/2010/main" val="983648962"/>
+        <p14:creationId xmlns:p14="http://schemas.microsoft.com/office/powerpoint/2010/main" val="476306972"/>
       </p:ext>
     </p:extLst>
   </p:cSld>
@@ -4564,8 +4379,12 @@
           <a:lstStyle/>
           <a:p>
             <a:r>
-              <a:rPr lang="en-US" dirty="0" smtClean="0"/>
-              <a:t>Data pre-processing</a:t>
+              <a:rPr lang="en-US" dirty="0" err="1" smtClean="0"/>
+              <a:t>Undersampling</a:t>
+            </a:r>
+            <a:r>
+              <a:rPr lang="en-US" dirty="0" smtClean="0"/>
+              <a:t> methods</a:t>
             </a:r>
             <a:endParaRPr lang="en-US" dirty="0"/>
           </a:p>
@@ -4589,88 +4408,107 @@
           <a:lstStyle/>
           <a:p>
             <a:r>
-              <a:rPr lang="en-US" dirty="0" smtClean="0"/>
-              <a:t>There are two options to generate a 50:50 balanced dataset from an imbalanced one</a:t>
+              <a:rPr lang="en-US" dirty="0" err="1" smtClean="0"/>
+              <a:t>Tomek</a:t>
+            </a:r>
+            <a:r>
+              <a:rPr lang="en-US" dirty="0" smtClean="0"/>
+              <a:t> Links</a:t>
             </a:r>
           </a:p>
           <a:p>
             <a:pPr lvl="1"/>
             <a:r>
               <a:rPr lang="en-US" dirty="0" smtClean="0"/>
-              <a:t>Oversampling: Generate new minority class examples. </a:t>
+              <a:t>Find pairs of points that are different classes, they form a </a:t>
+            </a:r>
+            <a:r>
+              <a:rPr lang="en-US" dirty="0" err="1" smtClean="0"/>
+              <a:t>Tomek</a:t>
+            </a:r>
+            <a:r>
+              <a:rPr lang="en-US" dirty="0" smtClean="0"/>
+              <a:t> link if there is no closer example to either point.</a:t>
             </a:r>
           </a:p>
           <a:p>
             <a:pPr lvl="1"/>
             <a:r>
-              <a:rPr lang="en-US" dirty="0" err="1" smtClean="0"/>
-              <a:t>Undersampling</a:t>
-            </a:r>
-            <a:r>
-              <a:rPr lang="en-US" dirty="0" smtClean="0"/>
-              <a:t>: </a:t>
-            </a:r>
-            <a:r>
-              <a:rPr lang="en-US" dirty="0"/>
-              <a:t>Remove majority class </a:t>
-            </a:r>
-            <a:r>
-              <a:rPr lang="en-US" dirty="0" smtClean="0"/>
-              <a:t>examples.</a:t>
-            </a:r>
-          </a:p>
-          <a:p>
-            <a:r>
-              <a:rPr lang="en-US" dirty="0" smtClean="0"/>
-              <a:t>These can be done at random, but there are issues </a:t>
+              <a:rPr lang="en-US" dirty="0" smtClean="0"/>
+              <a:t>Remove majority example in the pair. </a:t>
             </a:r>
           </a:p>
           <a:p>
             <a:pPr lvl="1"/>
             <a:r>
               <a:rPr lang="en-US" dirty="0" smtClean="0"/>
-              <a:t>Random oversampling </a:t>
-            </a:r>
-            <a:r>
-              <a:rPr lang="en-US" dirty="0"/>
-              <a:t>gives issues with overfitting, as there will be many identical duplicated minority examples.</a:t>
+              <a:t>Effectively widens the decision boundary between majority and minority.</a:t>
             </a:r>
           </a:p>
           <a:p>
             <a:pPr lvl="1"/>
-            <a:r>
-              <a:rPr lang="en-US" dirty="0" smtClean="0"/>
-              <a:t>Random </a:t>
-            </a:r>
-            <a:r>
-              <a:rPr lang="en-US" dirty="0" err="1" smtClean="0"/>
-              <a:t>undersampling</a:t>
-            </a:r>
-            <a:r>
-              <a:rPr lang="en-US" dirty="0" smtClean="0"/>
-              <a:t> means you throw away good majority data.</a:t>
-            </a:r>
-          </a:p>
-          <a:p>
-            <a:r>
-              <a:rPr lang="en-US" dirty="0" smtClean="0"/>
-              <a:t>To improve on the performance of random under and oversampling, </a:t>
-            </a:r>
-            <a:r>
-              <a:rPr lang="en-US" dirty="0" err="1" smtClean="0"/>
-              <a:t>kNN</a:t>
-            </a:r>
-            <a:r>
-              <a:rPr lang="en-US" dirty="0" smtClean="0"/>
-              <a:t>-based methods selectively add or remove data.</a:t>
-            </a:r>
+            <a:endParaRPr lang="en-US" dirty="0" smtClean="0"/>
+          </a:p>
+        </p:txBody>
+      </p:sp>
+      <p:pic>
+        <p:nvPicPr>
+          <p:cNvPr id="4" name="Picture 3"/>
+          <p:cNvPicPr>
+            <a:picLocks noChangeAspect="1"/>
+          </p:cNvPicPr>
+          <p:nvPr/>
+        </p:nvPicPr>
+        <p:blipFill>
+          <a:blip r:embed="rId2"/>
+          <a:stretch>
+            <a:fillRect/>
+          </a:stretch>
+        </p:blipFill>
+        <p:spPr>
+          <a:xfrm>
+            <a:off x="3384804" y="3911008"/>
+            <a:ext cx="5422392" cy="2265955"/>
+          </a:xfrm>
+          <a:prstGeom prst="rect">
+            <a:avLst/>
+          </a:prstGeom>
+        </p:spPr>
+      </p:pic>
+      <p:sp>
+        <p:nvSpPr>
+          <p:cNvPr id="5" name="TextBox 4"/>
+          <p:cNvSpPr txBox="1"/>
+          <p:nvPr/>
+        </p:nvSpPr>
+        <p:spPr>
+          <a:xfrm>
+            <a:off x="3381305" y="6176963"/>
+            <a:ext cx="5429390" cy="369332"/>
+          </a:xfrm>
+          <a:prstGeom prst="rect">
+            <a:avLst/>
+          </a:prstGeom>
+          <a:noFill/>
+        </p:spPr>
+        <p:txBody>
+          <a:bodyPr wrap="square" rtlCol="0">
+            <a:spAutoFit/>
+          </a:bodyPr>
+          <a:lstStyle/>
+          <a:p>
+            <a:r>
+              <a:rPr lang="en-US" i="1" dirty="0" smtClean="0"/>
+              <a:t>Image source[2]</a:t>
+            </a:r>
+            <a:endParaRPr lang="en-US" i="1" dirty="0"/>
           </a:p>
         </p:txBody>
       </p:sp>
     </p:spTree>
     <p:extLst>
       <p:ext uri="{BB962C8B-B14F-4D97-AF65-F5344CB8AC3E}">
-        <p14:creationId xmlns:p14="http://schemas.microsoft.com/office/powerpoint/2010/main" val="601895022"/>
+        <p14:creationId xmlns:p14="http://schemas.microsoft.com/office/powerpoint/2010/main" val="1753687419"/>
       </p:ext>
     </p:extLst>
   </p:cSld>
@@ -4720,371 +4558,6 @@
           <a:lstStyle/>
           <a:p>
             <a:r>
-              <a:rPr lang="en-US" dirty="0" smtClean="0"/>
-              <a:t>Oversampling methods</a:t>
-            </a:r>
-            <a:endParaRPr lang="en-US" dirty="0"/>
-          </a:p>
-        </p:txBody>
-      </p:sp>
-      <p:sp>
-        <p:nvSpPr>
-          <p:cNvPr id="3" name="Content Placeholder 2"/>
-          <p:cNvSpPr>
-            <a:spLocks noGrp="1"/>
-          </p:cNvSpPr>
-          <p:nvPr>
-            <p:ph idx="1"/>
-          </p:nvPr>
-        </p:nvSpPr>
-        <p:spPr/>
-        <p:txBody>
-          <a:bodyPr/>
-          <a:lstStyle/>
-          <a:p>
-            <a:r>
-              <a:rPr lang="en-US" dirty="0" smtClean="0"/>
-              <a:t>Synthetic Minority Oversampling Technique (SMOTE)</a:t>
-            </a:r>
-          </a:p>
-          <a:p>
-            <a:r>
-              <a:rPr lang="en-US" dirty="0" smtClean="0"/>
-              <a:t>For each minority example</a:t>
-            </a:r>
-          </a:p>
-          <a:p>
-            <a:pPr lvl="1"/>
-            <a:r>
-              <a:rPr lang="en-US" dirty="0" smtClean="0"/>
-              <a:t>Randomly chose one of the k nearest </a:t>
-            </a:r>
-            <a:r>
-              <a:rPr lang="en-US" dirty="0" err="1" smtClean="0"/>
-              <a:t>neighbours</a:t>
-            </a:r>
-            <a:r>
-              <a:rPr lang="en-US" dirty="0" smtClean="0"/>
-              <a:t> (majority or minority)</a:t>
-            </a:r>
-          </a:p>
-          <a:p>
-            <a:pPr lvl="1"/>
-            <a:r>
-              <a:rPr lang="en-US" dirty="0" smtClean="0"/>
-              <a:t>Create a new sample a random distance between the minority example and the nearest </a:t>
-            </a:r>
-            <a:r>
-              <a:rPr lang="en-US" dirty="0" err="1" smtClean="0"/>
-              <a:t>neighbour</a:t>
-            </a:r>
-            <a:r>
-              <a:rPr lang="en-US" dirty="0" smtClean="0"/>
-              <a:t>.</a:t>
-            </a:r>
-          </a:p>
-          <a:p>
-            <a:pPr lvl="1"/>
-            <a:r>
-              <a:rPr lang="en-US" dirty="0" smtClean="0"/>
-              <a:t>This allows the minority example class space to be expanded.</a:t>
-            </a:r>
-            <a:endParaRPr lang="en-US" dirty="0"/>
-          </a:p>
-          <a:p>
-            <a:pPr marL="0" indent="0">
-              <a:buNone/>
-            </a:pPr>
-            <a:endParaRPr lang="en-US" dirty="0"/>
-          </a:p>
-        </p:txBody>
-      </p:sp>
-      <p:pic>
-        <p:nvPicPr>
-          <p:cNvPr id="5" name="Picture 4"/>
-          <p:cNvPicPr>
-            <a:picLocks noChangeAspect="1"/>
-          </p:cNvPicPr>
-          <p:nvPr/>
-        </p:nvPicPr>
-        <p:blipFill>
-          <a:blip r:embed="rId2"/>
-          <a:stretch>
-            <a:fillRect/>
-          </a:stretch>
-        </p:blipFill>
-        <p:spPr>
-          <a:xfrm>
-            <a:off x="3381305" y="3908620"/>
-            <a:ext cx="5429390" cy="2268343"/>
-          </a:xfrm>
-          <a:prstGeom prst="rect">
-            <a:avLst/>
-          </a:prstGeom>
-        </p:spPr>
-      </p:pic>
-      <p:sp>
-        <p:nvSpPr>
-          <p:cNvPr id="6" name="TextBox 5"/>
-          <p:cNvSpPr txBox="1"/>
-          <p:nvPr/>
-        </p:nvSpPr>
-        <p:spPr>
-          <a:xfrm>
-            <a:off x="3381305" y="6176963"/>
-            <a:ext cx="5429390" cy="369332"/>
-          </a:xfrm>
-          <a:prstGeom prst="rect">
-            <a:avLst/>
-          </a:prstGeom>
-          <a:noFill/>
-        </p:spPr>
-        <p:txBody>
-          <a:bodyPr wrap="square" rtlCol="0">
-            <a:spAutoFit/>
-          </a:bodyPr>
-          <a:lstStyle/>
-          <a:p>
-            <a:r>
-              <a:rPr lang="en-US" i="1" dirty="0" smtClean="0"/>
-              <a:t>Image source[2]</a:t>
-            </a:r>
-            <a:endParaRPr lang="en-US" i="1" dirty="0"/>
-          </a:p>
-        </p:txBody>
-      </p:sp>
-    </p:spTree>
-    <p:extLst>
-      <p:ext uri="{BB962C8B-B14F-4D97-AF65-F5344CB8AC3E}">
-        <p14:creationId xmlns:p14="http://schemas.microsoft.com/office/powerpoint/2010/main" val="476306972"/>
-      </p:ext>
-    </p:extLst>
-  </p:cSld>
-  <p:clrMapOvr>
-    <a:masterClrMapping/>
-  </p:clrMapOvr>
-  <p:timing>
-    <p:tnLst>
-      <p:par>
-        <p:cTn id="1" dur="indefinite" restart="never" nodeType="tmRoot"/>
-      </p:par>
-    </p:tnLst>
-  </p:timing>
-</p:sld>
-</file>
-
-<file path=ppt/slides/slide17.xml><?xml version="1.0" encoding="utf-8"?>
-<p:sld xmlns:a="http://schemas.openxmlformats.org/drawingml/2006/main" xmlns:r="http://schemas.openxmlformats.org/officeDocument/2006/relationships" xmlns:p="http://schemas.openxmlformats.org/presentationml/2006/main">
-  <p:cSld>
-    <p:spTree>
-      <p:nvGrpSpPr>
-        <p:cNvPr id="1" name=""/>
-        <p:cNvGrpSpPr/>
-        <p:nvPr/>
-      </p:nvGrpSpPr>
-      <p:grpSpPr>
-        <a:xfrm>
-          <a:off x="0" y="0"/>
-          <a:ext cx="0" cy="0"/>
-          <a:chOff x="0" y="0"/>
-          <a:chExt cx="0" cy="0"/>
-        </a:xfrm>
-      </p:grpSpPr>
-      <p:sp>
-        <p:nvSpPr>
-          <p:cNvPr id="2" name="Title 1"/>
-          <p:cNvSpPr>
-            <a:spLocks noGrp="1"/>
-          </p:cNvSpPr>
-          <p:nvPr>
-            <p:ph type="title"/>
-          </p:nvPr>
-        </p:nvSpPr>
-        <p:spPr/>
-        <p:txBody>
-          <a:bodyPr/>
-          <a:lstStyle/>
-          <a:p>
-            <a:r>
-              <a:rPr lang="en-US" dirty="0" err="1" smtClean="0"/>
-              <a:t>Undersampling</a:t>
-            </a:r>
-            <a:r>
-              <a:rPr lang="en-US" dirty="0" smtClean="0"/>
-              <a:t> methods</a:t>
-            </a:r>
-            <a:endParaRPr lang="en-US" dirty="0"/>
-          </a:p>
-        </p:txBody>
-      </p:sp>
-      <p:sp>
-        <p:nvSpPr>
-          <p:cNvPr id="3" name="Content Placeholder 2"/>
-          <p:cNvSpPr>
-            <a:spLocks noGrp="1"/>
-          </p:cNvSpPr>
-          <p:nvPr>
-            <p:ph idx="1"/>
-          </p:nvPr>
-        </p:nvSpPr>
-        <p:spPr/>
-        <p:txBody>
-          <a:bodyPr>
-            <a:normAutofit/>
-          </a:bodyPr>
-          <a:lstStyle/>
-          <a:p>
-            <a:r>
-              <a:rPr lang="en-US" dirty="0" err="1" smtClean="0"/>
-              <a:t>Tomek</a:t>
-            </a:r>
-            <a:r>
-              <a:rPr lang="en-US" dirty="0" smtClean="0"/>
-              <a:t> Links</a:t>
-            </a:r>
-          </a:p>
-          <a:p>
-            <a:pPr lvl="1"/>
-            <a:r>
-              <a:rPr lang="en-US" dirty="0" smtClean="0"/>
-              <a:t>Find pairs of points that are different classes, they form a </a:t>
-            </a:r>
-            <a:r>
-              <a:rPr lang="en-US" dirty="0" err="1" smtClean="0"/>
-              <a:t>Tomek</a:t>
-            </a:r>
-            <a:r>
-              <a:rPr lang="en-US" dirty="0" smtClean="0"/>
-              <a:t> link if there is no closer example to either point.</a:t>
-            </a:r>
-          </a:p>
-          <a:p>
-            <a:pPr lvl="1"/>
-            <a:r>
-              <a:rPr lang="en-US" dirty="0" smtClean="0"/>
-              <a:t>Remove majority example in the pair. </a:t>
-            </a:r>
-          </a:p>
-          <a:p>
-            <a:pPr lvl="1"/>
-            <a:r>
-              <a:rPr lang="en-US" dirty="0" smtClean="0"/>
-              <a:t>Effectively widens the decision boundary between majority and minority.</a:t>
-            </a:r>
-          </a:p>
-          <a:p>
-            <a:pPr lvl="1"/>
-            <a:endParaRPr lang="en-US" dirty="0" smtClean="0"/>
-          </a:p>
-        </p:txBody>
-      </p:sp>
-      <p:pic>
-        <p:nvPicPr>
-          <p:cNvPr id="4" name="Picture 3"/>
-          <p:cNvPicPr>
-            <a:picLocks noChangeAspect="1"/>
-          </p:cNvPicPr>
-          <p:nvPr/>
-        </p:nvPicPr>
-        <p:blipFill>
-          <a:blip r:embed="rId2"/>
-          <a:stretch>
-            <a:fillRect/>
-          </a:stretch>
-        </p:blipFill>
-        <p:spPr>
-          <a:xfrm>
-            <a:off x="3384804" y="3911008"/>
-            <a:ext cx="5422392" cy="2265955"/>
-          </a:xfrm>
-          <a:prstGeom prst="rect">
-            <a:avLst/>
-          </a:prstGeom>
-        </p:spPr>
-      </p:pic>
-      <p:sp>
-        <p:nvSpPr>
-          <p:cNvPr id="5" name="TextBox 4"/>
-          <p:cNvSpPr txBox="1"/>
-          <p:nvPr/>
-        </p:nvSpPr>
-        <p:spPr>
-          <a:xfrm>
-            <a:off x="3381305" y="6176963"/>
-            <a:ext cx="5429390" cy="369332"/>
-          </a:xfrm>
-          <a:prstGeom prst="rect">
-            <a:avLst/>
-          </a:prstGeom>
-          <a:noFill/>
-        </p:spPr>
-        <p:txBody>
-          <a:bodyPr wrap="square" rtlCol="0">
-            <a:spAutoFit/>
-          </a:bodyPr>
-          <a:lstStyle/>
-          <a:p>
-            <a:r>
-              <a:rPr lang="en-US" i="1" dirty="0" smtClean="0"/>
-              <a:t>Image source[2]</a:t>
-            </a:r>
-            <a:endParaRPr lang="en-US" i="1" dirty="0"/>
-          </a:p>
-        </p:txBody>
-      </p:sp>
-    </p:spTree>
-    <p:extLst>
-      <p:ext uri="{BB962C8B-B14F-4D97-AF65-F5344CB8AC3E}">
-        <p14:creationId xmlns:p14="http://schemas.microsoft.com/office/powerpoint/2010/main" val="1753687419"/>
-      </p:ext>
-    </p:extLst>
-  </p:cSld>
-  <p:clrMapOvr>
-    <a:masterClrMapping/>
-  </p:clrMapOvr>
-  <p:timing>
-    <p:tnLst>
-      <p:par>
-        <p:cTn id="1" dur="indefinite" restart="never" nodeType="tmRoot"/>
-      </p:par>
-    </p:tnLst>
-  </p:timing>
-</p:sld>
-</file>
-
-<file path=ppt/slides/slide18.xml><?xml version="1.0" encoding="utf-8"?>
-<p:sld xmlns:a="http://schemas.openxmlformats.org/drawingml/2006/main" xmlns:r="http://schemas.openxmlformats.org/officeDocument/2006/relationships" xmlns:p="http://schemas.openxmlformats.org/presentationml/2006/main">
-  <p:cSld>
-    <p:spTree>
-      <p:nvGrpSpPr>
-        <p:cNvPr id="1" name=""/>
-        <p:cNvGrpSpPr/>
-        <p:nvPr/>
-      </p:nvGrpSpPr>
-      <p:grpSpPr>
-        <a:xfrm>
-          <a:off x="0" y="0"/>
-          <a:ext cx="0" cy="0"/>
-          <a:chOff x="0" y="0"/>
-          <a:chExt cx="0" cy="0"/>
-        </a:xfrm>
-      </p:grpSpPr>
-      <p:sp>
-        <p:nvSpPr>
-          <p:cNvPr id="2" name="Title 1"/>
-          <p:cNvSpPr>
-            <a:spLocks noGrp="1"/>
-          </p:cNvSpPr>
-          <p:nvPr>
-            <p:ph type="title"/>
-          </p:nvPr>
-        </p:nvSpPr>
-        <p:spPr/>
-        <p:txBody>
-          <a:bodyPr/>
-          <a:lstStyle/>
-          <a:p>
-            <a:r>
               <a:rPr lang="en-US" dirty="0" err="1" smtClean="0"/>
               <a:t>Undersampling</a:t>
             </a:r>
@@ -5220,7 +4693,7 @@
 </p:sld>
 </file>
 
-<file path=ppt/slides/slide19.xml><?xml version="1.0" encoding="utf-8"?>
+<file path=ppt/slides/slide17.xml><?xml version="1.0" encoding="utf-8"?>
 <p:sld xmlns:a="http://schemas.openxmlformats.org/drawingml/2006/main" xmlns:r="http://schemas.openxmlformats.org/officeDocument/2006/relationships" xmlns:p="http://schemas.openxmlformats.org/presentationml/2006/main">
   <p:cSld>
     <p:spTree>
@@ -5551,6 +5024,214 @@
 </p:sld>
 </file>
 
+<file path=ppt/slides/slide18.xml><?xml version="1.0" encoding="utf-8"?>
+<p:sld xmlns:a="http://schemas.openxmlformats.org/drawingml/2006/main" xmlns:r="http://schemas.openxmlformats.org/officeDocument/2006/relationships" xmlns:p="http://schemas.openxmlformats.org/presentationml/2006/main">
+  <p:cSld>
+    <p:spTree>
+      <p:nvGrpSpPr>
+        <p:cNvPr id="1" name=""/>
+        <p:cNvGrpSpPr/>
+        <p:nvPr/>
+      </p:nvGrpSpPr>
+      <p:grpSpPr>
+        <a:xfrm>
+          <a:off x="0" y="0"/>
+          <a:ext cx="0" cy="0"/>
+          <a:chOff x="0" y="0"/>
+          <a:chExt cx="0" cy="0"/>
+        </a:xfrm>
+      </p:grpSpPr>
+      <p:sp>
+        <p:nvSpPr>
+          <p:cNvPr id="2" name="Title 1"/>
+          <p:cNvSpPr>
+            <a:spLocks noGrp="1"/>
+          </p:cNvSpPr>
+          <p:nvPr>
+            <p:ph type="title"/>
+          </p:nvPr>
+        </p:nvSpPr>
+        <p:spPr/>
+        <p:txBody>
+          <a:bodyPr/>
+          <a:lstStyle/>
+          <a:p>
+            <a:r>
+              <a:rPr lang="en-US" dirty="0" smtClean="0"/>
+              <a:t>Cost-sensitive Algorithms</a:t>
+            </a:r>
+            <a:endParaRPr lang="en-US" dirty="0"/>
+          </a:p>
+        </p:txBody>
+      </p:sp>
+      <p:sp>
+        <p:nvSpPr>
+          <p:cNvPr id="3" name="Text Placeholder 2"/>
+          <p:cNvSpPr>
+            <a:spLocks noGrp="1"/>
+          </p:cNvSpPr>
+          <p:nvPr>
+            <p:ph type="body" idx="1"/>
+          </p:nvPr>
+        </p:nvSpPr>
+        <p:spPr/>
+        <p:txBody>
+          <a:bodyPr/>
+          <a:lstStyle/>
+          <a:p>
+            <a:endParaRPr lang="en-US"/>
+          </a:p>
+        </p:txBody>
+      </p:sp>
+    </p:spTree>
+    <p:extLst>
+      <p:ext uri="{BB962C8B-B14F-4D97-AF65-F5344CB8AC3E}">
+        <p14:creationId xmlns:p14="http://schemas.microsoft.com/office/powerpoint/2010/main" val="1740511102"/>
+      </p:ext>
+    </p:extLst>
+  </p:cSld>
+  <p:clrMapOvr>
+    <a:masterClrMapping/>
+  </p:clrMapOvr>
+  <p:timing>
+    <p:tnLst>
+      <p:par>
+        <p:cTn id="1" dur="indefinite" restart="never" nodeType="tmRoot"/>
+      </p:par>
+    </p:tnLst>
+  </p:timing>
+</p:sld>
+</file>
+
+<file path=ppt/slides/slide19.xml><?xml version="1.0" encoding="utf-8"?>
+<p:sld xmlns:a="http://schemas.openxmlformats.org/drawingml/2006/main" xmlns:r="http://schemas.openxmlformats.org/officeDocument/2006/relationships" xmlns:p="http://schemas.openxmlformats.org/presentationml/2006/main">
+  <p:cSld>
+    <p:spTree>
+      <p:nvGrpSpPr>
+        <p:cNvPr id="1" name=""/>
+        <p:cNvGrpSpPr/>
+        <p:nvPr/>
+      </p:nvGrpSpPr>
+      <p:grpSpPr>
+        <a:xfrm>
+          <a:off x="0" y="0"/>
+          <a:ext cx="0" cy="0"/>
+          <a:chOff x="0" y="0"/>
+          <a:chExt cx="0" cy="0"/>
+        </a:xfrm>
+      </p:grpSpPr>
+      <p:sp>
+        <p:nvSpPr>
+          <p:cNvPr id="2" name="Title 1"/>
+          <p:cNvSpPr>
+            <a:spLocks noGrp="1"/>
+          </p:cNvSpPr>
+          <p:nvPr>
+            <p:ph type="title"/>
+          </p:nvPr>
+        </p:nvSpPr>
+        <p:spPr/>
+        <p:txBody>
+          <a:bodyPr/>
+          <a:lstStyle/>
+          <a:p>
+            <a:r>
+              <a:rPr lang="en-US" dirty="0"/>
+              <a:t>Solutions – </a:t>
+            </a:r>
+            <a:r>
+              <a:rPr lang="en-US" dirty="0" smtClean="0"/>
+              <a:t>Cost-sensitive methods</a:t>
+            </a:r>
+            <a:endParaRPr lang="en-US" dirty="0"/>
+          </a:p>
+        </p:txBody>
+      </p:sp>
+      <p:sp>
+        <p:nvSpPr>
+          <p:cNvPr id="3" name="Content Placeholder 2"/>
+          <p:cNvSpPr>
+            <a:spLocks noGrp="1"/>
+          </p:cNvSpPr>
+          <p:nvPr>
+            <p:ph idx="1"/>
+          </p:nvPr>
+        </p:nvSpPr>
+        <p:spPr/>
+        <p:txBody>
+          <a:bodyPr>
+            <a:normAutofit/>
+          </a:bodyPr>
+          <a:lstStyle/>
+          <a:p>
+            <a:r>
+              <a:rPr lang="en-US" dirty="0" smtClean="0"/>
+              <a:t>With a dataset of 95:5 imbalance, </a:t>
+            </a:r>
+            <a:r>
+              <a:rPr lang="en-US" dirty="0" err="1" smtClean="0"/>
+              <a:t>mis</a:t>
+            </a:r>
+            <a:r>
+              <a:rPr lang="en-US" dirty="0" smtClean="0"/>
+              <a:t>-classifying the minority examples can contribute a maximum of 5% of the loss.</a:t>
+            </a:r>
+          </a:p>
+          <a:p>
+            <a:r>
+              <a:rPr lang="en-US" dirty="0" smtClean="0"/>
+              <a:t>This will skew the model towards correctly classifying the majority samples !</a:t>
+            </a:r>
+          </a:p>
+          <a:p>
+            <a:r>
+              <a:rPr lang="en-US" dirty="0" smtClean="0"/>
+              <a:t>To solve this, we can weight the classifications using the inverse of class frequency.</a:t>
+            </a:r>
+          </a:p>
+          <a:p>
+            <a:r>
+              <a:rPr lang="en-US" dirty="0" smtClean="0"/>
+              <a:t>So scale each </a:t>
+            </a:r>
+            <a:r>
+              <a:rPr lang="en-US" dirty="0" err="1" smtClean="0"/>
+              <a:t>mis</a:t>
+            </a:r>
+            <a:r>
+              <a:rPr lang="en-US" dirty="0" smtClean="0"/>
+              <a:t>-classification of the minority class by the imbalance</a:t>
+            </a:r>
+          </a:p>
+          <a:p>
+            <a:pPr lvl="1"/>
+            <a:r>
+              <a:rPr lang="en-US" dirty="0" smtClean="0"/>
+              <a:t>Scaling the minority class cost by 95/5 = 19 gives a cost function ratio of 95:95. </a:t>
+            </a:r>
+          </a:p>
+        </p:txBody>
+      </p:sp>
+    </p:spTree>
+    <p:extLst>
+      <p:ext uri="{BB962C8B-B14F-4D97-AF65-F5344CB8AC3E}">
+        <p14:creationId xmlns:p14="http://schemas.microsoft.com/office/powerpoint/2010/main" val="287383503"/>
+      </p:ext>
+    </p:extLst>
+  </p:cSld>
+  <p:clrMapOvr>
+    <a:masterClrMapping/>
+  </p:clrMapOvr>
+  <p:timing>
+    <p:tnLst>
+      <p:par>
+        <p:cTn id="1" dur="indefinite" restart="never" nodeType="tmRoot"/>
+      </p:par>
+    </p:tnLst>
+  </p:timing>
+</p:sld>
+</file>
+
 <file path=ppt/slides/slide2.xml><?xml version="1.0" encoding="utf-8"?>
 <p:sld xmlns:a="http://schemas.openxmlformats.org/drawingml/2006/main" xmlns:r="http://schemas.openxmlformats.org/officeDocument/2006/relationships" xmlns:p="http://schemas.openxmlformats.org/presentationml/2006/main">
   <p:cSld>
@@ -5760,8 +5441,12 @@
           <a:lstStyle/>
           <a:p>
             <a:r>
-              <a:rPr lang="en-US" dirty="0" smtClean="0"/>
-              <a:t>Cost-sensitive Algorithms</a:t>
+              <a:rPr lang="en-US" dirty="0"/>
+              <a:t>Solutions – </a:t>
+            </a:r>
+            <a:r>
+              <a:rPr lang="en-US" dirty="0" smtClean="0"/>
+              <a:t>Cost-sensitive methods</a:t>
             </a:r>
             <a:endParaRPr lang="en-US" dirty="0"/>
           </a:p>
@@ -5769,27 +5454,179 @@
       </p:sp>
       <p:sp>
         <p:nvSpPr>
-          <p:cNvPr id="3" name="Text Placeholder 2"/>
-          <p:cNvSpPr>
-            <a:spLocks noGrp="1"/>
-          </p:cNvSpPr>
-          <p:nvPr>
-            <p:ph type="body" idx="1"/>
-          </p:nvPr>
-        </p:nvSpPr>
-        <p:spPr/>
-        <p:txBody>
-          <a:bodyPr/>
-          <a:lstStyle/>
-          <a:p>
-            <a:endParaRPr lang="en-US"/>
+          <p:cNvPr id="3" name="Content Placeholder 2"/>
+          <p:cNvSpPr>
+            <a:spLocks noGrp="1"/>
+          </p:cNvSpPr>
+          <p:nvPr>
+            <p:ph idx="1"/>
+          </p:nvPr>
+        </p:nvSpPr>
+        <p:spPr/>
+        <p:txBody>
+          <a:bodyPr>
+            <a:normAutofit/>
+          </a:bodyPr>
+          <a:lstStyle/>
+          <a:p>
+            <a:r>
+              <a:rPr lang="en-US" dirty="0" smtClean="0"/>
+              <a:t>The following classifiers in </a:t>
+            </a:r>
+            <a:r>
+              <a:rPr lang="en-US" dirty="0" err="1" smtClean="0"/>
+              <a:t>scikit</a:t>
+            </a:r>
+            <a:r>
+              <a:rPr lang="en-US" dirty="0" smtClean="0"/>
+              <a:t>-learn can adjust weights inversely to class frequencies</a:t>
+            </a:r>
+          </a:p>
+          <a:p>
+            <a:pPr lvl="1"/>
+            <a:r>
+              <a:rPr lang="en-US" dirty="0" err="1" smtClean="0"/>
+              <a:t>sklearn.linear_model.LogisticRegression</a:t>
+            </a:r>
+            <a:endParaRPr lang="en-US" dirty="0" smtClean="0"/>
+          </a:p>
+          <a:p>
+            <a:pPr lvl="1"/>
+            <a:r>
+              <a:rPr lang="en-US" dirty="0" err="1" smtClean="0"/>
+              <a:t>sklearn.tree.DecisionTreeClassifier</a:t>
+            </a:r>
+            <a:endParaRPr lang="en-US" dirty="0" smtClean="0"/>
+          </a:p>
+          <a:p>
+            <a:pPr lvl="1"/>
+            <a:r>
+              <a:rPr lang="en-US" dirty="0" err="1" smtClean="0"/>
+              <a:t>sklearn.svm.LinearSVC</a:t>
+            </a:r>
+            <a:endParaRPr lang="en-US" dirty="0" smtClean="0"/>
+          </a:p>
+          <a:p>
+            <a:r>
+              <a:rPr lang="en-US" dirty="0" smtClean="0"/>
+              <a:t>The API is standard across these classifiers (copied below)</a:t>
+            </a:r>
+          </a:p>
+          <a:p>
+            <a:pPr lvl="1"/>
+            <a:r>
+              <a:rPr lang="en-US" sz="1900" b="1" dirty="0" err="1">
+                <a:latin typeface="Monaco" charset="0"/>
+                <a:ea typeface="Monaco" charset="0"/>
+                <a:cs typeface="Monaco" charset="0"/>
+              </a:rPr>
+              <a:t>class_weight</a:t>
+            </a:r>
+            <a:r>
+              <a:rPr lang="en-US" sz="1900" dirty="0">
+                <a:latin typeface="Monaco" charset="0"/>
+                <a:ea typeface="Monaco" charset="0"/>
+                <a:cs typeface="Monaco" charset="0"/>
+              </a:rPr>
+              <a:t> : </a:t>
+            </a:r>
+            <a:r>
+              <a:rPr lang="en-US" sz="1900" dirty="0" err="1">
+                <a:latin typeface="Monaco" charset="0"/>
+                <a:ea typeface="Monaco" charset="0"/>
+                <a:cs typeface="Monaco" charset="0"/>
+              </a:rPr>
+              <a:t>dict</a:t>
+            </a:r>
+            <a:r>
+              <a:rPr lang="en-US" sz="1900" dirty="0">
+                <a:latin typeface="Monaco" charset="0"/>
+                <a:ea typeface="Monaco" charset="0"/>
+                <a:cs typeface="Monaco" charset="0"/>
+              </a:rPr>
+              <a:t> or ‘balanced’, optional</a:t>
+            </a:r>
+          </a:p>
+          <a:p>
+            <a:pPr lvl="1"/>
+            <a:r>
+              <a:rPr lang="en-US" sz="1900" dirty="0" smtClean="0">
+                <a:latin typeface="Monaco" charset="0"/>
+                <a:ea typeface="Monaco" charset="0"/>
+                <a:cs typeface="Monaco" charset="0"/>
+              </a:rPr>
+              <a:t>The </a:t>
+            </a:r>
+            <a:r>
+              <a:rPr lang="en-US" sz="1900" dirty="0">
+                <a:latin typeface="Monaco" charset="0"/>
+                <a:ea typeface="Monaco" charset="0"/>
+                <a:cs typeface="Monaco" charset="0"/>
+              </a:rPr>
+              <a:t>“balanced” mode uses the values of y to automatically adjust weights inversely proportional to class frequencies in the input data as </a:t>
+            </a:r>
+            <a:r>
+              <a:rPr lang="en-US" sz="1900" dirty="0" err="1">
+                <a:latin typeface="Monaco" charset="0"/>
+                <a:ea typeface="Monaco" charset="0"/>
+                <a:cs typeface="Monaco" charset="0"/>
+              </a:rPr>
+              <a:t>n_samples</a:t>
+            </a:r>
+            <a:r>
+              <a:rPr lang="en-US" sz="1900" dirty="0">
+                <a:latin typeface="Monaco" charset="0"/>
+                <a:ea typeface="Monaco" charset="0"/>
+                <a:cs typeface="Monaco" charset="0"/>
+              </a:rPr>
+              <a:t> / (</a:t>
+            </a:r>
+            <a:r>
+              <a:rPr lang="en-US" sz="1900" dirty="0" err="1">
+                <a:latin typeface="Monaco" charset="0"/>
+                <a:ea typeface="Monaco" charset="0"/>
+                <a:cs typeface="Monaco" charset="0"/>
+              </a:rPr>
+              <a:t>n_classes</a:t>
+            </a:r>
+            <a:r>
+              <a:rPr lang="en-US" sz="1900" dirty="0">
+                <a:latin typeface="Monaco" charset="0"/>
+                <a:ea typeface="Monaco" charset="0"/>
+                <a:cs typeface="Monaco" charset="0"/>
+              </a:rPr>
+              <a:t> * </a:t>
+            </a:r>
+            <a:r>
+              <a:rPr lang="en-US" sz="1900" dirty="0" err="1">
+                <a:latin typeface="Monaco" charset="0"/>
+                <a:ea typeface="Monaco" charset="0"/>
+                <a:cs typeface="Monaco" charset="0"/>
+              </a:rPr>
+              <a:t>np.bincount</a:t>
+            </a:r>
+            <a:r>
+              <a:rPr lang="en-US" sz="1900" dirty="0">
+                <a:latin typeface="Monaco" charset="0"/>
+                <a:ea typeface="Monaco" charset="0"/>
+                <a:cs typeface="Monaco" charset="0"/>
+              </a:rPr>
+              <a:t>(y))</a:t>
+            </a:r>
+          </a:p>
+          <a:p>
+            <a:endParaRPr lang="en-US" dirty="0" smtClean="0"/>
+          </a:p>
+          <a:p>
+            <a:pPr lvl="1"/>
+            <a:endParaRPr lang="en-US" dirty="0" smtClean="0"/>
           </a:p>
         </p:txBody>
       </p:sp>
     </p:spTree>
     <p:extLst>
       <p:ext uri="{BB962C8B-B14F-4D97-AF65-F5344CB8AC3E}">
-        <p14:creationId xmlns:p14="http://schemas.microsoft.com/office/powerpoint/2010/main" val="1740511102"/>
+        <p14:creationId xmlns:p14="http://schemas.microsoft.com/office/powerpoint/2010/main" val="1134085703"/>
       </p:ext>
     </p:extLst>
   </p:cSld>
@@ -5839,12 +5676,8 @@
           <a:lstStyle/>
           <a:p>
             <a:r>
-              <a:rPr lang="en-US" dirty="0"/>
-              <a:t>Solutions – </a:t>
-            </a:r>
-            <a:r>
-              <a:rPr lang="en-US" dirty="0" smtClean="0"/>
-              <a:t>Cost-sensitive methods</a:t>
+              <a:rPr lang="en-US" dirty="0" smtClean="0"/>
+              <a:t>Real-world use-case</a:t>
             </a:r>
             <a:endParaRPr lang="en-US" dirty="0"/>
           </a:p>
@@ -5852,73 +5685,27 @@
       </p:sp>
       <p:sp>
         <p:nvSpPr>
-          <p:cNvPr id="3" name="Content Placeholder 2"/>
-          <p:cNvSpPr>
-            <a:spLocks noGrp="1"/>
-          </p:cNvSpPr>
-          <p:nvPr>
-            <p:ph idx="1"/>
-          </p:nvPr>
-        </p:nvSpPr>
-        <p:spPr/>
-        <p:txBody>
-          <a:bodyPr>
-            <a:normAutofit/>
-          </a:bodyPr>
-          <a:lstStyle/>
-          <a:p>
-            <a:r>
-              <a:rPr lang="en-US" dirty="0" smtClean="0"/>
-              <a:t>With a dataset of 95:5 imbalance, </a:t>
-            </a:r>
-            <a:r>
-              <a:rPr lang="en-US" dirty="0" err="1" smtClean="0"/>
-              <a:t>mis</a:t>
-            </a:r>
-            <a:r>
-              <a:rPr lang="en-US" dirty="0" smtClean="0"/>
-              <a:t>-classifying the minority examples can contribute a maximum of 5% of the loss.</a:t>
-            </a:r>
-          </a:p>
-          <a:p>
-            <a:r>
-              <a:rPr lang="en-US" dirty="0" smtClean="0"/>
-              <a:t>This will skew the model towards correctly classifying the majority samples !</a:t>
-            </a:r>
-          </a:p>
-          <a:p>
-            <a:r>
-              <a:rPr lang="en-US" dirty="0" smtClean="0"/>
-              <a:t>To solve this, we can weight the classifications using the inverse of class frequency.</a:t>
-            </a:r>
-          </a:p>
-          <a:p>
-            <a:r>
-              <a:rPr lang="en-US" dirty="0" smtClean="0"/>
-              <a:t>So scale each </a:t>
-            </a:r>
-            <a:r>
-              <a:rPr lang="en-US" dirty="0" err="1" smtClean="0"/>
-              <a:t>mis</a:t>
-            </a:r>
-            <a:r>
-              <a:rPr lang="en-US" dirty="0" smtClean="0"/>
-              <a:t>-classification of the minority class by the imbalance</a:t>
-            </a:r>
-          </a:p>
-          <a:p>
-            <a:pPr lvl="1"/>
-            <a:r>
-              <a:rPr lang="en-US" dirty="0" smtClean="0"/>
-              <a:t>Scaling the minority class cost by 95/5 = 19 gives a cost function ratio of 95:95. </a:t>
-            </a:r>
+          <p:cNvPr id="3" name="Text Placeholder 2"/>
+          <p:cNvSpPr>
+            <a:spLocks noGrp="1"/>
+          </p:cNvSpPr>
+          <p:nvPr>
+            <p:ph type="body" idx="1"/>
+          </p:nvPr>
+        </p:nvSpPr>
+        <p:spPr/>
+        <p:txBody>
+          <a:bodyPr/>
+          <a:lstStyle/>
+          <a:p>
+            <a:endParaRPr lang="en-US"/>
           </a:p>
         </p:txBody>
       </p:sp>
     </p:spTree>
     <p:extLst>
       <p:ext uri="{BB962C8B-B14F-4D97-AF65-F5344CB8AC3E}">
-        <p14:creationId xmlns:p14="http://schemas.microsoft.com/office/powerpoint/2010/main" val="287383503"/>
+        <p14:creationId xmlns:p14="http://schemas.microsoft.com/office/powerpoint/2010/main" val="1040918563"/>
       </p:ext>
     </p:extLst>
   </p:cSld>
@@ -5968,320 +5755,6 @@
           <a:lstStyle/>
           <a:p>
             <a:r>
-              <a:rPr lang="en-US" dirty="0"/>
-              <a:t>Solutions – </a:t>
-            </a:r>
-            <a:r>
-              <a:rPr lang="en-US" dirty="0" smtClean="0"/>
-              <a:t>Cost-sensitive methods</a:t>
-            </a:r>
-            <a:endParaRPr lang="en-US" dirty="0"/>
-          </a:p>
-        </p:txBody>
-      </p:sp>
-      <p:sp>
-        <p:nvSpPr>
-          <p:cNvPr id="3" name="Content Placeholder 2"/>
-          <p:cNvSpPr>
-            <a:spLocks noGrp="1"/>
-          </p:cNvSpPr>
-          <p:nvPr>
-            <p:ph idx="1"/>
-          </p:nvPr>
-        </p:nvSpPr>
-        <p:spPr/>
-        <p:txBody>
-          <a:bodyPr>
-            <a:normAutofit/>
-          </a:bodyPr>
-          <a:lstStyle/>
-          <a:p>
-            <a:r>
-              <a:rPr lang="en-US" dirty="0" smtClean="0"/>
-              <a:t>The following classifiers in </a:t>
-            </a:r>
-            <a:r>
-              <a:rPr lang="en-US" dirty="0" err="1" smtClean="0"/>
-              <a:t>scikit</a:t>
-            </a:r>
-            <a:r>
-              <a:rPr lang="en-US" dirty="0" smtClean="0"/>
-              <a:t>-learn can adjust weights inversely to class frequencies</a:t>
-            </a:r>
-          </a:p>
-          <a:p>
-            <a:pPr lvl="1"/>
-            <a:r>
-              <a:rPr lang="en-US" dirty="0" err="1" smtClean="0"/>
-              <a:t>sklearn.linear_model.LogisticRegression</a:t>
-            </a:r>
-            <a:endParaRPr lang="en-US" dirty="0" smtClean="0"/>
-          </a:p>
-          <a:p>
-            <a:pPr lvl="1"/>
-            <a:r>
-              <a:rPr lang="en-US" dirty="0" err="1" smtClean="0"/>
-              <a:t>sklearn.tree.DecisionTreeClassifier</a:t>
-            </a:r>
-            <a:endParaRPr lang="en-US" dirty="0" smtClean="0"/>
-          </a:p>
-          <a:p>
-            <a:pPr lvl="1"/>
-            <a:r>
-              <a:rPr lang="en-US" dirty="0" err="1" smtClean="0"/>
-              <a:t>sklearn.svm.LinearSVC</a:t>
-            </a:r>
-            <a:endParaRPr lang="en-US" dirty="0" smtClean="0"/>
-          </a:p>
-          <a:p>
-            <a:r>
-              <a:rPr lang="en-US" dirty="0" smtClean="0"/>
-              <a:t>The API is standard across these classifiers (copied below)</a:t>
-            </a:r>
-          </a:p>
-          <a:p>
-            <a:pPr lvl="1"/>
-            <a:r>
-              <a:rPr lang="en-US" sz="1900" b="1" dirty="0" err="1">
-                <a:latin typeface="Monaco" charset="0"/>
-                <a:ea typeface="Monaco" charset="0"/>
-                <a:cs typeface="Monaco" charset="0"/>
-              </a:rPr>
-              <a:t>class_weight</a:t>
-            </a:r>
-            <a:r>
-              <a:rPr lang="en-US" sz="1900" dirty="0">
-                <a:latin typeface="Monaco" charset="0"/>
-                <a:ea typeface="Monaco" charset="0"/>
-                <a:cs typeface="Monaco" charset="0"/>
-              </a:rPr>
-              <a:t> : </a:t>
-            </a:r>
-            <a:r>
-              <a:rPr lang="en-US" sz="1900" dirty="0" err="1">
-                <a:latin typeface="Monaco" charset="0"/>
-                <a:ea typeface="Monaco" charset="0"/>
-                <a:cs typeface="Monaco" charset="0"/>
-              </a:rPr>
-              <a:t>dict</a:t>
-            </a:r>
-            <a:r>
-              <a:rPr lang="en-US" sz="1900" dirty="0">
-                <a:latin typeface="Monaco" charset="0"/>
-                <a:ea typeface="Monaco" charset="0"/>
-                <a:cs typeface="Monaco" charset="0"/>
-              </a:rPr>
-              <a:t> or ‘balanced’, optional</a:t>
-            </a:r>
-          </a:p>
-          <a:p>
-            <a:pPr lvl="1"/>
-            <a:r>
-              <a:rPr lang="en-US" sz="1900" dirty="0" smtClean="0">
-                <a:latin typeface="Monaco" charset="0"/>
-                <a:ea typeface="Monaco" charset="0"/>
-                <a:cs typeface="Monaco" charset="0"/>
-              </a:rPr>
-              <a:t>The </a:t>
-            </a:r>
-            <a:r>
-              <a:rPr lang="en-US" sz="1900" dirty="0">
-                <a:latin typeface="Monaco" charset="0"/>
-                <a:ea typeface="Monaco" charset="0"/>
-                <a:cs typeface="Monaco" charset="0"/>
-              </a:rPr>
-              <a:t>“balanced” mode uses the values of y to automatically adjust weights inversely proportional to class frequencies in the input data as </a:t>
-            </a:r>
-            <a:r>
-              <a:rPr lang="en-US" sz="1900" dirty="0" err="1">
-                <a:latin typeface="Monaco" charset="0"/>
-                <a:ea typeface="Monaco" charset="0"/>
-                <a:cs typeface="Monaco" charset="0"/>
-              </a:rPr>
-              <a:t>n_samples</a:t>
-            </a:r>
-            <a:r>
-              <a:rPr lang="en-US" sz="1900" dirty="0">
-                <a:latin typeface="Monaco" charset="0"/>
-                <a:ea typeface="Monaco" charset="0"/>
-                <a:cs typeface="Monaco" charset="0"/>
-              </a:rPr>
-              <a:t> / (</a:t>
-            </a:r>
-            <a:r>
-              <a:rPr lang="en-US" sz="1900" dirty="0" err="1">
-                <a:latin typeface="Monaco" charset="0"/>
-                <a:ea typeface="Monaco" charset="0"/>
-                <a:cs typeface="Monaco" charset="0"/>
-              </a:rPr>
-              <a:t>n_classes</a:t>
-            </a:r>
-            <a:r>
-              <a:rPr lang="en-US" sz="1900" dirty="0">
-                <a:latin typeface="Monaco" charset="0"/>
-                <a:ea typeface="Monaco" charset="0"/>
-                <a:cs typeface="Monaco" charset="0"/>
-              </a:rPr>
-              <a:t> * </a:t>
-            </a:r>
-            <a:r>
-              <a:rPr lang="en-US" sz="1900" dirty="0" err="1">
-                <a:latin typeface="Monaco" charset="0"/>
-                <a:ea typeface="Monaco" charset="0"/>
-                <a:cs typeface="Monaco" charset="0"/>
-              </a:rPr>
-              <a:t>np.bincount</a:t>
-            </a:r>
-            <a:r>
-              <a:rPr lang="en-US" sz="1900" dirty="0">
-                <a:latin typeface="Monaco" charset="0"/>
-                <a:ea typeface="Monaco" charset="0"/>
-                <a:cs typeface="Monaco" charset="0"/>
-              </a:rPr>
-              <a:t>(y))</a:t>
-            </a:r>
-          </a:p>
-          <a:p>
-            <a:endParaRPr lang="en-US" dirty="0" smtClean="0"/>
-          </a:p>
-          <a:p>
-            <a:pPr lvl="1"/>
-            <a:endParaRPr lang="en-US" dirty="0" smtClean="0"/>
-          </a:p>
-        </p:txBody>
-      </p:sp>
-    </p:spTree>
-    <p:extLst>
-      <p:ext uri="{BB962C8B-B14F-4D97-AF65-F5344CB8AC3E}">
-        <p14:creationId xmlns:p14="http://schemas.microsoft.com/office/powerpoint/2010/main" val="1134085703"/>
-      </p:ext>
-    </p:extLst>
-  </p:cSld>
-  <p:clrMapOvr>
-    <a:masterClrMapping/>
-  </p:clrMapOvr>
-  <p:timing>
-    <p:tnLst>
-      <p:par>
-        <p:cTn id="1" dur="indefinite" restart="never" nodeType="tmRoot"/>
-      </p:par>
-    </p:tnLst>
-  </p:timing>
-</p:sld>
-</file>
-
-<file path=ppt/slides/slide23.xml><?xml version="1.0" encoding="utf-8"?>
-<p:sld xmlns:a="http://schemas.openxmlformats.org/drawingml/2006/main" xmlns:r="http://schemas.openxmlformats.org/officeDocument/2006/relationships" xmlns:p="http://schemas.openxmlformats.org/presentationml/2006/main">
-  <p:cSld>
-    <p:spTree>
-      <p:nvGrpSpPr>
-        <p:cNvPr id="1" name=""/>
-        <p:cNvGrpSpPr/>
-        <p:nvPr/>
-      </p:nvGrpSpPr>
-      <p:grpSpPr>
-        <a:xfrm>
-          <a:off x="0" y="0"/>
-          <a:ext cx="0" cy="0"/>
-          <a:chOff x="0" y="0"/>
-          <a:chExt cx="0" cy="0"/>
-        </a:xfrm>
-      </p:grpSpPr>
-      <p:sp>
-        <p:nvSpPr>
-          <p:cNvPr id="2" name="Title 1"/>
-          <p:cNvSpPr>
-            <a:spLocks noGrp="1"/>
-          </p:cNvSpPr>
-          <p:nvPr>
-            <p:ph type="title"/>
-          </p:nvPr>
-        </p:nvSpPr>
-        <p:spPr/>
-        <p:txBody>
-          <a:bodyPr/>
-          <a:lstStyle/>
-          <a:p>
-            <a:r>
-              <a:rPr lang="en-US" dirty="0" smtClean="0"/>
-              <a:t>Real-world use-case</a:t>
-            </a:r>
-            <a:endParaRPr lang="en-US" dirty="0"/>
-          </a:p>
-        </p:txBody>
-      </p:sp>
-      <p:sp>
-        <p:nvSpPr>
-          <p:cNvPr id="3" name="Text Placeholder 2"/>
-          <p:cNvSpPr>
-            <a:spLocks noGrp="1"/>
-          </p:cNvSpPr>
-          <p:nvPr>
-            <p:ph type="body" idx="1"/>
-          </p:nvPr>
-        </p:nvSpPr>
-        <p:spPr/>
-        <p:txBody>
-          <a:bodyPr/>
-          <a:lstStyle/>
-          <a:p>
-            <a:endParaRPr lang="en-US"/>
-          </a:p>
-        </p:txBody>
-      </p:sp>
-    </p:spTree>
-    <p:extLst>
-      <p:ext uri="{BB962C8B-B14F-4D97-AF65-F5344CB8AC3E}">
-        <p14:creationId xmlns:p14="http://schemas.microsoft.com/office/powerpoint/2010/main" val="1040918563"/>
-      </p:ext>
-    </p:extLst>
-  </p:cSld>
-  <p:clrMapOvr>
-    <a:masterClrMapping/>
-  </p:clrMapOvr>
-  <p:timing>
-    <p:tnLst>
-      <p:par>
-        <p:cTn id="1" dur="indefinite" restart="never" nodeType="tmRoot"/>
-      </p:par>
-    </p:tnLst>
-  </p:timing>
-</p:sld>
-</file>
-
-<file path=ppt/slides/slide24.xml><?xml version="1.0" encoding="utf-8"?>
-<p:sld xmlns:a="http://schemas.openxmlformats.org/drawingml/2006/main" xmlns:r="http://schemas.openxmlformats.org/officeDocument/2006/relationships" xmlns:p="http://schemas.openxmlformats.org/presentationml/2006/main">
-  <p:cSld>
-    <p:spTree>
-      <p:nvGrpSpPr>
-        <p:cNvPr id="1" name=""/>
-        <p:cNvGrpSpPr/>
-        <p:nvPr/>
-      </p:nvGrpSpPr>
-      <p:grpSpPr>
-        <a:xfrm>
-          <a:off x="0" y="0"/>
-          <a:ext cx="0" cy="0"/>
-          <a:chOff x="0" y="0"/>
-          <a:chExt cx="0" cy="0"/>
-        </a:xfrm>
-      </p:grpSpPr>
-      <p:sp>
-        <p:nvSpPr>
-          <p:cNvPr id="2" name="Title 1"/>
-          <p:cNvSpPr>
-            <a:spLocks noGrp="1"/>
-          </p:cNvSpPr>
-          <p:nvPr>
-            <p:ph type="title"/>
-          </p:nvPr>
-        </p:nvSpPr>
-        <p:spPr/>
-        <p:txBody>
-          <a:bodyPr/>
-          <a:lstStyle/>
-          <a:p>
-            <a:r>
               <a:rPr lang="en-US" dirty="0" smtClean="0"/>
               <a:t>Evaluation dataset</a:t>
             </a:r>
@@ -6375,7 +5848,7 @@
 </p:sld>
 </file>
 
-<file path=ppt/slides/slide25.xml><?xml version="1.0" encoding="utf-8"?>
+<file path=ppt/slides/slide23.xml><?xml version="1.0" encoding="utf-8"?>
 <p:sld xmlns:a="http://schemas.openxmlformats.org/drawingml/2006/main" xmlns:r="http://schemas.openxmlformats.org/officeDocument/2006/relationships" xmlns:p="http://schemas.openxmlformats.org/presentationml/2006/main">
   <p:cSld>
     <p:spTree>
@@ -7105,7 +6578,7 @@
 </p:sld>
 </file>
 
-<file path=ppt/slides/slide26.xml><?xml version="1.0" encoding="utf-8"?>
+<file path=ppt/slides/slide24.xml><?xml version="1.0" encoding="utf-8"?>
 <p:sld xmlns:a="http://schemas.openxmlformats.org/drawingml/2006/main" xmlns:r="http://schemas.openxmlformats.org/officeDocument/2006/relationships" xmlns:p="http://schemas.openxmlformats.org/presentationml/2006/main">
   <p:cSld>
     <p:spTree>
@@ -7328,11 +6801,7 @@
           <a:p>
             <a:r>
               <a:rPr lang="en-US" dirty="0" smtClean="0"/>
-              <a:t>But first </a:t>
-            </a:r>
-            <a:r>
-              <a:rPr lang="is-IS" dirty="0" smtClean="0"/>
-              <a:t>…</a:t>
+              <a:t>Introduction to imbalanced learning</a:t>
             </a:r>
             <a:endParaRPr lang="en-US" dirty="0"/>
           </a:p>
@@ -7355,73 +6824,51 @@
           </a:bodyPr>
           <a:lstStyle/>
           <a:p>
-            <a:pPr lvl="0"/>
-            <a:r>
-              <a:rPr lang="en-US" dirty="0" smtClean="0">
-                <a:solidFill>
-                  <a:prstClr val="black"/>
-                </a:solidFill>
-              </a:rPr>
-              <a:t>..  </a:t>
-            </a:r>
-            <a:r>
-              <a:rPr lang="en-US" dirty="0">
-                <a:solidFill>
-                  <a:prstClr val="black"/>
-                </a:solidFill>
-              </a:rPr>
-              <a:t>t</a:t>
-            </a:r>
-            <a:r>
-              <a:rPr lang="en-US" dirty="0" smtClean="0">
-                <a:solidFill>
-                  <a:prstClr val="black"/>
-                </a:solidFill>
-              </a:rPr>
-              <a:t>he weather.</a:t>
-            </a:r>
-          </a:p>
-          <a:p>
-            <a:pPr lvl="0"/>
-            <a:endParaRPr lang="en-US" dirty="0">
-              <a:solidFill>
-                <a:prstClr val="black"/>
-              </a:solidFill>
-            </a:endParaRPr>
-          </a:p>
-          <a:p>
-            <a:endParaRPr lang="en-US" dirty="0"/>
-          </a:p>
-        </p:txBody>
-      </p:sp>
-      <p:pic>
-        <p:nvPicPr>
-          <p:cNvPr id="4" name="Picture 3"/>
-          <p:cNvPicPr>
-            <a:picLocks noChangeAspect="1"/>
-          </p:cNvPicPr>
-          <p:nvPr/>
-        </p:nvPicPr>
-        <p:blipFill>
-          <a:blip r:embed="rId3"/>
-          <a:stretch>
-            <a:fillRect/>
-          </a:stretch>
-        </p:blipFill>
-        <p:spPr>
-          <a:xfrm>
-            <a:off x="5029200" y="1612757"/>
-            <a:ext cx="6604000" cy="4399248"/>
-          </a:xfrm>
-          <a:prstGeom prst="rect">
-            <a:avLst/>
-          </a:prstGeom>
-        </p:spPr>
-      </p:pic>
+            <a:r>
+              <a:rPr lang="en-US" dirty="0" smtClean="0"/>
+              <a:t>Formal definition of imbalanced learning [1]: ‘</a:t>
+            </a:r>
+            <a:r>
+              <a:rPr lang="is-IS" dirty="0" smtClean="0"/>
+              <a:t>…</a:t>
+            </a:r>
+            <a:r>
+              <a:rPr lang="en-US" dirty="0" smtClean="0"/>
+              <a:t>the </a:t>
+            </a:r>
+            <a:r>
+              <a:rPr lang="en-US" dirty="0"/>
+              <a:t>learning process for data representation and information extraction with severe data distribution skews to develop effective decision boundaries to support the decision-making process</a:t>
+            </a:r>
+            <a:r>
+              <a:rPr lang="en-US" dirty="0" smtClean="0"/>
+              <a:t>.’</a:t>
+            </a:r>
+          </a:p>
+          <a:p>
+            <a:r>
+              <a:rPr lang="en-US" dirty="0" smtClean="0"/>
+              <a:t>Informally, imbalanced learning is the training of machine learning algorithms on datasets where far fewer examples exist of one class than others.</a:t>
+            </a:r>
+          </a:p>
+          <a:p>
+            <a:r>
+              <a:rPr lang="en-US" dirty="0" smtClean="0"/>
+              <a:t>The imbalance ratio is the ratio between classes of each type. It can vary between 100:1 to 10,000:1.</a:t>
+            </a:r>
+          </a:p>
+          <a:p>
+            <a:r>
+              <a:rPr lang="en-US" dirty="0" smtClean="0"/>
+              <a:t>This presentation will focus on imbalanced learning with classification algorithms.</a:t>
+            </a:r>
+          </a:p>
+        </p:txBody>
+      </p:sp>
     </p:spTree>
     <p:extLst>
       <p:ext uri="{BB962C8B-B14F-4D97-AF65-F5344CB8AC3E}">
-        <p14:creationId xmlns:p14="http://schemas.microsoft.com/office/powerpoint/2010/main" val="1488186858"/>
+        <p14:creationId xmlns:p14="http://schemas.microsoft.com/office/powerpoint/2010/main" val="1289007853"/>
       </p:ext>
     </p:extLst>
   </p:cSld>
@@ -7471,12 +6918,20 @@
           <a:lstStyle/>
           <a:p>
             <a:r>
-              <a:rPr lang="en-US" dirty="0" smtClean="0"/>
-              <a:t>But first </a:t>
-            </a:r>
-            <a:r>
-              <a:rPr lang="is-IS" dirty="0" smtClean="0"/>
-              <a:t>…</a:t>
+              <a:rPr lang="en-US" dirty="0"/>
+              <a:t>Introduction to imbalanced </a:t>
+            </a:r>
+            <a:r>
+              <a:rPr lang="en-US" dirty="0" smtClean="0"/>
+              <a:t>learning (</a:t>
+            </a:r>
+            <a:r>
+              <a:rPr lang="en-US" dirty="0" err="1" smtClean="0"/>
+              <a:t>contd</a:t>
+            </a:r>
+            <a:r>
+              <a:rPr lang="en-US" dirty="0" smtClean="0"/>
+              <a:t>)</a:t>
             </a:r>
             <a:endParaRPr lang="en-US" dirty="0"/>
           </a:p>
@@ -7495,96 +6950,80 @@
         <p:spPr/>
         <p:txBody>
           <a:bodyPr>
-            <a:normAutofit/>
+            <a:normAutofit fontScale="92500" lnSpcReduction="10000"/>
           </a:bodyPr>
           <a:lstStyle/>
           <a:p>
-            <a:pPr lvl="0"/>
-            <a:r>
-              <a:rPr lang="en-US" dirty="0" smtClean="0">
-                <a:solidFill>
-                  <a:prstClr val="black"/>
-                </a:solidFill>
-              </a:rPr>
-              <a:t>Helpful bus stop advice:</a:t>
-            </a:r>
+            <a:r>
+              <a:rPr lang="en-US" dirty="0" smtClean="0"/>
+              <a:t>Classification use-cases with imbalanced data</a:t>
+            </a:r>
+            <a:endParaRPr lang="en-US" dirty="0"/>
           </a:p>
           <a:p>
             <a:pPr lvl="1"/>
             <a:r>
-              <a:rPr lang="en-US" dirty="0" smtClean="0">
-                <a:solidFill>
-                  <a:prstClr val="black"/>
-                </a:solidFill>
-              </a:rPr>
-              <a:t>P(“The sun will rise in the East tomorrow”) = 1</a:t>
+              <a:rPr lang="en-US" dirty="0"/>
+              <a:t>Fraud detection</a:t>
             </a:r>
           </a:p>
           <a:p>
             <a:pPr lvl="1"/>
             <a:r>
-              <a:rPr lang="en-US" dirty="0" smtClean="0">
-                <a:solidFill>
-                  <a:prstClr val="black"/>
-                </a:solidFill>
-              </a:rPr>
-              <a:t>P(“It’s going to rain later today”) = 0.1</a:t>
+              <a:rPr lang="en-US" dirty="0"/>
+              <a:t>Anomaly detection</a:t>
             </a:r>
           </a:p>
           <a:p>
             <a:pPr lvl="1"/>
             <a:r>
-              <a:rPr lang="en-US" dirty="0" smtClean="0">
-                <a:solidFill>
-                  <a:prstClr val="black"/>
-                </a:solidFill>
-              </a:rPr>
-              <a:t>P(“There’s a tornado forecast this evening”) = 0.01</a:t>
-            </a:r>
-          </a:p>
-          <a:p>
-            <a:r>
-              <a:rPr lang="en-US" dirty="0" smtClean="0">
-                <a:solidFill>
-                  <a:prstClr val="black"/>
-                </a:solidFill>
-              </a:rPr>
-              <a:t>The value of information is inversely proportional to its probability.</a:t>
-            </a:r>
-          </a:p>
-          <a:p>
-            <a:pPr lvl="0"/>
-            <a:endParaRPr lang="en-US" dirty="0">
-              <a:solidFill>
-                <a:prstClr val="black"/>
-              </a:solidFill>
-            </a:endParaRPr>
-          </a:p>
-          <a:p>
-            <a:pPr lvl="0"/>
-            <a:endParaRPr lang="en-US" dirty="0" smtClean="0">
-              <a:solidFill>
-                <a:prstClr val="black"/>
-              </a:solidFill>
-            </a:endParaRPr>
-          </a:p>
-          <a:p>
-            <a:pPr lvl="0"/>
-            <a:endParaRPr lang="en-US" dirty="0">
-              <a:solidFill>
-                <a:prstClr val="black"/>
-              </a:solidFill>
-            </a:endParaRPr>
-          </a:p>
-          <a:p>
+              <a:rPr lang="en-US" dirty="0"/>
+              <a:t>Cancer </a:t>
+            </a:r>
+            <a:r>
+              <a:rPr lang="en-US" dirty="0" smtClean="0"/>
+              <a:t>detection</a:t>
+            </a:r>
+          </a:p>
+          <a:p>
+            <a:pPr lvl="1"/>
+            <a:r>
+              <a:rPr lang="en-US" dirty="0" smtClean="0"/>
+              <a:t>Predicting credit defaults</a:t>
+            </a:r>
             <a:endParaRPr lang="en-US" dirty="0"/>
+          </a:p>
+          <a:p>
+            <a:r>
+              <a:rPr lang="en-US" dirty="0" smtClean="0"/>
+              <a:t>In imbalanced learning, prediction of the minority class examples is more important than the majority class. </a:t>
+            </a:r>
+          </a:p>
+          <a:p>
+            <a:pPr lvl="1"/>
+            <a:r>
+              <a:rPr lang="en-US" dirty="0" smtClean="0"/>
+              <a:t>Unfortunately the algorithm has far of these fewer minority class examples to learn from.</a:t>
+            </a:r>
+          </a:p>
+          <a:p>
+            <a:r>
+              <a:rPr lang="en-US" dirty="0" smtClean="0"/>
+              <a:t>Standard algorithms focus on reducing the cost of misclassifying all examples, not just minority ones. </a:t>
+            </a:r>
+          </a:p>
+          <a:p>
+            <a:r>
+              <a:rPr lang="en-US" dirty="0" smtClean="0"/>
+              <a:t>In future slides, I’m assuming we’re predicting the minority class (so positive means minority example).</a:t>
+            </a:r>
           </a:p>
         </p:txBody>
       </p:sp>
     </p:spTree>
     <p:extLst>
       <p:ext uri="{BB962C8B-B14F-4D97-AF65-F5344CB8AC3E}">
-        <p14:creationId xmlns:p14="http://schemas.microsoft.com/office/powerpoint/2010/main" val="622227186"/>
+        <p14:creationId xmlns:p14="http://schemas.microsoft.com/office/powerpoint/2010/main" val="568275083"/>
       </p:ext>
     </p:extLst>
   </p:cSld>
@@ -7635,7 +7074,7 @@
           <a:p>
             <a:r>
               <a:rPr lang="en-US" dirty="0" smtClean="0"/>
-              <a:t>Introduction to imbalanced learning</a:t>
+              <a:t>Evaluation Metrics</a:t>
             </a:r>
             <a:endParaRPr lang="en-US" dirty="0"/>
           </a:p>
@@ -7643,66 +7082,27 @@
       </p:sp>
       <p:sp>
         <p:nvSpPr>
-          <p:cNvPr id="3" name="Content Placeholder 2"/>
-          <p:cNvSpPr>
-            <a:spLocks noGrp="1"/>
-          </p:cNvSpPr>
-          <p:nvPr>
-            <p:ph idx="1"/>
-          </p:nvPr>
-        </p:nvSpPr>
-        <p:spPr/>
-        <p:txBody>
-          <a:bodyPr>
-            <a:normAutofit/>
-          </a:bodyPr>
-          <a:lstStyle/>
-          <a:p>
-            <a:r>
-              <a:rPr lang="en-US" dirty="0" smtClean="0"/>
-              <a:t>Formal definition of imbalanced learning [1]: ‘</a:t>
-            </a:r>
-            <a:r>
-              <a:rPr lang="is-IS" dirty="0" smtClean="0"/>
-              <a:t>…</a:t>
-            </a:r>
-            <a:r>
-              <a:rPr lang="en-US" dirty="0" smtClean="0"/>
-              <a:t>the </a:t>
-            </a:r>
-            <a:r>
-              <a:rPr lang="en-US" dirty="0"/>
-              <a:t>learning process for data representation and information extraction with severe data distribution skews to develop effective decision boundaries to support the decision-making process</a:t>
-            </a:r>
-            <a:r>
-              <a:rPr lang="en-US" dirty="0" smtClean="0"/>
-              <a:t>.’</a:t>
-            </a:r>
-          </a:p>
-          <a:p>
-            <a:r>
-              <a:rPr lang="en-US" dirty="0" smtClean="0"/>
-              <a:t>Informally, imbalanced learning is the training of machine learning algorithms on datasets where far fewer examples exist of one class than others.</a:t>
-            </a:r>
-          </a:p>
-          <a:p>
-            <a:r>
-              <a:rPr lang="en-US" dirty="0" smtClean="0"/>
-              <a:t>The imbalance ratio is the ratio between classes of each type. It can vary between 100:1 to 10,000:1.</a:t>
-            </a:r>
-          </a:p>
-          <a:p>
-            <a:r>
-              <a:rPr lang="en-US" dirty="0" smtClean="0"/>
-              <a:t>This presentation will focus on imbalanced learning with classification algorithms.</a:t>
-            </a:r>
+          <p:cNvPr id="3" name="Text Placeholder 2"/>
+          <p:cNvSpPr>
+            <a:spLocks noGrp="1"/>
+          </p:cNvSpPr>
+          <p:nvPr>
+            <p:ph type="body" idx="1"/>
+          </p:nvPr>
+        </p:nvSpPr>
+        <p:spPr/>
+        <p:txBody>
+          <a:bodyPr/>
+          <a:lstStyle/>
+          <a:p>
+            <a:endParaRPr lang="en-US"/>
           </a:p>
         </p:txBody>
       </p:sp>
     </p:spTree>
     <p:extLst>
       <p:ext uri="{BB962C8B-B14F-4D97-AF65-F5344CB8AC3E}">
-        <p14:creationId xmlns:p14="http://schemas.microsoft.com/office/powerpoint/2010/main" val="1289007853"/>
+        <p14:creationId xmlns:p14="http://schemas.microsoft.com/office/powerpoint/2010/main" val="484523421"/>
       </p:ext>
     </p:extLst>
   </p:cSld>
@@ -7752,240 +7152,6 @@
           <a:lstStyle/>
           <a:p>
             <a:r>
-              <a:rPr lang="en-US" dirty="0"/>
-              <a:t>Introduction to imbalanced </a:t>
-            </a:r>
-            <a:r>
-              <a:rPr lang="en-US" dirty="0" smtClean="0"/>
-              <a:t>learning (</a:t>
-            </a:r>
-            <a:r>
-              <a:rPr lang="en-US" dirty="0" err="1" smtClean="0"/>
-              <a:t>contd</a:t>
-            </a:r>
-            <a:r>
-              <a:rPr lang="en-US" dirty="0" smtClean="0"/>
-              <a:t>)</a:t>
-            </a:r>
-            <a:endParaRPr lang="en-US" dirty="0"/>
-          </a:p>
-        </p:txBody>
-      </p:sp>
-      <p:sp>
-        <p:nvSpPr>
-          <p:cNvPr id="3" name="Content Placeholder 2"/>
-          <p:cNvSpPr>
-            <a:spLocks noGrp="1"/>
-          </p:cNvSpPr>
-          <p:nvPr>
-            <p:ph idx="1"/>
-          </p:nvPr>
-        </p:nvSpPr>
-        <p:spPr/>
-        <p:txBody>
-          <a:bodyPr>
-            <a:normAutofit fontScale="92500" lnSpcReduction="10000"/>
-          </a:bodyPr>
-          <a:lstStyle/>
-          <a:p>
-            <a:r>
-              <a:rPr lang="en-US" dirty="0" smtClean="0"/>
-              <a:t>Classification use-cases with imbalanced data</a:t>
-            </a:r>
-            <a:endParaRPr lang="en-US" dirty="0"/>
-          </a:p>
-          <a:p>
-            <a:pPr lvl="1"/>
-            <a:r>
-              <a:rPr lang="en-US" dirty="0"/>
-              <a:t>Fraud detection</a:t>
-            </a:r>
-          </a:p>
-          <a:p>
-            <a:pPr lvl="1"/>
-            <a:r>
-              <a:rPr lang="en-US" dirty="0"/>
-              <a:t>Anomaly detection</a:t>
-            </a:r>
-          </a:p>
-          <a:p>
-            <a:pPr lvl="1"/>
-            <a:r>
-              <a:rPr lang="en-US" dirty="0"/>
-              <a:t>Cancer </a:t>
-            </a:r>
-            <a:r>
-              <a:rPr lang="en-US" dirty="0" smtClean="0"/>
-              <a:t>detection</a:t>
-            </a:r>
-          </a:p>
-          <a:p>
-            <a:pPr lvl="1"/>
-            <a:r>
-              <a:rPr lang="en-US" dirty="0" smtClean="0"/>
-              <a:t>Predicting credit defaults</a:t>
-            </a:r>
-            <a:endParaRPr lang="en-US" dirty="0"/>
-          </a:p>
-          <a:p>
-            <a:r>
-              <a:rPr lang="en-US" dirty="0" smtClean="0"/>
-              <a:t>In imbalanced learning, prediction of the minority class examples is more important than the majority class. </a:t>
-            </a:r>
-          </a:p>
-          <a:p>
-            <a:pPr lvl="1"/>
-            <a:r>
-              <a:rPr lang="en-US" dirty="0" smtClean="0"/>
-              <a:t>Unfortunately the algorithm has far of these fewer minority class examples to learn from.</a:t>
-            </a:r>
-          </a:p>
-          <a:p>
-            <a:r>
-              <a:rPr lang="en-US" dirty="0" smtClean="0"/>
-              <a:t>Standard algorithms focus on reducing the cost of misclassifying all examples, not just minority ones. </a:t>
-            </a:r>
-          </a:p>
-          <a:p>
-            <a:r>
-              <a:rPr lang="en-US" dirty="0" smtClean="0"/>
-              <a:t>In future slides, I’m assuming we’re predicting the minority class (so positive means minority example).</a:t>
-            </a:r>
-          </a:p>
-        </p:txBody>
-      </p:sp>
-    </p:spTree>
-    <p:extLst>
-      <p:ext uri="{BB962C8B-B14F-4D97-AF65-F5344CB8AC3E}">
-        <p14:creationId xmlns:p14="http://schemas.microsoft.com/office/powerpoint/2010/main" val="568275083"/>
-      </p:ext>
-    </p:extLst>
-  </p:cSld>
-  <p:clrMapOvr>
-    <a:masterClrMapping/>
-  </p:clrMapOvr>
-  <p:timing>
-    <p:tnLst>
-      <p:par>
-        <p:cTn id="1" dur="indefinite" restart="never" nodeType="tmRoot"/>
-      </p:par>
-    </p:tnLst>
-  </p:timing>
-</p:sld>
-</file>
-
-<file path=ppt/slides/slide7.xml><?xml version="1.0" encoding="utf-8"?>
-<p:sld xmlns:a="http://schemas.openxmlformats.org/drawingml/2006/main" xmlns:r="http://schemas.openxmlformats.org/officeDocument/2006/relationships" xmlns:p="http://schemas.openxmlformats.org/presentationml/2006/main">
-  <p:cSld>
-    <p:spTree>
-      <p:nvGrpSpPr>
-        <p:cNvPr id="1" name=""/>
-        <p:cNvGrpSpPr/>
-        <p:nvPr/>
-      </p:nvGrpSpPr>
-      <p:grpSpPr>
-        <a:xfrm>
-          <a:off x="0" y="0"/>
-          <a:ext cx="0" cy="0"/>
-          <a:chOff x="0" y="0"/>
-          <a:chExt cx="0" cy="0"/>
-        </a:xfrm>
-      </p:grpSpPr>
-      <p:sp>
-        <p:nvSpPr>
-          <p:cNvPr id="2" name="Title 1"/>
-          <p:cNvSpPr>
-            <a:spLocks noGrp="1"/>
-          </p:cNvSpPr>
-          <p:nvPr>
-            <p:ph type="title"/>
-          </p:nvPr>
-        </p:nvSpPr>
-        <p:spPr/>
-        <p:txBody>
-          <a:bodyPr/>
-          <a:lstStyle/>
-          <a:p>
-            <a:r>
-              <a:rPr lang="en-US" dirty="0" smtClean="0"/>
-              <a:t>Evaluation Metrics</a:t>
-            </a:r>
-            <a:endParaRPr lang="en-US" dirty="0"/>
-          </a:p>
-        </p:txBody>
-      </p:sp>
-      <p:sp>
-        <p:nvSpPr>
-          <p:cNvPr id="3" name="Text Placeholder 2"/>
-          <p:cNvSpPr>
-            <a:spLocks noGrp="1"/>
-          </p:cNvSpPr>
-          <p:nvPr>
-            <p:ph type="body" idx="1"/>
-          </p:nvPr>
-        </p:nvSpPr>
-        <p:spPr/>
-        <p:txBody>
-          <a:bodyPr/>
-          <a:lstStyle/>
-          <a:p>
-            <a:endParaRPr lang="en-US"/>
-          </a:p>
-        </p:txBody>
-      </p:sp>
-    </p:spTree>
-    <p:extLst>
-      <p:ext uri="{BB962C8B-B14F-4D97-AF65-F5344CB8AC3E}">
-        <p14:creationId xmlns:p14="http://schemas.microsoft.com/office/powerpoint/2010/main" val="484523421"/>
-      </p:ext>
-    </p:extLst>
-  </p:cSld>
-  <p:clrMapOvr>
-    <a:masterClrMapping/>
-  </p:clrMapOvr>
-  <p:timing>
-    <p:tnLst>
-      <p:par>
-        <p:cTn id="1" dur="indefinite" restart="never" nodeType="tmRoot"/>
-      </p:par>
-    </p:tnLst>
-  </p:timing>
-</p:sld>
-</file>
-
-<file path=ppt/slides/slide8.xml><?xml version="1.0" encoding="utf-8"?>
-<p:sld xmlns:a="http://schemas.openxmlformats.org/drawingml/2006/main" xmlns:r="http://schemas.openxmlformats.org/officeDocument/2006/relationships" xmlns:p="http://schemas.openxmlformats.org/presentationml/2006/main">
-  <p:cSld>
-    <p:spTree>
-      <p:nvGrpSpPr>
-        <p:cNvPr id="1" name=""/>
-        <p:cNvGrpSpPr/>
-        <p:nvPr/>
-      </p:nvGrpSpPr>
-      <p:grpSpPr>
-        <a:xfrm>
-          <a:off x="0" y="0"/>
-          <a:ext cx="0" cy="0"/>
-          <a:chOff x="0" y="0"/>
-          <a:chExt cx="0" cy="0"/>
-        </a:xfrm>
-      </p:grpSpPr>
-      <p:sp>
-        <p:nvSpPr>
-          <p:cNvPr id="2" name="Title 1"/>
-          <p:cNvSpPr>
-            <a:spLocks noGrp="1"/>
-          </p:cNvSpPr>
-          <p:nvPr>
-            <p:ph type="title"/>
-          </p:nvPr>
-        </p:nvSpPr>
-        <p:spPr/>
-        <p:txBody>
-          <a:bodyPr/>
-          <a:lstStyle/>
-          <a:p>
-            <a:r>
               <a:rPr lang="en-US" dirty="0" smtClean="0"/>
               <a:t>Evaluation of imbalanced learning</a:t>
             </a:r>
@@ -8092,7 +7258,7 @@
 </p:sld>
 </file>
 
-<file path=ppt/slides/slide9.xml><?xml version="1.0" encoding="utf-8"?>
+<file path=ppt/slides/slide7.xml><?xml version="1.0" encoding="utf-8"?>
 <p:sld xmlns:a="http://schemas.openxmlformats.org/drawingml/2006/main" xmlns:r="http://schemas.openxmlformats.org/officeDocument/2006/relationships" xmlns:p="http://schemas.openxmlformats.org/presentationml/2006/main">
   <p:cSld>
     <p:spTree>
@@ -8550,6 +7716,389 @@
     <p:extLst>
       <p:ext uri="{BB962C8B-B14F-4D97-AF65-F5344CB8AC3E}">
         <p14:creationId xmlns:p14="http://schemas.microsoft.com/office/powerpoint/2010/main" val="1983515649"/>
+      </p:ext>
+    </p:extLst>
+  </p:cSld>
+  <p:clrMapOvr>
+    <a:masterClrMapping/>
+  </p:clrMapOvr>
+  <p:timing>
+    <p:tnLst>
+      <p:par>
+        <p:cTn id="1" dur="indefinite" restart="never" nodeType="tmRoot"/>
+      </p:par>
+    </p:tnLst>
+  </p:timing>
+</p:sld>
+</file>
+
+<file path=ppt/slides/slide8.xml><?xml version="1.0" encoding="utf-8"?>
+<p:sld xmlns:a="http://schemas.openxmlformats.org/drawingml/2006/main" xmlns:r="http://schemas.openxmlformats.org/officeDocument/2006/relationships" xmlns:p="http://schemas.openxmlformats.org/presentationml/2006/main">
+  <p:cSld>
+    <p:spTree>
+      <p:nvGrpSpPr>
+        <p:cNvPr id="1" name=""/>
+        <p:cNvGrpSpPr/>
+        <p:nvPr/>
+      </p:nvGrpSpPr>
+      <p:grpSpPr>
+        <a:xfrm>
+          <a:off x="0" y="0"/>
+          <a:ext cx="0" cy="0"/>
+          <a:chOff x="0" y="0"/>
+          <a:chExt cx="0" cy="0"/>
+        </a:xfrm>
+      </p:grpSpPr>
+      <p:sp>
+        <p:nvSpPr>
+          <p:cNvPr id="2" name="Title 1"/>
+          <p:cNvSpPr>
+            <a:spLocks noGrp="1"/>
+          </p:cNvSpPr>
+          <p:nvPr>
+            <p:ph type="title"/>
+          </p:nvPr>
+        </p:nvSpPr>
+        <p:spPr/>
+        <p:txBody>
+          <a:bodyPr/>
+          <a:lstStyle/>
+          <a:p>
+            <a:r>
+              <a:rPr lang="en-US" dirty="0" smtClean="0"/>
+              <a:t>Area under Roc Curve</a:t>
+            </a:r>
+            <a:endParaRPr lang="en-US" dirty="0"/>
+          </a:p>
+        </p:txBody>
+      </p:sp>
+      <p:sp>
+        <p:nvSpPr>
+          <p:cNvPr id="3" name="Content Placeholder 2"/>
+          <p:cNvSpPr>
+            <a:spLocks noGrp="1"/>
+          </p:cNvSpPr>
+          <p:nvPr>
+            <p:ph idx="1"/>
+          </p:nvPr>
+        </p:nvSpPr>
+        <p:spPr>
+          <a:xfrm>
+            <a:off x="838200" y="1447800"/>
+            <a:ext cx="6824795" cy="4724400"/>
+          </a:xfrm>
+        </p:spPr>
+        <p:txBody>
+          <a:bodyPr>
+            <a:normAutofit fontScale="92500" lnSpcReduction="10000"/>
+          </a:bodyPr>
+          <a:lstStyle/>
+          <a:p>
+            <a:r>
+              <a:rPr lang="en-US" dirty="0"/>
+              <a:t>The classification algorithm outputs a probability of the example being a positive case (between 0 and 1).</a:t>
+            </a:r>
+          </a:p>
+          <a:p>
+            <a:r>
+              <a:rPr lang="en-US" dirty="0" smtClean="0"/>
+              <a:t>This probability is converted into a positive/negative by applying a decision threshold.</a:t>
+            </a:r>
+          </a:p>
+          <a:p>
+            <a:r>
+              <a:rPr lang="en-US" dirty="0" smtClean="0"/>
+              <a:t>The ROC Curve shows how the FPR and TPR vary as this threshold is varied from 0 (top right) to 1 (bottom left).</a:t>
+            </a:r>
+          </a:p>
+          <a:p>
+            <a:r>
+              <a:rPr lang="en-US" dirty="0" smtClean="0"/>
+              <a:t>The area under the curve (AUC) is independent of the threshold, and shows how well the model is performing.</a:t>
+            </a:r>
+          </a:p>
+        </p:txBody>
+      </p:sp>
+      <p:pic>
+        <p:nvPicPr>
+          <p:cNvPr id="4" name="Picture 3"/>
+          <p:cNvPicPr>
+            <a:picLocks noChangeAspect="1"/>
+          </p:cNvPicPr>
+          <p:nvPr/>
+        </p:nvPicPr>
+        <p:blipFill>
+          <a:blip r:embed="rId2"/>
+          <a:stretch>
+            <a:fillRect/>
+          </a:stretch>
+        </p:blipFill>
+        <p:spPr>
+          <a:xfrm>
+            <a:off x="7545519" y="1295400"/>
+            <a:ext cx="4008490" cy="3694782"/>
+          </a:xfrm>
+          <a:prstGeom prst="rect">
+            <a:avLst/>
+          </a:prstGeom>
+        </p:spPr>
+      </p:pic>
+      <p:sp>
+        <p:nvSpPr>
+          <p:cNvPr id="7" name="TextBox 6"/>
+          <p:cNvSpPr txBox="1"/>
+          <p:nvPr/>
+        </p:nvSpPr>
+        <p:spPr>
+          <a:xfrm>
+            <a:off x="7955280" y="5152742"/>
+            <a:ext cx="3587843" cy="369332"/>
+          </a:xfrm>
+          <a:prstGeom prst="rect">
+            <a:avLst/>
+          </a:prstGeom>
+          <a:noFill/>
+        </p:spPr>
+        <p:txBody>
+          <a:bodyPr wrap="square" rtlCol="0">
+            <a:spAutoFit/>
+          </a:bodyPr>
+          <a:lstStyle/>
+          <a:p>
+            <a:r>
+              <a:rPr lang="en-US" i="1" dirty="0" smtClean="0"/>
+              <a:t>Image source[3]</a:t>
+            </a:r>
+            <a:endParaRPr lang="en-US" i="1" dirty="0"/>
+          </a:p>
+        </p:txBody>
+      </p:sp>
+    </p:spTree>
+    <p:extLst>
+      <p:ext uri="{BB962C8B-B14F-4D97-AF65-F5344CB8AC3E}">
+        <p14:creationId xmlns:p14="http://schemas.microsoft.com/office/powerpoint/2010/main" val="184925121"/>
+      </p:ext>
+    </p:extLst>
+  </p:cSld>
+  <p:clrMapOvr>
+    <a:masterClrMapping/>
+  </p:clrMapOvr>
+  <p:timing>
+    <p:tnLst>
+      <p:par>
+        <p:cTn id="1" dur="indefinite" restart="never" nodeType="tmRoot"/>
+      </p:par>
+    </p:tnLst>
+  </p:timing>
+</p:sld>
+</file>
+
+<file path=ppt/slides/slide9.xml><?xml version="1.0" encoding="utf-8"?>
+<p:sld xmlns:a="http://schemas.openxmlformats.org/drawingml/2006/main" xmlns:r="http://schemas.openxmlformats.org/officeDocument/2006/relationships" xmlns:p="http://schemas.openxmlformats.org/presentationml/2006/main">
+  <p:cSld>
+    <p:spTree>
+      <p:nvGrpSpPr>
+        <p:cNvPr id="1" name=""/>
+        <p:cNvGrpSpPr/>
+        <p:nvPr/>
+      </p:nvGrpSpPr>
+      <p:grpSpPr>
+        <a:xfrm>
+          <a:off x="0" y="0"/>
+          <a:ext cx="0" cy="0"/>
+          <a:chOff x="0" y="0"/>
+          <a:chExt cx="0" cy="0"/>
+        </a:xfrm>
+      </p:grpSpPr>
+      <p:sp>
+        <p:nvSpPr>
+          <p:cNvPr id="2" name="Title 1"/>
+          <p:cNvSpPr>
+            <a:spLocks noGrp="1"/>
+          </p:cNvSpPr>
+          <p:nvPr>
+            <p:ph type="title"/>
+          </p:nvPr>
+        </p:nvSpPr>
+        <p:spPr/>
+        <p:txBody>
+          <a:bodyPr/>
+          <a:lstStyle/>
+          <a:p>
+            <a:r>
+              <a:rPr lang="en-US" dirty="0" smtClean="0"/>
+              <a:t>ROC Curves and decision thresholds</a:t>
+            </a:r>
+            <a:endParaRPr lang="en-US" dirty="0"/>
+          </a:p>
+        </p:txBody>
+      </p:sp>
+      <p:sp>
+        <p:nvSpPr>
+          <p:cNvPr id="3" name="Content Placeholder 2"/>
+          <p:cNvSpPr>
+            <a:spLocks noGrp="1"/>
+          </p:cNvSpPr>
+          <p:nvPr>
+            <p:ph idx="1"/>
+          </p:nvPr>
+        </p:nvSpPr>
+        <p:spPr>
+          <a:xfrm>
+            <a:off x="838200" y="1447800"/>
+            <a:ext cx="6705600" cy="4486505"/>
+          </a:xfrm>
+        </p:spPr>
+        <p:txBody>
+          <a:bodyPr>
+            <a:normAutofit/>
+          </a:bodyPr>
+          <a:lstStyle/>
+          <a:p>
+            <a:r>
+              <a:rPr lang="en-US" dirty="0" smtClean="0"/>
+              <a:t>The decision threshold can be adjusted based on the relative costs of FPs and TPs.</a:t>
+            </a:r>
+          </a:p>
+          <a:p>
+            <a:r>
+              <a:rPr lang="en-US" dirty="0" smtClean="0"/>
+              <a:t>For example in cancer detection:</a:t>
+            </a:r>
+          </a:p>
+          <a:p>
+            <a:pPr lvl="1"/>
+            <a:r>
+              <a:rPr lang="en-US" dirty="0" smtClean="0"/>
+              <a:t>False Positive: The patient has a further un-necessary scan to confirm the incorrect diagnosis. </a:t>
+            </a:r>
+          </a:p>
+          <a:p>
+            <a:pPr lvl="1"/>
+            <a:r>
+              <a:rPr lang="en-US" dirty="0" smtClean="0"/>
+              <a:t>True Positive: Cancer is correctly diagnosed.</a:t>
+            </a:r>
+          </a:p>
+          <a:p>
+            <a:r>
+              <a:rPr lang="en-US" dirty="0" smtClean="0"/>
+              <a:t>There is a good case for decreasing the threshold of the model.</a:t>
+            </a:r>
+          </a:p>
+          <a:p>
+            <a:pPr lvl="1"/>
+            <a:r>
+              <a:rPr lang="en-US" dirty="0" smtClean="0"/>
+              <a:t>This will increase the TPR, with a small increase in FPR.</a:t>
+            </a:r>
+          </a:p>
+        </p:txBody>
+      </p:sp>
+      <p:pic>
+        <p:nvPicPr>
+          <p:cNvPr id="6" name="Picture 5"/>
+          <p:cNvPicPr>
+            <a:picLocks noChangeAspect="1"/>
+          </p:cNvPicPr>
+          <p:nvPr/>
+        </p:nvPicPr>
+        <p:blipFill>
+          <a:blip r:embed="rId2"/>
+          <a:stretch>
+            <a:fillRect/>
+          </a:stretch>
+        </p:blipFill>
+        <p:spPr>
+          <a:xfrm>
+            <a:off x="7538357" y="1295400"/>
+            <a:ext cx="4008490" cy="3694782"/>
+          </a:xfrm>
+          <a:prstGeom prst="rect">
+            <a:avLst/>
+          </a:prstGeom>
+        </p:spPr>
+      </p:pic>
+      <p:sp>
+        <p:nvSpPr>
+          <p:cNvPr id="8" name="TextBox 7"/>
+          <p:cNvSpPr txBox="1"/>
+          <p:nvPr/>
+        </p:nvSpPr>
+        <p:spPr>
+          <a:xfrm>
+            <a:off x="7959004" y="5105400"/>
+            <a:ext cx="3587843" cy="369332"/>
+          </a:xfrm>
+          <a:prstGeom prst="rect">
+            <a:avLst/>
+          </a:prstGeom>
+          <a:noFill/>
+        </p:spPr>
+        <p:txBody>
+          <a:bodyPr wrap="square" rtlCol="0">
+            <a:spAutoFit/>
+          </a:bodyPr>
+          <a:lstStyle/>
+          <a:p>
+            <a:r>
+              <a:rPr lang="en-US" i="1" dirty="0" smtClean="0"/>
+              <a:t>Image source[3]</a:t>
+            </a:r>
+            <a:endParaRPr lang="en-US" i="1" dirty="0"/>
+          </a:p>
+        </p:txBody>
+      </p:sp>
+      <p:sp>
+        <p:nvSpPr>
+          <p:cNvPr id="5" name="Oval 4"/>
+          <p:cNvSpPr/>
+          <p:nvPr/>
+        </p:nvSpPr>
+        <p:spPr>
+          <a:xfrm>
+            <a:off x="8534400" y="1678942"/>
+            <a:ext cx="457200" cy="381000"/>
+          </a:xfrm>
+          <a:prstGeom prst="ellipse">
+            <a:avLst/>
+          </a:prstGeom>
+          <a:noFill/>
+          <a:ln w="57150">
+            <a:solidFill>
+              <a:schemeClr val="tx1"/>
+            </a:solidFill>
+          </a:ln>
+        </p:spPr>
+        <p:style>
+          <a:lnRef idx="2">
+            <a:schemeClr val="accent1">
+              <a:shade val="50000"/>
+            </a:schemeClr>
+          </a:lnRef>
+          <a:fillRef idx="1">
+            <a:schemeClr val="accent1"/>
+          </a:fillRef>
+          <a:effectRef idx="0">
+            <a:schemeClr val="accent1"/>
+          </a:effectRef>
+          <a:fontRef idx="minor">
+            <a:schemeClr val="lt1"/>
+          </a:fontRef>
+        </p:style>
+        <p:txBody>
+          <a:bodyPr rtlCol="0" anchor="ctr"/>
+          <a:lstStyle/>
+          <a:p>
+            <a:pPr algn="ctr"/>
+            <a:endParaRPr lang="en-US"/>
+          </a:p>
+        </p:txBody>
+      </p:sp>
+    </p:spTree>
+    <p:extLst>
+      <p:ext uri="{BB962C8B-B14F-4D97-AF65-F5344CB8AC3E}">
+        <p14:creationId xmlns:p14="http://schemas.microsoft.com/office/powerpoint/2010/main" val="868979994"/>
       </p:ext>
     </p:extLst>
   </p:cSld>

</xml_diff>

<commit_message>
Finishing off notebooks and code.
</commit_message>
<xml_diff>
--- a/acm_imbalance_datasets.pptx
+++ b/acm_imbalance_datasets.pptx
@@ -2,10 +2,10 @@
 <file path=ppt/presentation.xml><?xml version="1.0" encoding="utf-8"?>
 <p:presentation xmlns:a="http://schemas.openxmlformats.org/drawingml/2006/main" xmlns:r="http://schemas.openxmlformats.org/officeDocument/2006/relationships" xmlns:p="http://schemas.openxmlformats.org/presentationml/2006/main" saveSubsetFonts="1" autoCompressPictures="0">
   <p:sldMasterIdLst>
-    <p:sldMasterId id="2147483941" r:id="rId1"/>
+    <p:sldMasterId id="2147484061" r:id="rId1"/>
   </p:sldMasterIdLst>
   <p:notesMasterIdLst>
-    <p:notesMasterId r:id="rId26"/>
+    <p:notesMasterId r:id="rId31"/>
   </p:notesMasterIdLst>
   <p:sldIdLst>
     <p:sldId id="256" r:id="rId2"/>
@@ -25,13 +25,18 @@
     <p:sldId id="292" r:id="rId16"/>
     <p:sldId id="276" r:id="rId17"/>
     <p:sldId id="291" r:id="rId18"/>
-    <p:sldId id="278" r:id="rId19"/>
-    <p:sldId id="280" r:id="rId20"/>
-    <p:sldId id="288" r:id="rId21"/>
-    <p:sldId id="298" r:id="rId22"/>
-    <p:sldId id="271" r:id="rId23"/>
-    <p:sldId id="268" r:id="rId24"/>
-    <p:sldId id="266" r:id="rId25"/>
+    <p:sldId id="301" r:id="rId19"/>
+    <p:sldId id="278" r:id="rId20"/>
+    <p:sldId id="280" r:id="rId21"/>
+    <p:sldId id="288" r:id="rId22"/>
+    <p:sldId id="298" r:id="rId23"/>
+    <p:sldId id="271" r:id="rId24"/>
+    <p:sldId id="268" r:id="rId25"/>
+    <p:sldId id="303" r:id="rId26"/>
+    <p:sldId id="302" r:id="rId27"/>
+    <p:sldId id="299" r:id="rId28"/>
+    <p:sldId id="300" r:id="rId29"/>
+    <p:sldId id="266" r:id="rId30"/>
   </p:sldIdLst>
   <p:sldSz cx="12192000" cy="6858000"/>
   <p:notesSz cx="6858000" cy="9144000"/>
@@ -220,7 +225,7 @@
           <a:p>
             <a:fld id="{5202FC89-0EB0-E247-89D6-76A543D357C4}" type="datetimeFigureOut">
               <a:rPr lang="en-US" smtClean="0"/>
-              <a:t>4/26/16</a:t>
+              <a:t>4/27/16</a:t>
             </a:fld>
             <a:endParaRPr lang="en-US"/>
           </a:p>
@@ -871,7 +876,7 @@
           <a:p>
             <a:fld id="{270A4897-C52A-6A44-A2E1-EC1BCB248FD2}" type="datetimeFigureOut">
               <a:rPr lang="en-US" smtClean="0"/>
-              <a:t>4/26/16</a:t>
+              <a:t>4/27/16</a:t>
             </a:fld>
             <a:endParaRPr lang="en-US"/>
           </a:p>
@@ -922,13 +927,18 @@
     </p:spTree>
     <p:extLst>
       <p:ext uri="{BB962C8B-B14F-4D97-AF65-F5344CB8AC3E}">
-        <p14:creationId xmlns:p14="http://schemas.microsoft.com/office/powerpoint/2010/main" val="1271113868"/>
+        <p14:creationId xmlns:p14="http://schemas.microsoft.com/office/powerpoint/2010/main" val="262693643"/>
       </p:ext>
     </p:extLst>
   </p:cSld>
   <p:clrMapOvr>
     <a:masterClrMapping/>
   </p:clrMapOvr>
+  <p:extLst>
+    <p:ext uri="{DCECCB84-F9BA-43D5-87BE-67443E8EF086}">
+      <p15:sldGuideLst xmlns:p15="http://schemas.microsoft.com/office/powerpoint/2012/main"/>
+    </p:ext>
+  </p:extLst>
 </p:sldLayout>
 </file>
 
@@ -1041,7 +1051,7 @@
           <a:p>
             <a:fld id="{270A4897-C52A-6A44-A2E1-EC1BCB248FD2}" type="datetimeFigureOut">
               <a:rPr lang="en-US" smtClean="0"/>
-              <a:t>4/26/16</a:t>
+              <a:t>4/27/16</a:t>
             </a:fld>
             <a:endParaRPr lang="en-US"/>
           </a:p>
@@ -1092,7 +1102,7 @@
     </p:spTree>
     <p:extLst>
       <p:ext uri="{BB962C8B-B14F-4D97-AF65-F5344CB8AC3E}">
-        <p14:creationId xmlns:p14="http://schemas.microsoft.com/office/powerpoint/2010/main" val="2021799757"/>
+        <p14:creationId xmlns:p14="http://schemas.microsoft.com/office/powerpoint/2010/main" val="1129632480"/>
       </p:ext>
     </p:extLst>
   </p:cSld>
@@ -1221,7 +1231,7 @@
           <a:p>
             <a:fld id="{270A4897-C52A-6A44-A2E1-EC1BCB248FD2}" type="datetimeFigureOut">
               <a:rPr lang="en-US" smtClean="0"/>
-              <a:t>4/26/16</a:t>
+              <a:t>4/27/16</a:t>
             </a:fld>
             <a:endParaRPr lang="en-US"/>
           </a:p>
@@ -1272,13 +1282,18 @@
     </p:spTree>
     <p:extLst>
       <p:ext uri="{BB962C8B-B14F-4D97-AF65-F5344CB8AC3E}">
-        <p14:creationId xmlns:p14="http://schemas.microsoft.com/office/powerpoint/2010/main" val="754769418"/>
+        <p14:creationId xmlns:p14="http://schemas.microsoft.com/office/powerpoint/2010/main" val="1977651880"/>
       </p:ext>
     </p:extLst>
   </p:cSld>
   <p:clrMapOvr>
     <a:masterClrMapping/>
   </p:clrMapOvr>
+  <p:extLst>
+    <p:ext uri="{DCECCB84-F9BA-43D5-87BE-67443E8EF086}">
+      <p15:sldGuideLst xmlns:p15="http://schemas.microsoft.com/office/powerpoint/2012/main"/>
+    </p:ext>
+  </p:extLst>
 </p:sldLayout>
 </file>
 
@@ -1309,7 +1324,12 @@
             <p:ph type="title"/>
           </p:nvPr>
         </p:nvSpPr>
-        <p:spPr/>
+        <p:spPr>
+          <a:xfrm>
+            <a:off x="838200" y="365125"/>
+            <a:ext cx="10515600" cy="1006475"/>
+          </a:xfrm>
+        </p:spPr>
         <p:txBody>
           <a:bodyPr/>
           <a:lstStyle/>
@@ -1332,7 +1352,12 @@
             <p:ph idx="1"/>
           </p:nvPr>
         </p:nvSpPr>
-        <p:spPr/>
+        <p:spPr>
+          <a:xfrm>
+            <a:off x="838200" y="1600200"/>
+            <a:ext cx="10515600" cy="4576763"/>
+          </a:xfrm>
+        </p:spPr>
         <p:txBody>
           <a:bodyPr/>
           <a:lstStyle/>
@@ -1391,7 +1416,7 @@
           <a:p>
             <a:fld id="{270A4897-C52A-6A44-A2E1-EC1BCB248FD2}" type="datetimeFigureOut">
               <a:rPr lang="en-US" smtClean="0"/>
-              <a:t>4/26/16</a:t>
+              <a:t>4/27/16</a:t>
             </a:fld>
             <a:endParaRPr lang="en-US"/>
           </a:p>
@@ -1442,7 +1467,7 @@
     </p:spTree>
     <p:extLst>
       <p:ext uri="{BB962C8B-B14F-4D97-AF65-F5344CB8AC3E}">
-        <p14:creationId xmlns:p14="http://schemas.microsoft.com/office/powerpoint/2010/main" val="443459120"/>
+        <p14:creationId xmlns:p14="http://schemas.microsoft.com/office/powerpoint/2010/main" val="2013163316"/>
       </p:ext>
     </p:extLst>
   </p:cSld>
@@ -1637,7 +1662,7 @@
           <a:p>
             <a:fld id="{270A4897-C52A-6A44-A2E1-EC1BCB248FD2}" type="datetimeFigureOut">
               <a:rPr lang="en-US" smtClean="0"/>
-              <a:t>4/26/16</a:t>
+              <a:t>4/27/16</a:t>
             </a:fld>
             <a:endParaRPr lang="en-US"/>
           </a:p>
@@ -1688,13 +1713,18 @@
     </p:spTree>
     <p:extLst>
       <p:ext uri="{BB962C8B-B14F-4D97-AF65-F5344CB8AC3E}">
-        <p14:creationId xmlns:p14="http://schemas.microsoft.com/office/powerpoint/2010/main" val="1449174750"/>
+        <p14:creationId xmlns:p14="http://schemas.microsoft.com/office/powerpoint/2010/main" val="1630993527"/>
       </p:ext>
     </p:extLst>
   </p:cSld>
   <p:clrMapOvr>
     <a:masterClrMapping/>
   </p:clrMapOvr>
+  <p:extLst>
+    <p:ext uri="{DCECCB84-F9BA-43D5-87BE-67443E8EF086}">
+      <p15:sldGuideLst xmlns:p15="http://schemas.microsoft.com/office/powerpoint/2012/main"/>
+    </p:ext>
+  </p:extLst>
 </p:sldLayout>
 </file>
 
@@ -1869,7 +1899,7 @@
           <a:p>
             <a:fld id="{270A4897-C52A-6A44-A2E1-EC1BCB248FD2}" type="datetimeFigureOut">
               <a:rPr lang="en-US" smtClean="0"/>
-              <a:t>4/26/16</a:t>
+              <a:t>4/27/16</a:t>
             </a:fld>
             <a:endParaRPr lang="en-US"/>
           </a:p>
@@ -1920,7 +1950,7 @@
     </p:spTree>
     <p:extLst>
       <p:ext uri="{BB962C8B-B14F-4D97-AF65-F5344CB8AC3E}">
-        <p14:creationId xmlns:p14="http://schemas.microsoft.com/office/powerpoint/2010/main" val="1667982623"/>
+        <p14:creationId xmlns:p14="http://schemas.microsoft.com/office/powerpoint/2010/main" val="1626937981"/>
       </p:ext>
     </p:extLst>
   </p:cSld>
@@ -2236,7 +2266,7 @@
           <a:p>
             <a:fld id="{270A4897-C52A-6A44-A2E1-EC1BCB248FD2}" type="datetimeFigureOut">
               <a:rPr lang="en-US" smtClean="0"/>
-              <a:t>4/26/16</a:t>
+              <a:t>4/27/16</a:t>
             </a:fld>
             <a:endParaRPr lang="en-US"/>
           </a:p>
@@ -2287,7 +2317,7 @@
     </p:spTree>
     <p:extLst>
       <p:ext uri="{BB962C8B-B14F-4D97-AF65-F5344CB8AC3E}">
-        <p14:creationId xmlns:p14="http://schemas.microsoft.com/office/powerpoint/2010/main" val="532416823"/>
+        <p14:creationId xmlns:p14="http://schemas.microsoft.com/office/powerpoint/2010/main" val="37369416"/>
       </p:ext>
     </p:extLst>
   </p:cSld>
@@ -2354,7 +2384,7 @@
           <a:p>
             <a:fld id="{270A4897-C52A-6A44-A2E1-EC1BCB248FD2}" type="datetimeFigureOut">
               <a:rPr lang="en-US" smtClean="0"/>
-              <a:t>4/26/16</a:t>
+              <a:t>4/27/16</a:t>
             </a:fld>
             <a:endParaRPr lang="en-US"/>
           </a:p>
@@ -2405,7 +2435,7 @@
     </p:spTree>
     <p:extLst>
       <p:ext uri="{BB962C8B-B14F-4D97-AF65-F5344CB8AC3E}">
-        <p14:creationId xmlns:p14="http://schemas.microsoft.com/office/powerpoint/2010/main" val="1912670759"/>
+        <p14:creationId xmlns:p14="http://schemas.microsoft.com/office/powerpoint/2010/main" val="1002549788"/>
       </p:ext>
     </p:extLst>
   </p:cSld>
@@ -2449,7 +2479,7 @@
           <a:p>
             <a:fld id="{270A4897-C52A-6A44-A2E1-EC1BCB248FD2}" type="datetimeFigureOut">
               <a:rPr lang="en-US" smtClean="0"/>
-              <a:t>4/26/16</a:t>
+              <a:t>4/27/16</a:t>
             </a:fld>
             <a:endParaRPr lang="en-US"/>
           </a:p>
@@ -2500,7 +2530,7 @@
     </p:spTree>
     <p:extLst>
       <p:ext uri="{BB962C8B-B14F-4D97-AF65-F5344CB8AC3E}">
-        <p14:creationId xmlns:p14="http://schemas.microsoft.com/office/powerpoint/2010/main" val="574734570"/>
+        <p14:creationId xmlns:p14="http://schemas.microsoft.com/office/powerpoint/2010/main" val="697592554"/>
       </p:ext>
     </p:extLst>
   </p:cSld>
@@ -2726,7 +2756,7 @@
           <a:p>
             <a:fld id="{270A4897-C52A-6A44-A2E1-EC1BCB248FD2}" type="datetimeFigureOut">
               <a:rPr lang="en-US" smtClean="0"/>
-              <a:t>4/26/16</a:t>
+              <a:t>4/27/16</a:t>
             </a:fld>
             <a:endParaRPr lang="en-US"/>
           </a:p>
@@ -2777,7 +2807,7 @@
     </p:spTree>
     <p:extLst>
       <p:ext uri="{BB962C8B-B14F-4D97-AF65-F5344CB8AC3E}">
-        <p14:creationId xmlns:p14="http://schemas.microsoft.com/office/powerpoint/2010/main" val="182473784"/>
+        <p14:creationId xmlns:p14="http://schemas.microsoft.com/office/powerpoint/2010/main" val="1324826105"/>
       </p:ext>
     </p:extLst>
   </p:cSld>
@@ -2979,7 +3009,7 @@
           <a:p>
             <a:fld id="{270A4897-C52A-6A44-A2E1-EC1BCB248FD2}" type="datetimeFigureOut">
               <a:rPr lang="en-US" smtClean="0"/>
-              <a:t>4/26/16</a:t>
+              <a:t>4/27/16</a:t>
             </a:fld>
             <a:endParaRPr lang="en-US"/>
           </a:p>
@@ -3030,7 +3060,7 @@
     </p:spTree>
     <p:extLst>
       <p:ext uri="{BB962C8B-B14F-4D97-AF65-F5344CB8AC3E}">
-        <p14:creationId xmlns:p14="http://schemas.microsoft.com/office/powerpoint/2010/main" val="230239772"/>
+        <p14:creationId xmlns:p14="http://schemas.microsoft.com/office/powerpoint/2010/main" val="1241894639"/>
       </p:ext>
     </p:extLst>
   </p:cSld>
@@ -3075,7 +3105,7 @@
         <p:spPr>
           <a:xfrm>
             <a:off x="838200" y="365125"/>
-            <a:ext cx="10515600" cy="930275"/>
+            <a:ext cx="10515600" cy="1325563"/>
           </a:xfrm>
           <a:prstGeom prst="rect">
             <a:avLst/>
@@ -3107,8 +3137,8 @@
         </p:nvSpPr>
         <p:spPr>
           <a:xfrm>
-            <a:off x="838200" y="1447800"/>
-            <a:ext cx="10515600" cy="4729163"/>
+            <a:off x="838200" y="1825625"/>
+            <a:ext cx="10515600" cy="4351338"/>
           </a:xfrm>
           <a:prstGeom prst="rect">
             <a:avLst/>
@@ -3192,7 +3222,7 @@
           <a:p>
             <a:fld id="{270A4897-C52A-6A44-A2E1-EC1BCB248FD2}" type="datetimeFigureOut">
               <a:rPr lang="en-US" smtClean="0"/>
-              <a:t>4/26/16</a:t>
+              <a:t>4/27/16</a:t>
             </a:fld>
             <a:endParaRPr lang="en-US"/>
           </a:p>
@@ -3279,23 +3309,23 @@
     </p:spTree>
     <p:extLst>
       <p:ext uri="{BB962C8B-B14F-4D97-AF65-F5344CB8AC3E}">
-        <p14:creationId xmlns:p14="http://schemas.microsoft.com/office/powerpoint/2010/main" val="471047530"/>
+        <p14:creationId xmlns:p14="http://schemas.microsoft.com/office/powerpoint/2010/main" val="1571242286"/>
       </p:ext>
     </p:extLst>
   </p:cSld>
   <p:clrMap bg1="lt1" tx1="dk1" bg2="lt2" tx2="dk2" accent1="accent1" accent2="accent2" accent3="accent3" accent4="accent4" accent5="accent5" accent6="accent6" hlink="hlink" folHlink="folHlink"/>
   <p:sldLayoutIdLst>
-    <p:sldLayoutId id="2147483942" r:id="rId1"/>
-    <p:sldLayoutId id="2147483943" r:id="rId2"/>
-    <p:sldLayoutId id="2147483944" r:id="rId3"/>
-    <p:sldLayoutId id="2147483945" r:id="rId4"/>
-    <p:sldLayoutId id="2147483946" r:id="rId5"/>
-    <p:sldLayoutId id="2147483947" r:id="rId6"/>
-    <p:sldLayoutId id="2147483948" r:id="rId7"/>
-    <p:sldLayoutId id="2147483949" r:id="rId8"/>
-    <p:sldLayoutId id="2147483950" r:id="rId9"/>
-    <p:sldLayoutId id="2147483951" r:id="rId10"/>
-    <p:sldLayoutId id="2147483952" r:id="rId11"/>
+    <p:sldLayoutId id="2147484062" r:id="rId1"/>
+    <p:sldLayoutId id="2147484063" r:id="rId2"/>
+    <p:sldLayoutId id="2147484064" r:id="rId3"/>
+    <p:sldLayoutId id="2147484065" r:id="rId4"/>
+    <p:sldLayoutId id="2147484066" r:id="rId5"/>
+    <p:sldLayoutId id="2147484067" r:id="rId6"/>
+    <p:sldLayoutId id="2147484068" r:id="rId7"/>
+    <p:sldLayoutId id="2147484069" r:id="rId8"/>
+    <p:sldLayoutId id="2147484070" r:id="rId9"/>
+    <p:sldLayoutId id="2147484071" r:id="rId10"/>
+    <p:sldLayoutId id="2147484072" r:id="rId11"/>
   </p:sldLayoutIdLst>
   <p:txStyles>
     <p:titleStyle>
@@ -3577,6 +3607,11 @@
       </a:lvl9pPr>
     </p:otherStyle>
   </p:txStyles>
+  <p:extLst>
+    <p:ext uri="{27BBF7A9-308A-43DC-89C8-2F10F3537804}">
+      <p15:sldGuideLst xmlns:p15="http://schemas.microsoft.com/office/powerpoint/2012/main"/>
+    </p:ext>
+  </p:extLst>
 </p:sldMaster>
 </file>
 
@@ -3607,7 +3642,12 @@
             <p:ph type="ctrTitle"/>
           </p:nvPr>
         </p:nvSpPr>
-        <p:spPr/>
+        <p:spPr>
+          <a:xfrm>
+            <a:off x="1524000" y="385167"/>
+            <a:ext cx="9144000" cy="2006600"/>
+          </a:xfrm>
+        </p:spPr>
         <p:txBody>
           <a:bodyPr>
             <a:normAutofit/>
@@ -3634,8 +3674,8 @@
         </p:nvSpPr>
         <p:spPr>
           <a:xfrm>
-            <a:off x="1524000" y="3590162"/>
-            <a:ext cx="9144000" cy="2756849"/>
+            <a:off x="1524000" y="2880238"/>
+            <a:ext cx="9144000" cy="1189409"/>
           </a:xfrm>
         </p:spPr>
         <p:txBody>
@@ -3644,37 +3684,15 @@
           </a:bodyPr>
           <a:lstStyle/>
           <a:p>
-            <a:endParaRPr lang="en-US" sz="3200" dirty="0" smtClean="0"/>
-          </a:p>
-          <a:p>
             <a:r>
               <a:rPr lang="en-US" sz="3200" dirty="0" smtClean="0"/>
-              <a:t>Session 7: Imbalanced </a:t>
-            </a:r>
+              <a:t>Session 7: Imbalanced Learning</a:t>
+            </a:r>
+          </a:p>
+          <a:p>
             <a:r>
               <a:rPr lang="en-US" sz="3200" dirty="0" smtClean="0"/>
-              <a:t>Learning</a:t>
-            </a:r>
-          </a:p>
-          <a:p>
-            <a:endParaRPr lang="en-US" sz="3200" dirty="0" smtClean="0"/>
-          </a:p>
-          <a:p>
-            <a:r>
-              <a:rPr lang="en-US" dirty="0">
-                <a:hlinkClick r:id="rId3"/>
-              </a:rPr>
-              <a:t>https://</a:t>
-            </a:r>
-            <a:r>
-              <a:rPr lang="en-US" dirty="0" smtClean="0">
-                <a:hlinkClick r:id="rId3"/>
-              </a:rPr>
-              <a:t>github.com/timgasser/acm_imbalanced_learning</a:t>
-            </a:r>
-            <a:r>
-              <a:rPr lang="en-US" dirty="0" smtClean="0"/>
-              <a:t> </a:t>
+              <a:t>Tim Gasser</a:t>
             </a:r>
           </a:p>
         </p:txBody>
@@ -3682,6 +3700,36 @@
       <p:pic>
         <p:nvPicPr>
           <p:cNvPr id="4" name="Picture 3"/>
+          <p:cNvPicPr>
+            <a:picLocks noChangeAspect="1"/>
+          </p:cNvPicPr>
+          <p:nvPr/>
+        </p:nvPicPr>
+        <p:blipFill>
+          <a:blip r:embed="rId3">
+            <a:extLst>
+              <a:ext uri="{28A0092B-C50C-407E-A947-70E740481C1C}">
+                <a14:useLocalDpi xmlns:a14="http://schemas.microsoft.com/office/drawing/2010/main" val="0"/>
+              </a:ext>
+            </a:extLst>
+          </a:blip>
+          <a:stretch>
+            <a:fillRect/>
+          </a:stretch>
+        </p:blipFill>
+        <p:spPr>
+          <a:xfrm>
+            <a:off x="2091074" y="4145053"/>
+            <a:ext cx="594014" cy="594014"/>
+          </a:xfrm>
+          <a:prstGeom prst="rect">
+            <a:avLst/>
+          </a:prstGeom>
+        </p:spPr>
+      </p:pic>
+      <p:pic>
+        <p:nvPicPr>
+          <p:cNvPr id="5" name="Picture 4"/>
           <p:cNvPicPr>
             <a:picLocks noChangeAspect="1"/>
           </p:cNvPicPr>
@@ -3701,8 +3749,137 @@
         </p:blipFill>
         <p:spPr>
           <a:xfrm>
-            <a:off x="1524000" y="5038601"/>
-            <a:ext cx="762000" cy="762000"/>
+            <a:off x="1872775" y="4738408"/>
+            <a:ext cx="954297" cy="954297"/>
+          </a:xfrm>
+          <a:prstGeom prst="rect">
+            <a:avLst/>
+          </a:prstGeom>
+        </p:spPr>
+      </p:pic>
+      <p:sp>
+        <p:nvSpPr>
+          <p:cNvPr id="6" name="Rectangle 5"/>
+          <p:cNvSpPr/>
+          <p:nvPr/>
+        </p:nvSpPr>
+        <p:spPr>
+          <a:xfrm>
+            <a:off x="2971800" y="4206692"/>
+            <a:ext cx="6336350" cy="461665"/>
+          </a:xfrm>
+          <a:prstGeom prst="rect">
+            <a:avLst/>
+          </a:prstGeom>
+        </p:spPr>
+        <p:txBody>
+          <a:bodyPr wrap="none">
+            <a:spAutoFit/>
+          </a:bodyPr>
+          <a:lstStyle/>
+          <a:p>
+            <a:r>
+              <a:rPr lang="en-US" sz="2400" dirty="0" smtClean="0">
+                <a:hlinkClick r:id="rId5"/>
+              </a:rPr>
+              <a:t>github.com/timgasser/acm_imbalanced_learning</a:t>
+            </a:r>
+            <a:endParaRPr lang="en-US" sz="2400" dirty="0"/>
+          </a:p>
+        </p:txBody>
+      </p:sp>
+      <p:sp>
+        <p:nvSpPr>
+          <p:cNvPr id="7" name="Rectangle 6"/>
+          <p:cNvSpPr/>
+          <p:nvPr/>
+        </p:nvSpPr>
+        <p:spPr>
+          <a:xfrm>
+            <a:off x="2933643" y="4933640"/>
+            <a:ext cx="1751698" cy="461665"/>
+          </a:xfrm>
+          <a:prstGeom prst="rect">
+            <a:avLst/>
+          </a:prstGeom>
+        </p:spPr>
+        <p:txBody>
+          <a:bodyPr wrap="none">
+            <a:spAutoFit/>
+          </a:bodyPr>
+          <a:lstStyle/>
+          <a:p>
+            <a:r>
+              <a:rPr lang="en-US" dirty="0" smtClean="0">
+                <a:hlinkClick r:id="rId6"/>
+              </a:rPr>
+              <a:t>@</a:t>
+            </a:r>
+            <a:r>
+              <a:rPr lang="en-US" sz="2400" dirty="0" err="1" smtClean="0">
+                <a:hlinkClick r:id="rId6"/>
+              </a:rPr>
+              <a:t>tim_gasser</a:t>
+            </a:r>
+            <a:endParaRPr lang="en-US" dirty="0"/>
+          </a:p>
+        </p:txBody>
+      </p:sp>
+      <p:sp>
+        <p:nvSpPr>
+          <p:cNvPr id="8" name="Rectangle 7"/>
+          <p:cNvSpPr/>
+          <p:nvPr/>
+        </p:nvSpPr>
+        <p:spPr>
+          <a:xfrm>
+            <a:off x="2933643" y="5645299"/>
+            <a:ext cx="3435621" cy="461665"/>
+          </a:xfrm>
+          <a:prstGeom prst="rect">
+            <a:avLst/>
+          </a:prstGeom>
+        </p:spPr>
+        <p:txBody>
+          <a:bodyPr wrap="none">
+            <a:spAutoFit/>
+          </a:bodyPr>
+          <a:lstStyle/>
+          <a:p>
+            <a:r>
+              <a:rPr lang="en-US" sz="2400" dirty="0" smtClean="0">
+                <a:hlinkClick r:id="rId7"/>
+              </a:rPr>
+              <a:t>medium.com/@timgasser</a:t>
+            </a:r>
+            <a:endParaRPr lang="en-US" sz="2400" dirty="0"/>
+          </a:p>
+        </p:txBody>
+      </p:sp>
+      <p:pic>
+        <p:nvPicPr>
+          <p:cNvPr id="9" name="Picture 8"/>
+          <p:cNvPicPr>
+            <a:picLocks noChangeAspect="1"/>
+          </p:cNvPicPr>
+          <p:nvPr/>
+        </p:nvPicPr>
+        <p:blipFill>
+          <a:blip r:embed="rId8">
+            <a:extLst>
+              <a:ext uri="{28A0092B-C50C-407E-A947-70E740481C1C}">
+                <a14:useLocalDpi xmlns:a14="http://schemas.microsoft.com/office/drawing/2010/main" val="0"/>
+              </a:ext>
+            </a:extLst>
+          </a:blip>
+          <a:stretch>
+            <a:fillRect/>
+          </a:stretch>
+        </p:blipFill>
+        <p:spPr>
+          <a:xfrm>
+            <a:off x="1872775" y="5455298"/>
+            <a:ext cx="1005380" cy="1005380"/>
           </a:xfrm>
           <a:prstGeom prst="rect">
             <a:avLst/>
@@ -5058,7 +5235,7 @@
           <a:p>
             <a:r>
               <a:rPr lang="en-US" dirty="0" smtClean="0"/>
-              <a:t>Cost-sensitive Algorithms</a:t>
+              <a:t>Data pre-processing tools and APIs</a:t>
             </a:r>
             <a:endParaRPr lang="en-US" dirty="0"/>
           </a:p>
@@ -5066,27 +5243,149 @@
       </p:sp>
       <p:sp>
         <p:nvSpPr>
-          <p:cNvPr id="3" name="Text Placeholder 2"/>
-          <p:cNvSpPr>
-            <a:spLocks noGrp="1"/>
-          </p:cNvSpPr>
-          <p:nvPr>
-            <p:ph type="body" idx="1"/>
-          </p:nvPr>
-        </p:nvSpPr>
-        <p:spPr/>
-        <p:txBody>
-          <a:bodyPr/>
-          <a:lstStyle/>
-          <a:p>
-            <a:endParaRPr lang="en-US"/>
+          <p:cNvPr id="3" name="Content Placeholder 2"/>
+          <p:cNvSpPr>
+            <a:spLocks noGrp="1"/>
+          </p:cNvSpPr>
+          <p:nvPr>
+            <p:ph idx="1"/>
+          </p:nvPr>
+        </p:nvSpPr>
+        <p:spPr/>
+        <p:txBody>
+          <a:bodyPr>
+            <a:normAutofit fontScale="92500" lnSpcReduction="10000"/>
+          </a:bodyPr>
+          <a:lstStyle/>
+          <a:p>
+            <a:r>
+              <a:rPr lang="en-US" dirty="0" smtClean="0"/>
+              <a:t>Python’s </a:t>
+            </a:r>
+            <a:r>
+              <a:rPr lang="en-US" dirty="0" err="1" smtClean="0"/>
+              <a:t>scikit</a:t>
+            </a:r>
+            <a:r>
+              <a:rPr lang="en-US" dirty="0" smtClean="0"/>
+              <a:t>-learn library doesn’t support any of the dataset processing methods. These don’t fit well with the </a:t>
+            </a:r>
+            <a:r>
+              <a:rPr lang="en-US" dirty="0" err="1" smtClean="0"/>
+              <a:t>sklearn</a:t>
+            </a:r>
+            <a:r>
+              <a:rPr lang="en-US" dirty="0" smtClean="0"/>
+              <a:t> API:</a:t>
+            </a:r>
+          </a:p>
+          <a:p>
+            <a:pPr lvl="1"/>
+            <a:r>
+              <a:rPr lang="en-US" dirty="0">
+                <a:hlinkClick r:id="rId2"/>
+              </a:rPr>
+              <a:t>https://</a:t>
+            </a:r>
+            <a:r>
+              <a:rPr lang="en-US" dirty="0" smtClean="0">
+                <a:hlinkClick r:id="rId2"/>
+              </a:rPr>
+              <a:t>github.com/scikit-learn/scikit-learn/issues/4617</a:t>
+            </a:r>
+            <a:r>
+              <a:rPr lang="en-US" dirty="0" smtClean="0"/>
+              <a:t> </a:t>
+            </a:r>
+          </a:p>
+          <a:p>
+            <a:r>
+              <a:rPr lang="en-US" dirty="0" smtClean="0"/>
+              <a:t>I found a repo on </a:t>
+            </a:r>
+            <a:r>
+              <a:rPr lang="en-US" dirty="0" err="1" smtClean="0"/>
+              <a:t>Github</a:t>
+            </a:r>
+            <a:r>
+              <a:rPr lang="en-US" dirty="0" smtClean="0"/>
+              <a:t> which supports all the techniques described and more besides:</a:t>
+            </a:r>
+          </a:p>
+          <a:p>
+            <a:pPr lvl="1"/>
+            <a:r>
+              <a:rPr lang="en-US" dirty="0" smtClean="0">
+                <a:hlinkClick r:id="rId3"/>
+              </a:rPr>
+              <a:t>https</a:t>
+            </a:r>
+            <a:r>
+              <a:rPr lang="en-US" dirty="0">
+                <a:hlinkClick r:id="rId3"/>
+              </a:rPr>
+              <a:t>://</a:t>
+            </a:r>
+            <a:r>
+              <a:rPr lang="en-US" dirty="0" smtClean="0">
+                <a:hlinkClick r:id="rId3"/>
+              </a:rPr>
+              <a:t>github.com/fmfn/UnbalancedDataset</a:t>
+            </a:r>
+            <a:r>
+              <a:rPr lang="en-US" dirty="0" smtClean="0"/>
+              <a:t> </a:t>
+            </a:r>
+          </a:p>
+          <a:p>
+            <a:r>
+              <a:rPr lang="en-US" dirty="0" smtClean="0"/>
+              <a:t>R has a package called ‘unbalanced’ which also supports all the pre-pre-processing modes:</a:t>
+            </a:r>
+          </a:p>
+          <a:p>
+            <a:pPr lvl="1"/>
+            <a:r>
+              <a:rPr lang="en-US" dirty="0">
+                <a:hlinkClick r:id="rId4"/>
+              </a:rPr>
+              <a:t>https://</a:t>
+            </a:r>
+            <a:r>
+              <a:rPr lang="en-US" dirty="0" smtClean="0">
+                <a:hlinkClick r:id="rId4"/>
+              </a:rPr>
+              <a:t>cran.r-project.org/web/packages/unbalanced/unbalanced.pdf</a:t>
+            </a:r>
+            <a:r>
+              <a:rPr lang="en-US" dirty="0" smtClean="0"/>
+              <a:t> </a:t>
+            </a:r>
+          </a:p>
+          <a:p>
+            <a:r>
+              <a:rPr lang="en-US" dirty="0" smtClean="0"/>
+              <a:t>To understand the algorithms, I coded several using a small example in the the notebook. Demo !</a:t>
+            </a:r>
+          </a:p>
+          <a:p>
+            <a:pPr lvl="1"/>
+            <a:r>
+              <a:rPr lang="en-US" dirty="0" err="1" smtClean="0"/>
+              <a:t>acm_imbalance_sampling.ipynb</a:t>
+            </a:r>
+            <a:r>
+              <a:rPr lang="en-US" dirty="0" smtClean="0"/>
+              <a:t> </a:t>
+            </a:r>
+            <a:endParaRPr lang="en-US" dirty="0"/>
           </a:p>
         </p:txBody>
       </p:sp>
     </p:spTree>
     <p:extLst>
       <p:ext uri="{BB962C8B-B14F-4D97-AF65-F5344CB8AC3E}">
-        <p14:creationId xmlns:p14="http://schemas.microsoft.com/office/powerpoint/2010/main" val="1740511102"/>
+        <p14:creationId xmlns:p14="http://schemas.microsoft.com/office/powerpoint/2010/main" val="6682797"/>
       </p:ext>
     </p:extLst>
   </p:cSld>
@@ -5136,12 +5435,8 @@
           <a:lstStyle/>
           <a:p>
             <a:r>
-              <a:rPr lang="en-US" dirty="0"/>
-              <a:t>Solutions – </a:t>
-            </a:r>
-            <a:r>
-              <a:rPr lang="en-US" dirty="0" smtClean="0"/>
-              <a:t>Cost-sensitive methods</a:t>
+              <a:rPr lang="en-US" dirty="0" smtClean="0"/>
+              <a:t>Cost-sensitive Algorithms</a:t>
             </a:r>
             <a:endParaRPr lang="en-US" dirty="0"/>
           </a:p>
@@ -5149,73 +5444,27 @@
       </p:sp>
       <p:sp>
         <p:nvSpPr>
-          <p:cNvPr id="3" name="Content Placeholder 2"/>
-          <p:cNvSpPr>
-            <a:spLocks noGrp="1"/>
-          </p:cNvSpPr>
-          <p:nvPr>
-            <p:ph idx="1"/>
-          </p:nvPr>
-        </p:nvSpPr>
-        <p:spPr/>
-        <p:txBody>
-          <a:bodyPr>
-            <a:normAutofit/>
-          </a:bodyPr>
-          <a:lstStyle/>
-          <a:p>
-            <a:r>
-              <a:rPr lang="en-US" dirty="0" smtClean="0"/>
-              <a:t>With a dataset of 95:5 imbalance, </a:t>
-            </a:r>
-            <a:r>
-              <a:rPr lang="en-US" dirty="0" err="1" smtClean="0"/>
-              <a:t>mis</a:t>
-            </a:r>
-            <a:r>
-              <a:rPr lang="en-US" dirty="0" smtClean="0"/>
-              <a:t>-classifying the minority examples can contribute a maximum of 5% of the loss.</a:t>
-            </a:r>
-          </a:p>
-          <a:p>
-            <a:r>
-              <a:rPr lang="en-US" dirty="0" smtClean="0"/>
-              <a:t>This will skew the model towards correctly classifying the majority samples !</a:t>
-            </a:r>
-          </a:p>
-          <a:p>
-            <a:r>
-              <a:rPr lang="en-US" dirty="0" smtClean="0"/>
-              <a:t>To solve this, we can weight the classifications using the inverse of class frequency.</a:t>
-            </a:r>
-          </a:p>
-          <a:p>
-            <a:r>
-              <a:rPr lang="en-US" dirty="0" smtClean="0"/>
-              <a:t>So scale each </a:t>
-            </a:r>
-            <a:r>
-              <a:rPr lang="en-US" dirty="0" err="1" smtClean="0"/>
-              <a:t>mis</a:t>
-            </a:r>
-            <a:r>
-              <a:rPr lang="en-US" dirty="0" smtClean="0"/>
-              <a:t>-classification of the minority class by the imbalance</a:t>
-            </a:r>
-          </a:p>
-          <a:p>
-            <a:pPr lvl="1"/>
-            <a:r>
-              <a:rPr lang="en-US" dirty="0" smtClean="0"/>
-              <a:t>Scaling the minority class cost by 95/5 = 19 gives a cost function ratio of 95:95. </a:t>
-            </a:r>
+          <p:cNvPr id="3" name="Text Placeholder 2"/>
+          <p:cNvSpPr>
+            <a:spLocks noGrp="1"/>
+          </p:cNvSpPr>
+          <p:nvPr>
+            <p:ph type="body" idx="1"/>
+          </p:nvPr>
+        </p:nvSpPr>
+        <p:spPr/>
+        <p:txBody>
+          <a:bodyPr/>
+          <a:lstStyle/>
+          <a:p>
+            <a:endParaRPr lang="en-US"/>
           </a:p>
         </p:txBody>
       </p:sp>
     </p:spTree>
     <p:extLst>
       <p:ext uri="{BB962C8B-B14F-4D97-AF65-F5344CB8AC3E}">
-        <p14:creationId xmlns:p14="http://schemas.microsoft.com/office/powerpoint/2010/main" val="287383503"/>
+        <p14:creationId xmlns:p14="http://schemas.microsoft.com/office/powerpoint/2010/main" val="1740511102"/>
       </p:ext>
     </p:extLst>
   </p:cSld>
@@ -5388,6 +5637,30 @@
           </a:p>
         </p:txBody>
       </p:sp>
+      <p:pic>
+        <p:nvPicPr>
+          <p:cNvPr id="4" name="Picture 3"/>
+          <p:cNvPicPr>
+            <a:picLocks noChangeAspect="1"/>
+          </p:cNvPicPr>
+          <p:nvPr/>
+        </p:nvPicPr>
+        <p:blipFill>
+          <a:blip r:embed="rId3"/>
+          <a:stretch>
+            <a:fillRect/>
+          </a:stretch>
+        </p:blipFill>
+        <p:spPr>
+          <a:xfrm>
+            <a:off x="6085114" y="3160778"/>
+            <a:ext cx="5263243" cy="3016185"/>
+          </a:xfrm>
+          <a:prstGeom prst="rect">
+            <a:avLst/>
+          </a:prstGeom>
+        </p:spPr>
+      </p:pic>
     </p:spTree>
     <p:extLst>
       <p:ext uri="{BB962C8B-B14F-4D97-AF65-F5344CB8AC3E}">
@@ -5471,162 +5744,56 @@
           <a:p>
             <a:r>
               <a:rPr lang="en-US" dirty="0" smtClean="0"/>
-              <a:t>The following classifiers in </a:t>
+              <a:t>With a dataset of 95:5 imbalance, </a:t>
             </a:r>
             <a:r>
               <a:rPr lang="en-US" dirty="0" err="1" smtClean="0"/>
-              <a:t>scikit</a:t>
-            </a:r>
-            <a:r>
-              <a:rPr lang="en-US" dirty="0" smtClean="0"/>
-              <a:t>-learn can adjust weights inversely to class frequencies</a:t>
+              <a:t>mis</a:t>
+            </a:r>
+            <a:r>
+              <a:rPr lang="en-US" dirty="0" smtClean="0"/>
+              <a:t>-classifying the minority examples can contribute a maximum of 5% of the loss.</a:t>
+            </a:r>
+          </a:p>
+          <a:p>
+            <a:r>
+              <a:rPr lang="en-US" dirty="0" smtClean="0"/>
+              <a:t>This will skew the model towards correctly classifying the majority samples !</a:t>
+            </a:r>
+          </a:p>
+          <a:p>
+            <a:r>
+              <a:rPr lang="en-US" dirty="0" smtClean="0"/>
+              <a:t>To solve this, we can weight the classifications using the inverse of class frequency.</a:t>
+            </a:r>
+          </a:p>
+          <a:p>
+            <a:r>
+              <a:rPr lang="en-US" dirty="0" smtClean="0"/>
+              <a:t>So scale each </a:t>
+            </a:r>
+            <a:r>
+              <a:rPr lang="en-US" dirty="0" err="1" smtClean="0"/>
+              <a:t>mis</a:t>
+            </a:r>
+            <a:r>
+              <a:rPr lang="en-US" dirty="0" smtClean="0"/>
+              <a:t>-classification of the minority class by the imbalance</a:t>
             </a:r>
           </a:p>
           <a:p>
             <a:pPr lvl="1"/>
             <a:r>
-              <a:rPr lang="en-US" dirty="0" err="1" smtClean="0"/>
-              <a:t>sklearn.linear_model.LogisticRegression</a:t>
-            </a:r>
-            <a:endParaRPr lang="en-US" dirty="0" smtClean="0"/>
-          </a:p>
-          <a:p>
-            <a:pPr lvl="1"/>
-            <a:r>
-              <a:rPr lang="en-US" dirty="0" err="1" smtClean="0"/>
-              <a:t>sklearn.tree.DecisionTreeClassifier</a:t>
-            </a:r>
-            <a:endParaRPr lang="en-US" dirty="0" smtClean="0"/>
-          </a:p>
-          <a:p>
-            <a:pPr lvl="1"/>
-            <a:r>
-              <a:rPr lang="en-US" dirty="0" err="1" smtClean="0"/>
-              <a:t>sklearn.svm.LinearSVC</a:t>
-            </a:r>
-            <a:endParaRPr lang="en-US" dirty="0" smtClean="0"/>
-          </a:p>
-          <a:p>
-            <a:r>
-              <a:rPr lang="en-US" dirty="0" smtClean="0"/>
-              <a:t>The API is standard across these classifiers (copied below)</a:t>
-            </a:r>
-          </a:p>
-          <a:p>
-            <a:pPr lvl="1"/>
-            <a:r>
-              <a:rPr lang="en-US" sz="1900" b="1" dirty="0" err="1">
-                <a:latin typeface="Monaco" charset="0"/>
-                <a:ea typeface="Monaco" charset="0"/>
-                <a:cs typeface="Monaco" charset="0"/>
-              </a:rPr>
-              <a:t>class_weight</a:t>
-            </a:r>
-            <a:r>
-              <a:rPr lang="en-US" sz="1900" dirty="0">
-                <a:latin typeface="Monaco" charset="0"/>
-                <a:ea typeface="Monaco" charset="0"/>
-                <a:cs typeface="Monaco" charset="0"/>
-              </a:rPr>
-              <a:t> : </a:t>
-            </a:r>
-            <a:r>
-              <a:rPr lang="en-US" sz="1900" dirty="0" err="1">
-                <a:latin typeface="Monaco" charset="0"/>
-                <a:ea typeface="Monaco" charset="0"/>
-                <a:cs typeface="Monaco" charset="0"/>
-              </a:rPr>
-              <a:t>dict</a:t>
-            </a:r>
-            <a:r>
-              <a:rPr lang="en-US" sz="1900" dirty="0">
-                <a:latin typeface="Monaco" charset="0"/>
-                <a:ea typeface="Monaco" charset="0"/>
-                <a:cs typeface="Monaco" charset="0"/>
-              </a:rPr>
-              <a:t> or ‘balanced’, optional</a:t>
-            </a:r>
-          </a:p>
-          <a:p>
-            <a:pPr lvl="1"/>
-            <a:r>
-              <a:rPr lang="en-US" sz="1900" dirty="0" smtClean="0">
-                <a:latin typeface="Monaco" charset="0"/>
-                <a:ea typeface="Monaco" charset="0"/>
-                <a:cs typeface="Monaco" charset="0"/>
-              </a:rPr>
-              <a:t>The </a:t>
-            </a:r>
-            <a:r>
-              <a:rPr lang="en-US" sz="1900" dirty="0">
-                <a:latin typeface="Monaco" charset="0"/>
-                <a:ea typeface="Monaco" charset="0"/>
-                <a:cs typeface="Monaco" charset="0"/>
-              </a:rPr>
-              <a:t>“balanced” mode uses the values of y to automatically adjust weights inversely proportional to class frequencies in the input data as </a:t>
-            </a:r>
-            <a:r>
-              <a:rPr lang="en-US" sz="1900" dirty="0" err="1">
-                <a:latin typeface="Monaco" charset="0"/>
-                <a:ea typeface="Monaco" charset="0"/>
-                <a:cs typeface="Monaco" charset="0"/>
-              </a:rPr>
-              <a:t>n_samples</a:t>
-            </a:r>
-            <a:r>
-              <a:rPr lang="en-US" sz="1900" dirty="0">
-                <a:latin typeface="Monaco" charset="0"/>
-                <a:ea typeface="Monaco" charset="0"/>
-                <a:cs typeface="Monaco" charset="0"/>
-              </a:rPr>
-              <a:t> / (</a:t>
-            </a:r>
-            <a:r>
-              <a:rPr lang="en-US" sz="1900" dirty="0" err="1">
-                <a:latin typeface="Monaco" charset="0"/>
-                <a:ea typeface="Monaco" charset="0"/>
-                <a:cs typeface="Monaco" charset="0"/>
-              </a:rPr>
-              <a:t>n_classes</a:t>
-            </a:r>
-            <a:r>
-              <a:rPr lang="en-US" sz="1900" dirty="0">
-                <a:latin typeface="Monaco" charset="0"/>
-                <a:ea typeface="Monaco" charset="0"/>
-                <a:cs typeface="Monaco" charset="0"/>
-              </a:rPr>
-              <a:t> * </a:t>
-            </a:r>
-            <a:r>
-              <a:rPr lang="en-US" sz="1900" dirty="0" err="1">
-                <a:latin typeface="Monaco" charset="0"/>
-                <a:ea typeface="Monaco" charset="0"/>
-                <a:cs typeface="Monaco" charset="0"/>
-              </a:rPr>
-              <a:t>np.bincount</a:t>
-            </a:r>
-            <a:r>
-              <a:rPr lang="en-US" sz="1900" dirty="0">
-                <a:latin typeface="Monaco" charset="0"/>
-                <a:ea typeface="Monaco" charset="0"/>
-                <a:cs typeface="Monaco" charset="0"/>
-              </a:rPr>
-              <a:t>(y))</a:t>
-            </a:r>
-          </a:p>
-          <a:p>
-            <a:endParaRPr lang="en-US" dirty="0" smtClean="0"/>
-          </a:p>
-          <a:p>
-            <a:pPr lvl="1"/>
-            <a:endParaRPr lang="en-US" dirty="0" smtClean="0"/>
+              <a:rPr lang="en-US" dirty="0" smtClean="0"/>
+              <a:t>Scaling the minority class cost by 95/5 = 19 gives a cost function ratio of 95:95. </a:t>
+            </a:r>
           </a:p>
         </p:txBody>
       </p:sp>
     </p:spTree>
     <p:extLst>
       <p:ext uri="{BB962C8B-B14F-4D97-AF65-F5344CB8AC3E}">
-        <p14:creationId xmlns:p14="http://schemas.microsoft.com/office/powerpoint/2010/main" val="1134085703"/>
+        <p14:creationId xmlns:p14="http://schemas.microsoft.com/office/powerpoint/2010/main" val="287383503"/>
       </p:ext>
     </p:extLst>
   </p:cSld>
@@ -5676,8 +5843,12 @@
           <a:lstStyle/>
           <a:p>
             <a:r>
-              <a:rPr lang="en-US" dirty="0" smtClean="0"/>
-              <a:t>Real-world use-case</a:t>
+              <a:rPr lang="en-US" dirty="0"/>
+              <a:t>Solutions – </a:t>
+            </a:r>
+            <a:r>
+              <a:rPr lang="en-US" dirty="0" smtClean="0"/>
+              <a:t>Cost-sensitive methods</a:t>
             </a:r>
             <a:endParaRPr lang="en-US" dirty="0"/>
           </a:p>
@@ -5685,27 +5856,210 @@
       </p:sp>
       <p:sp>
         <p:nvSpPr>
-          <p:cNvPr id="3" name="Text Placeholder 2"/>
-          <p:cNvSpPr>
-            <a:spLocks noGrp="1"/>
-          </p:cNvSpPr>
-          <p:nvPr>
-            <p:ph type="body" idx="1"/>
-          </p:nvPr>
-        </p:nvSpPr>
-        <p:spPr/>
-        <p:txBody>
-          <a:bodyPr/>
-          <a:lstStyle/>
-          <a:p>
-            <a:endParaRPr lang="en-US"/>
+          <p:cNvPr id="3" name="Content Placeholder 2"/>
+          <p:cNvSpPr>
+            <a:spLocks noGrp="1"/>
+          </p:cNvSpPr>
+          <p:nvPr>
+            <p:ph idx="1"/>
+          </p:nvPr>
+        </p:nvSpPr>
+        <p:spPr/>
+        <p:txBody>
+          <a:bodyPr>
+            <a:normAutofit lnSpcReduction="10000"/>
+          </a:bodyPr>
+          <a:lstStyle/>
+          <a:p>
+            <a:r>
+              <a:rPr lang="en-US" dirty="0" smtClean="0"/>
+              <a:t>The following classifiers in </a:t>
+            </a:r>
+            <a:r>
+              <a:rPr lang="en-US" dirty="0" err="1" smtClean="0"/>
+              <a:t>scikit</a:t>
+            </a:r>
+            <a:r>
+              <a:rPr lang="en-US" dirty="0" smtClean="0"/>
+              <a:t>-learn can adjust weights inversely to class frequencies</a:t>
+            </a:r>
+          </a:p>
+          <a:p>
+            <a:pPr lvl="1"/>
+            <a:r>
+              <a:rPr lang="en-US" dirty="0" err="1" smtClean="0"/>
+              <a:t>sklearn.linear_model.LogisticRegression</a:t>
+            </a:r>
+            <a:endParaRPr lang="en-US" dirty="0" smtClean="0"/>
+          </a:p>
+          <a:p>
+            <a:pPr lvl="1"/>
+            <a:r>
+              <a:rPr lang="en-US" dirty="0" err="1" smtClean="0"/>
+              <a:t>sklearn.tree.DecisionTreeClassifier</a:t>
+            </a:r>
+            <a:endParaRPr lang="en-US" dirty="0" smtClean="0"/>
+          </a:p>
+          <a:p>
+            <a:pPr lvl="1"/>
+            <a:r>
+              <a:rPr lang="en-US" dirty="0" err="1" smtClean="0"/>
+              <a:t>sklearn.svm.LinearSVC</a:t>
+            </a:r>
+            <a:endParaRPr lang="en-US" dirty="0" smtClean="0"/>
+          </a:p>
+          <a:p>
+            <a:r>
+              <a:rPr lang="en-US" dirty="0" smtClean="0"/>
+              <a:t>The API is standard across these classifiers (copied below)</a:t>
+            </a:r>
+          </a:p>
+          <a:p>
+            <a:pPr lvl="1"/>
+            <a:r>
+              <a:rPr lang="en-US" sz="1900" b="1" dirty="0" err="1">
+                <a:latin typeface="Monaco" charset="0"/>
+                <a:ea typeface="Monaco" charset="0"/>
+                <a:cs typeface="Monaco" charset="0"/>
+              </a:rPr>
+              <a:t>class_weight</a:t>
+            </a:r>
+            <a:r>
+              <a:rPr lang="en-US" sz="1900" dirty="0">
+                <a:latin typeface="Monaco" charset="0"/>
+                <a:ea typeface="Monaco" charset="0"/>
+                <a:cs typeface="Monaco" charset="0"/>
+              </a:rPr>
+              <a:t> : </a:t>
+            </a:r>
+            <a:r>
+              <a:rPr lang="en-US" sz="1900" dirty="0" err="1">
+                <a:latin typeface="Monaco" charset="0"/>
+                <a:ea typeface="Monaco" charset="0"/>
+                <a:cs typeface="Monaco" charset="0"/>
+              </a:rPr>
+              <a:t>dict</a:t>
+            </a:r>
+            <a:r>
+              <a:rPr lang="en-US" sz="1900" dirty="0">
+                <a:latin typeface="Monaco" charset="0"/>
+                <a:ea typeface="Monaco" charset="0"/>
+                <a:cs typeface="Monaco" charset="0"/>
+              </a:rPr>
+              <a:t> or ‘balanced’, optional</a:t>
+            </a:r>
+          </a:p>
+          <a:p>
+            <a:pPr lvl="1"/>
+            <a:r>
+              <a:rPr lang="en-US" sz="1900" dirty="0" smtClean="0">
+                <a:latin typeface="Monaco" charset="0"/>
+                <a:ea typeface="Monaco" charset="0"/>
+                <a:cs typeface="Monaco" charset="0"/>
+              </a:rPr>
+              <a:t>The </a:t>
+            </a:r>
+            <a:r>
+              <a:rPr lang="en-US" sz="1900" dirty="0">
+                <a:latin typeface="Monaco" charset="0"/>
+                <a:ea typeface="Monaco" charset="0"/>
+                <a:cs typeface="Monaco" charset="0"/>
+              </a:rPr>
+              <a:t>“balanced” mode uses the values of y to automatically adjust weights inversely proportional to class frequencies in the input data as </a:t>
+            </a:r>
+            <a:r>
+              <a:rPr lang="en-US" sz="1900" dirty="0" err="1">
+                <a:latin typeface="Monaco" charset="0"/>
+                <a:ea typeface="Monaco" charset="0"/>
+                <a:cs typeface="Monaco" charset="0"/>
+              </a:rPr>
+              <a:t>n_samples</a:t>
+            </a:r>
+            <a:r>
+              <a:rPr lang="en-US" sz="1900" dirty="0">
+                <a:latin typeface="Monaco" charset="0"/>
+                <a:ea typeface="Monaco" charset="0"/>
+                <a:cs typeface="Monaco" charset="0"/>
+              </a:rPr>
+              <a:t> / (</a:t>
+            </a:r>
+            <a:r>
+              <a:rPr lang="en-US" sz="1900" dirty="0" err="1">
+                <a:latin typeface="Monaco" charset="0"/>
+                <a:ea typeface="Monaco" charset="0"/>
+                <a:cs typeface="Monaco" charset="0"/>
+              </a:rPr>
+              <a:t>n_classes</a:t>
+            </a:r>
+            <a:r>
+              <a:rPr lang="en-US" sz="1900" dirty="0">
+                <a:latin typeface="Monaco" charset="0"/>
+                <a:ea typeface="Monaco" charset="0"/>
+                <a:cs typeface="Monaco" charset="0"/>
+              </a:rPr>
+              <a:t> * </a:t>
+            </a:r>
+            <a:r>
+              <a:rPr lang="en-US" sz="1900" dirty="0" err="1">
+                <a:latin typeface="Monaco" charset="0"/>
+                <a:ea typeface="Monaco" charset="0"/>
+                <a:cs typeface="Monaco" charset="0"/>
+              </a:rPr>
+              <a:t>np.bincount</a:t>
+            </a:r>
+            <a:r>
+              <a:rPr lang="en-US" sz="1900" dirty="0">
+                <a:latin typeface="Monaco" charset="0"/>
+                <a:ea typeface="Monaco" charset="0"/>
+                <a:cs typeface="Monaco" charset="0"/>
+              </a:rPr>
+              <a:t>(y</a:t>
+            </a:r>
+            <a:r>
+              <a:rPr lang="en-US" sz="1900" dirty="0" smtClean="0">
+                <a:latin typeface="Monaco" charset="0"/>
+                <a:ea typeface="Monaco" charset="0"/>
+                <a:cs typeface="Monaco" charset="0"/>
+              </a:rPr>
+              <a:t>))</a:t>
+            </a:r>
+          </a:p>
+          <a:p>
+            <a:r>
+              <a:rPr lang="en-US" dirty="0"/>
+              <a:t>To test the performance of the weighted classifiers, I’m using a </a:t>
+            </a:r>
+            <a:r>
+              <a:rPr lang="en-US" dirty="0" smtClean="0"/>
+              <a:t>real-world </a:t>
+            </a:r>
+            <a:r>
+              <a:rPr lang="en-US" dirty="0"/>
+              <a:t>dataset</a:t>
+            </a:r>
+            <a:r>
+              <a:rPr lang="en-US" dirty="0" smtClean="0"/>
+              <a:t>.</a:t>
+            </a:r>
+            <a:endParaRPr lang="en-US" sz="1900" dirty="0">
+              <a:latin typeface="Monaco" charset="0"/>
+              <a:ea typeface="Monaco" charset="0"/>
+              <a:cs typeface="Monaco" charset="0"/>
+            </a:endParaRPr>
+          </a:p>
+          <a:p>
+            <a:endParaRPr lang="en-US" dirty="0" smtClean="0"/>
+          </a:p>
+          <a:p>
+            <a:pPr lvl="1"/>
+            <a:endParaRPr lang="en-US" dirty="0" smtClean="0"/>
           </a:p>
         </p:txBody>
       </p:sp>
     </p:spTree>
     <p:extLst>
       <p:ext uri="{BB962C8B-B14F-4D97-AF65-F5344CB8AC3E}">
-        <p14:creationId xmlns:p14="http://schemas.microsoft.com/office/powerpoint/2010/main" val="1040918563"/>
+        <p14:creationId xmlns:p14="http://schemas.microsoft.com/office/powerpoint/2010/main" val="1134085703"/>
       </p:ext>
     </p:extLst>
   </p:cSld>
@@ -5756,6 +6110,85 @@
           <a:p>
             <a:r>
               <a:rPr lang="en-US" dirty="0" smtClean="0"/>
+              <a:t>Real-world use-case</a:t>
+            </a:r>
+            <a:endParaRPr lang="en-US" dirty="0"/>
+          </a:p>
+        </p:txBody>
+      </p:sp>
+      <p:sp>
+        <p:nvSpPr>
+          <p:cNvPr id="3" name="Text Placeholder 2"/>
+          <p:cNvSpPr>
+            <a:spLocks noGrp="1"/>
+          </p:cNvSpPr>
+          <p:nvPr>
+            <p:ph type="body" idx="1"/>
+          </p:nvPr>
+        </p:nvSpPr>
+        <p:spPr/>
+        <p:txBody>
+          <a:bodyPr/>
+          <a:lstStyle/>
+          <a:p>
+            <a:endParaRPr lang="en-US"/>
+          </a:p>
+        </p:txBody>
+      </p:sp>
+    </p:spTree>
+    <p:extLst>
+      <p:ext uri="{BB962C8B-B14F-4D97-AF65-F5344CB8AC3E}">
+        <p14:creationId xmlns:p14="http://schemas.microsoft.com/office/powerpoint/2010/main" val="1040918563"/>
+      </p:ext>
+    </p:extLst>
+  </p:cSld>
+  <p:clrMapOvr>
+    <a:masterClrMapping/>
+  </p:clrMapOvr>
+  <p:timing>
+    <p:tnLst>
+      <p:par>
+        <p:cTn id="1" dur="indefinite" restart="never" nodeType="tmRoot"/>
+      </p:par>
+    </p:tnLst>
+  </p:timing>
+</p:sld>
+</file>
+
+<file path=ppt/slides/slide23.xml><?xml version="1.0" encoding="utf-8"?>
+<p:sld xmlns:a="http://schemas.openxmlformats.org/drawingml/2006/main" xmlns:r="http://schemas.openxmlformats.org/officeDocument/2006/relationships" xmlns:p="http://schemas.openxmlformats.org/presentationml/2006/main">
+  <p:cSld>
+    <p:spTree>
+      <p:nvGrpSpPr>
+        <p:cNvPr id="1" name=""/>
+        <p:cNvGrpSpPr/>
+        <p:nvPr/>
+      </p:nvGrpSpPr>
+      <p:grpSpPr>
+        <a:xfrm>
+          <a:off x="0" y="0"/>
+          <a:ext cx="0" cy="0"/>
+          <a:chOff x="0" y="0"/>
+          <a:chExt cx="0" cy="0"/>
+        </a:xfrm>
+      </p:grpSpPr>
+      <p:sp>
+        <p:nvSpPr>
+          <p:cNvPr id="2" name="Title 1"/>
+          <p:cNvSpPr>
+            <a:spLocks noGrp="1"/>
+          </p:cNvSpPr>
+          <p:nvPr>
+            <p:ph type="title"/>
+          </p:nvPr>
+        </p:nvSpPr>
+        <p:spPr/>
+        <p:txBody>
+          <a:bodyPr/>
+          <a:lstStyle/>
+          <a:p>
+            <a:r>
+              <a:rPr lang="en-US" dirty="0" smtClean="0"/>
               <a:t>Evaluation dataset</a:t>
             </a:r>
             <a:endParaRPr lang="en-US" dirty="0"/>
@@ -5848,7 +6281,7 @@
 </p:sld>
 </file>
 
-<file path=ppt/slides/slide23.xml><?xml version="1.0" encoding="utf-8"?>
+<file path=ppt/slides/slide24.xml><?xml version="1.0" encoding="utf-8"?>
 <p:sld xmlns:a="http://schemas.openxmlformats.org/drawingml/2006/main" xmlns:r="http://schemas.openxmlformats.org/officeDocument/2006/relationships" xmlns:p="http://schemas.openxmlformats.org/presentationml/2006/main">
   <p:cSld>
     <p:spTree>
@@ -6578,7 +7011,7 @@
 </p:sld>
 </file>
 
-<file path=ppt/slides/slide24.xml><?xml version="1.0" encoding="utf-8"?>
+<file path=ppt/slides/slide25.xml><?xml version="1.0" encoding="utf-8"?>
 <p:sld xmlns:a="http://schemas.openxmlformats.org/drawingml/2006/main" xmlns:r="http://schemas.openxmlformats.org/officeDocument/2006/relationships" xmlns:p="http://schemas.openxmlformats.org/presentationml/2006/main">
   <p:cSld>
     <p:spTree>
@@ -6612,6 +7045,564 @@
           <a:p>
             <a:r>
               <a:rPr lang="en-US" dirty="0" smtClean="0"/>
+              <a:t>Evaluation </a:t>
+            </a:r>
+            <a:r>
+              <a:rPr lang="en-US" dirty="0" smtClean="0"/>
+              <a:t>overview</a:t>
+            </a:r>
+            <a:endParaRPr lang="en-US" dirty="0"/>
+          </a:p>
+        </p:txBody>
+      </p:sp>
+      <p:sp>
+        <p:nvSpPr>
+          <p:cNvPr id="3" name="Content Placeholder 2"/>
+          <p:cNvSpPr>
+            <a:spLocks noGrp="1"/>
+          </p:cNvSpPr>
+          <p:nvPr>
+            <p:ph idx="1"/>
+          </p:nvPr>
+        </p:nvSpPr>
+        <p:spPr/>
+        <p:txBody>
+          <a:bodyPr/>
+          <a:lstStyle/>
+          <a:p>
+            <a:r>
+              <a:rPr lang="en-US" dirty="0" smtClean="0"/>
+              <a:t>The first section of the notebook explores the dataset, and compares classifiers trained with accuracy instead of AUC, and with class weights.</a:t>
+            </a:r>
+            <a:endParaRPr lang="en-US" dirty="0" smtClean="0"/>
+          </a:p>
+          <a:p>
+            <a:r>
+              <a:rPr lang="en-US" dirty="0" smtClean="0"/>
+              <a:t>The second section uses pre-processed datasets generated in R to evaluate the performance boost.</a:t>
+            </a:r>
+            <a:endParaRPr lang="en-US" dirty="0" smtClean="0"/>
+          </a:p>
+          <a:p>
+            <a:r>
+              <a:rPr lang="en-US" dirty="0" smtClean="0"/>
+              <a:t>“Which is better, R or Python?”</a:t>
+            </a:r>
+          </a:p>
+          <a:p>
+            <a:pPr lvl="1"/>
+            <a:r>
+              <a:rPr lang="en-US" dirty="0" smtClean="0"/>
+              <a:t>Learn a bit of both </a:t>
+            </a:r>
+            <a:r>
+              <a:rPr lang="en-US" dirty="0" smtClean="0">
+                <a:sym typeface="Wingdings"/>
+              </a:rPr>
+              <a:t></a:t>
+            </a:r>
+            <a:r>
+              <a:rPr lang="en-US" dirty="0" smtClean="0"/>
+              <a:t> </a:t>
+            </a:r>
+            <a:endParaRPr lang="en-US" dirty="0" smtClean="0"/>
+          </a:p>
+          <a:p>
+            <a:endParaRPr lang="en-US" dirty="0" smtClean="0"/>
+          </a:p>
+        </p:txBody>
+      </p:sp>
+      <p:pic>
+        <p:nvPicPr>
+          <p:cNvPr id="4" name="Picture 3"/>
+          <p:cNvPicPr>
+            <a:picLocks noChangeAspect="1"/>
+          </p:cNvPicPr>
+          <p:nvPr/>
+        </p:nvPicPr>
+        <p:blipFill>
+          <a:blip r:embed="rId2"/>
+          <a:stretch>
+            <a:fillRect/>
+          </a:stretch>
+        </p:blipFill>
+        <p:spPr>
+          <a:xfrm>
+            <a:off x="6959600" y="3647903"/>
+            <a:ext cx="4394200" cy="2790317"/>
+          </a:xfrm>
+          <a:prstGeom prst="rect">
+            <a:avLst/>
+          </a:prstGeom>
+        </p:spPr>
+      </p:pic>
+      <p:cxnSp>
+        <p:nvCxnSpPr>
+          <p:cNvPr id="6" name="Straight Arrow Connector 5"/>
+          <p:cNvCxnSpPr/>
+          <p:nvPr/>
+        </p:nvCxnSpPr>
+        <p:spPr>
+          <a:xfrm>
+            <a:off x="5791200" y="4038600"/>
+            <a:ext cx="990600" cy="0"/>
+          </a:xfrm>
+          <a:prstGeom prst="straightConnector1">
+            <a:avLst/>
+          </a:prstGeom>
+          <a:ln w="82550">
+            <a:solidFill>
+              <a:schemeClr val="tx1"/>
+            </a:solidFill>
+            <a:tailEnd type="triangle"/>
+          </a:ln>
+        </p:spPr>
+        <p:style>
+          <a:lnRef idx="1">
+            <a:schemeClr val="accent1"/>
+          </a:lnRef>
+          <a:fillRef idx="0">
+            <a:schemeClr val="accent1"/>
+          </a:fillRef>
+          <a:effectRef idx="0">
+            <a:schemeClr val="accent1"/>
+          </a:effectRef>
+          <a:fontRef idx="minor">
+            <a:schemeClr val="tx1"/>
+          </a:fontRef>
+        </p:style>
+      </p:cxnSp>
+    </p:spTree>
+    <p:extLst>
+      <p:ext uri="{BB962C8B-B14F-4D97-AF65-F5344CB8AC3E}">
+        <p14:creationId xmlns:p14="http://schemas.microsoft.com/office/powerpoint/2010/main" val="1102267530"/>
+      </p:ext>
+    </p:extLst>
+  </p:cSld>
+  <p:clrMapOvr>
+    <a:masterClrMapping/>
+  </p:clrMapOvr>
+  <p:timing>
+    <p:tnLst>
+      <p:par>
+        <p:cTn id="1" dur="indefinite" restart="never" nodeType="tmRoot"/>
+      </p:par>
+    </p:tnLst>
+  </p:timing>
+</p:sld>
+</file>
+
+<file path=ppt/slides/slide26.xml><?xml version="1.0" encoding="utf-8"?>
+<p:sld xmlns:a="http://schemas.openxmlformats.org/drawingml/2006/main" xmlns:r="http://schemas.openxmlformats.org/officeDocument/2006/relationships" xmlns:p="http://schemas.openxmlformats.org/presentationml/2006/main">
+  <p:cSld>
+    <p:spTree>
+      <p:nvGrpSpPr>
+        <p:cNvPr id="1" name=""/>
+        <p:cNvGrpSpPr/>
+        <p:nvPr/>
+      </p:nvGrpSpPr>
+      <p:grpSpPr>
+        <a:xfrm>
+          <a:off x="0" y="0"/>
+          <a:ext cx="0" cy="0"/>
+          <a:chOff x="0" y="0"/>
+          <a:chExt cx="0" cy="0"/>
+        </a:xfrm>
+      </p:grpSpPr>
+      <p:sp>
+        <p:nvSpPr>
+          <p:cNvPr id="2" name="Title 1"/>
+          <p:cNvSpPr>
+            <a:spLocks noGrp="1"/>
+          </p:cNvSpPr>
+          <p:nvPr>
+            <p:ph type="title"/>
+          </p:nvPr>
+        </p:nvSpPr>
+        <p:spPr/>
+        <p:txBody>
+          <a:bodyPr/>
+          <a:lstStyle/>
+          <a:p>
+            <a:r>
+              <a:rPr lang="en-US" dirty="0" smtClean="0"/>
+              <a:t>Evaluation Results</a:t>
+            </a:r>
+            <a:endParaRPr lang="en-US" dirty="0"/>
+          </a:p>
+        </p:txBody>
+      </p:sp>
+      <p:sp>
+        <p:nvSpPr>
+          <p:cNvPr id="3" name="Content Placeholder 2"/>
+          <p:cNvSpPr>
+            <a:spLocks noGrp="1"/>
+          </p:cNvSpPr>
+          <p:nvPr>
+            <p:ph idx="1"/>
+          </p:nvPr>
+        </p:nvSpPr>
+        <p:spPr/>
+        <p:txBody>
+          <a:bodyPr/>
+          <a:lstStyle/>
+          <a:p>
+            <a:r>
+              <a:rPr lang="en-US" dirty="0" smtClean="0"/>
+              <a:t>Logistic regression (using weighted classes) in combination with SMOTE is th</a:t>
+            </a:r>
+            <a:r>
+              <a:rPr lang="en-US" dirty="0" smtClean="0"/>
+              <a:t>e best performing model, with AUC = </a:t>
+            </a:r>
+            <a:r>
+              <a:rPr lang="is-IS" dirty="0" smtClean="0"/>
+              <a:t>0.909667.</a:t>
+            </a:r>
+            <a:endParaRPr lang="en-US" dirty="0" smtClean="0"/>
+          </a:p>
+          <a:p>
+            <a:endParaRPr lang="en-US" dirty="0" smtClean="0"/>
+          </a:p>
+          <a:p>
+            <a:endParaRPr lang="en-US" dirty="0" smtClean="0"/>
+          </a:p>
+        </p:txBody>
+      </p:sp>
+      <p:pic>
+        <p:nvPicPr>
+          <p:cNvPr id="4" name="Picture 3"/>
+          <p:cNvPicPr>
+            <a:picLocks noChangeAspect="1"/>
+          </p:cNvPicPr>
+          <p:nvPr/>
+        </p:nvPicPr>
+        <p:blipFill>
+          <a:blip r:embed="rId2"/>
+          <a:stretch>
+            <a:fillRect/>
+          </a:stretch>
+        </p:blipFill>
+        <p:spPr>
+          <a:xfrm>
+            <a:off x="3359150" y="2590800"/>
+            <a:ext cx="5473700" cy="3988272"/>
+          </a:xfrm>
+          <a:prstGeom prst="rect">
+            <a:avLst/>
+          </a:prstGeom>
+        </p:spPr>
+      </p:pic>
+    </p:spTree>
+    <p:extLst>
+      <p:ext uri="{BB962C8B-B14F-4D97-AF65-F5344CB8AC3E}">
+        <p14:creationId xmlns:p14="http://schemas.microsoft.com/office/powerpoint/2010/main" val="41287154"/>
+      </p:ext>
+    </p:extLst>
+  </p:cSld>
+  <p:clrMapOvr>
+    <a:masterClrMapping/>
+  </p:clrMapOvr>
+  <p:timing>
+    <p:tnLst>
+      <p:par>
+        <p:cTn id="1" dur="indefinite" restart="never" nodeType="tmRoot"/>
+      </p:par>
+    </p:tnLst>
+  </p:timing>
+</p:sld>
+</file>
+
+<file path=ppt/slides/slide27.xml><?xml version="1.0" encoding="utf-8"?>
+<p:sld xmlns:a="http://schemas.openxmlformats.org/drawingml/2006/main" xmlns:r="http://schemas.openxmlformats.org/officeDocument/2006/relationships" xmlns:p="http://schemas.openxmlformats.org/presentationml/2006/main">
+  <p:cSld>
+    <p:spTree>
+      <p:nvGrpSpPr>
+        <p:cNvPr id="1" name=""/>
+        <p:cNvGrpSpPr/>
+        <p:nvPr/>
+      </p:nvGrpSpPr>
+      <p:grpSpPr>
+        <a:xfrm>
+          <a:off x="0" y="0"/>
+          <a:ext cx="0" cy="0"/>
+          <a:chOff x="0" y="0"/>
+          <a:chExt cx="0" cy="0"/>
+        </a:xfrm>
+      </p:grpSpPr>
+      <p:sp>
+        <p:nvSpPr>
+          <p:cNvPr id="2" name="Title 1"/>
+          <p:cNvSpPr>
+            <a:spLocks noGrp="1"/>
+          </p:cNvSpPr>
+          <p:nvPr>
+            <p:ph type="title"/>
+          </p:nvPr>
+        </p:nvSpPr>
+        <p:spPr/>
+        <p:txBody>
+          <a:bodyPr/>
+          <a:lstStyle/>
+          <a:p>
+            <a:r>
+              <a:rPr lang="en-US" dirty="0" smtClean="0"/>
+              <a:t>Conclusions</a:t>
+            </a:r>
+            <a:endParaRPr lang="en-US" dirty="0"/>
+          </a:p>
+        </p:txBody>
+      </p:sp>
+      <p:sp>
+        <p:nvSpPr>
+          <p:cNvPr id="3" name="Content Placeholder 2"/>
+          <p:cNvSpPr>
+            <a:spLocks noGrp="1"/>
+          </p:cNvSpPr>
+          <p:nvPr>
+            <p:ph idx="1"/>
+          </p:nvPr>
+        </p:nvSpPr>
+        <p:spPr/>
+        <p:txBody>
+          <a:bodyPr>
+            <a:normAutofit lnSpcReduction="10000"/>
+          </a:bodyPr>
+          <a:lstStyle/>
+          <a:p>
+            <a:r>
+              <a:rPr lang="en-US" dirty="0" err="1" smtClean="0"/>
+              <a:t>s</a:t>
+            </a:r>
+            <a:r>
+              <a:rPr lang="en-US" dirty="0" err="1" smtClean="0"/>
+              <a:t>cikit</a:t>
+            </a:r>
+            <a:r>
+              <a:rPr lang="en-US" dirty="0" smtClean="0"/>
+              <a:t>-learn does not support any data pre-processing, but does support weighted classes in classifier algorithms.</a:t>
+            </a:r>
+          </a:p>
+          <a:p>
+            <a:r>
+              <a:rPr lang="en-US" dirty="0" smtClean="0"/>
+              <a:t>The ’unbalanced’ R package does support data pre-processing.</a:t>
+            </a:r>
+          </a:p>
+          <a:p>
+            <a:pPr lvl="1"/>
+            <a:r>
+              <a:rPr lang="en-US" dirty="0" smtClean="0"/>
+              <a:t>But using R in the pipeline complicates the flow.</a:t>
+            </a:r>
+          </a:p>
+          <a:p>
+            <a:r>
+              <a:rPr lang="en-US" dirty="0" smtClean="0"/>
+              <a:t>Evaluation on the </a:t>
+            </a:r>
+            <a:r>
+              <a:rPr lang="en-US" dirty="0" err="1" smtClean="0"/>
+              <a:t>Kaggle</a:t>
+            </a:r>
+            <a:r>
+              <a:rPr lang="en-US" dirty="0" smtClean="0"/>
+              <a:t> ‘Give me some credit’ dataset shows:</a:t>
+            </a:r>
+          </a:p>
+          <a:p>
+            <a:pPr lvl="1"/>
+            <a:r>
+              <a:rPr lang="en-US" dirty="0" smtClean="0"/>
+              <a:t>Training with the correct metric is crucial.</a:t>
+            </a:r>
+          </a:p>
+          <a:p>
+            <a:pPr lvl="1"/>
+            <a:r>
+              <a:rPr lang="en-US" dirty="0" smtClean="0"/>
+              <a:t>Balancing class weights is important for a 95:5 imbalanced dataset.</a:t>
+            </a:r>
+          </a:p>
+          <a:p>
+            <a:pPr lvl="1"/>
+            <a:r>
+              <a:rPr lang="en-US" dirty="0" smtClean="0"/>
+              <a:t>Pre-processing the data with SMOTE gives a significant boost in AUC.</a:t>
+            </a:r>
+          </a:p>
+          <a:p>
+            <a:r>
+              <a:rPr lang="en-US" dirty="0" smtClean="0"/>
+              <a:t>Ensemble algorithms are another solution for class imbalance, unfortunately there wasn’t time to present them here.</a:t>
+            </a:r>
+          </a:p>
+          <a:p>
+            <a:pPr lvl="1"/>
+            <a:r>
+              <a:rPr lang="en-US" dirty="0" smtClean="0"/>
+              <a:t>See </a:t>
+            </a:r>
+            <a:r>
+              <a:rPr lang="en-US" dirty="0" err="1" smtClean="0"/>
+              <a:t>BalanceCascade</a:t>
+            </a:r>
+            <a:r>
+              <a:rPr lang="en-US" dirty="0" smtClean="0"/>
+              <a:t> and </a:t>
+            </a:r>
+            <a:r>
+              <a:rPr lang="en-US" dirty="0" err="1" smtClean="0"/>
+              <a:t>EasyEnsemble</a:t>
+            </a:r>
+            <a:r>
+              <a:rPr lang="en-US" dirty="0" smtClean="0"/>
+              <a:t> (in [4]), </a:t>
+            </a:r>
+            <a:r>
+              <a:rPr lang="en-US" dirty="0" smtClean="0"/>
+              <a:t>for more information.</a:t>
+            </a:r>
+            <a:endParaRPr lang="en-US" dirty="0" smtClean="0"/>
+          </a:p>
+          <a:p>
+            <a:endParaRPr lang="en-US" dirty="0"/>
+          </a:p>
+        </p:txBody>
+      </p:sp>
+    </p:spTree>
+    <p:extLst>
+      <p:ext uri="{BB962C8B-B14F-4D97-AF65-F5344CB8AC3E}">
+        <p14:creationId xmlns:p14="http://schemas.microsoft.com/office/powerpoint/2010/main" val="1624058732"/>
+      </p:ext>
+    </p:extLst>
+  </p:cSld>
+  <p:clrMapOvr>
+    <a:masterClrMapping/>
+  </p:clrMapOvr>
+  <p:timing>
+    <p:tnLst>
+      <p:par>
+        <p:cTn id="1" dur="indefinite" restart="never" nodeType="tmRoot"/>
+      </p:par>
+    </p:tnLst>
+  </p:timing>
+</p:sld>
+</file>
+
+<file path=ppt/slides/slide28.xml><?xml version="1.0" encoding="utf-8"?>
+<p:sld xmlns:a="http://schemas.openxmlformats.org/drawingml/2006/main" xmlns:r="http://schemas.openxmlformats.org/officeDocument/2006/relationships" xmlns:p="http://schemas.openxmlformats.org/presentationml/2006/main">
+  <p:cSld>
+    <p:spTree>
+      <p:nvGrpSpPr>
+        <p:cNvPr id="1" name=""/>
+        <p:cNvGrpSpPr/>
+        <p:nvPr/>
+      </p:nvGrpSpPr>
+      <p:grpSpPr>
+        <a:xfrm>
+          <a:off x="0" y="0"/>
+          <a:ext cx="0" cy="0"/>
+          <a:chOff x="0" y="0"/>
+          <a:chExt cx="0" cy="0"/>
+        </a:xfrm>
+      </p:grpSpPr>
+      <p:sp>
+        <p:nvSpPr>
+          <p:cNvPr id="2" name="Title 1"/>
+          <p:cNvSpPr>
+            <a:spLocks noGrp="1"/>
+          </p:cNvSpPr>
+          <p:nvPr>
+            <p:ph type="title"/>
+          </p:nvPr>
+        </p:nvSpPr>
+        <p:spPr/>
+        <p:txBody>
+          <a:bodyPr/>
+          <a:lstStyle/>
+          <a:p>
+            <a:r>
+              <a:rPr lang="en-US" dirty="0" smtClean="0"/>
+              <a:t>Thank you ! </a:t>
+            </a:r>
+            <a:endParaRPr lang="en-US" dirty="0"/>
+          </a:p>
+        </p:txBody>
+      </p:sp>
+      <p:sp>
+        <p:nvSpPr>
+          <p:cNvPr id="4" name="Text Placeholder 3"/>
+          <p:cNvSpPr>
+            <a:spLocks noGrp="1"/>
+          </p:cNvSpPr>
+          <p:nvPr>
+            <p:ph type="body" idx="1"/>
+          </p:nvPr>
+        </p:nvSpPr>
+        <p:spPr/>
+        <p:txBody>
+          <a:bodyPr/>
+          <a:lstStyle/>
+          <a:p>
+            <a:endParaRPr lang="en-US"/>
+          </a:p>
+        </p:txBody>
+      </p:sp>
+    </p:spTree>
+    <p:extLst>
+      <p:ext uri="{BB962C8B-B14F-4D97-AF65-F5344CB8AC3E}">
+        <p14:creationId xmlns:p14="http://schemas.microsoft.com/office/powerpoint/2010/main" val="1584905155"/>
+      </p:ext>
+    </p:extLst>
+  </p:cSld>
+  <p:clrMapOvr>
+    <a:masterClrMapping/>
+  </p:clrMapOvr>
+  <p:timing>
+    <p:tnLst>
+      <p:par>
+        <p:cTn id="1" dur="indefinite" restart="never" nodeType="tmRoot"/>
+      </p:par>
+    </p:tnLst>
+  </p:timing>
+</p:sld>
+</file>
+
+<file path=ppt/slides/slide29.xml><?xml version="1.0" encoding="utf-8"?>
+<p:sld xmlns:a="http://schemas.openxmlformats.org/drawingml/2006/main" xmlns:r="http://schemas.openxmlformats.org/officeDocument/2006/relationships" xmlns:p="http://schemas.openxmlformats.org/presentationml/2006/main">
+  <p:cSld>
+    <p:spTree>
+      <p:nvGrpSpPr>
+        <p:cNvPr id="1" name=""/>
+        <p:cNvGrpSpPr/>
+        <p:nvPr/>
+      </p:nvGrpSpPr>
+      <p:grpSpPr>
+        <a:xfrm>
+          <a:off x="0" y="0"/>
+          <a:ext cx="0" cy="0"/>
+          <a:chOff x="0" y="0"/>
+          <a:chExt cx="0" cy="0"/>
+        </a:xfrm>
+      </p:grpSpPr>
+      <p:sp>
+        <p:nvSpPr>
+          <p:cNvPr id="2" name="Title 1"/>
+          <p:cNvSpPr>
+            <a:spLocks noGrp="1"/>
+          </p:cNvSpPr>
+          <p:nvPr>
+            <p:ph type="title"/>
+          </p:nvPr>
+        </p:nvSpPr>
+        <p:spPr/>
+        <p:txBody>
+          <a:bodyPr/>
+          <a:lstStyle/>
+          <a:p>
+            <a:r>
+              <a:rPr lang="en-US" dirty="0" smtClean="0"/>
               <a:t>References</a:t>
             </a:r>
             <a:endParaRPr lang="en-US" dirty="0"/>
@@ -6743,6 +7734,47 @@
               <a:rPr lang="en-US" dirty="0" smtClean="0"/>
               <a:t>)</a:t>
             </a:r>
+          </a:p>
+          <a:p>
+            <a:r>
+              <a:rPr lang="en-US" dirty="0" smtClean="0"/>
+              <a:t>[4] - “</a:t>
+            </a:r>
+            <a:r>
+              <a:rPr lang="en-US" dirty="0"/>
+              <a:t>Exploratory </a:t>
+            </a:r>
+            <a:r>
+              <a:rPr lang="en-US" dirty="0" err="1"/>
+              <a:t>undersampling</a:t>
+            </a:r>
+            <a:r>
+              <a:rPr lang="en-US" dirty="0"/>
+              <a:t> for class-imbalance learning,” </a:t>
+            </a:r>
+            <a:r>
+              <a:rPr lang="en-US" i="1" dirty="0"/>
+              <a:t>IEEE Transactions on Systems, Man, and Cybernetics - Part B: Cybernetics</a:t>
+            </a:r>
+            <a:r>
+              <a:rPr lang="en-US" dirty="0"/>
+              <a:t>, vol. 39, no. 2, pp. 539–550, 2009. </a:t>
+            </a:r>
+            <a:r>
+              <a:rPr lang="en-US" dirty="0"/>
+              <a:t>X.-Y. Liu, J. Wu, and Z.-H. </a:t>
+            </a:r>
+            <a:r>
+              <a:rPr lang="en-US" dirty="0" smtClean="0"/>
+              <a:t>Zhou</a:t>
+            </a:r>
+            <a:r>
+              <a:rPr lang="en-US" dirty="0"/>
+              <a:t>.</a:t>
+            </a:r>
+            <a:endParaRPr lang="en-US" dirty="0"/>
+          </a:p>
+          <a:p>
             <a:endParaRPr lang="en-US" dirty="0"/>
           </a:p>
         </p:txBody>
@@ -6820,7 +7852,7 @@
         <p:spPr/>
         <p:txBody>
           <a:bodyPr>
-            <a:normAutofit/>
+            <a:normAutofit lnSpcReduction="10000"/>
           </a:bodyPr>
           <a:lstStyle/>
           <a:p>
@@ -6914,7 +7946,9 @@
         </p:nvSpPr>
         <p:spPr/>
         <p:txBody>
-          <a:bodyPr/>
+          <a:bodyPr>
+            <a:normAutofit/>
+          </a:bodyPr>
           <a:lstStyle/>
           <a:p>
             <a:r>
@@ -6950,7 +7984,7 @@
         <p:spPr/>
         <p:txBody>
           <a:bodyPr>
-            <a:normAutofit fontScale="92500" lnSpcReduction="10000"/>
+            <a:normAutofit lnSpcReduction="10000"/>
           </a:bodyPr>
           <a:lstStyle/>
           <a:p>
@@ -6964,32 +7998,11 @@
             <a:pPr lvl="1"/>
             <a:r>
               <a:rPr lang="en-US" dirty="0"/>
-              <a:t>Fraud detection</a:t>
-            </a:r>
-          </a:p>
-          <a:p>
-            <a:pPr lvl="1"/>
-            <a:r>
-              <a:rPr lang="en-US" dirty="0"/>
-              <a:t>Anomaly detection</a:t>
-            </a:r>
-          </a:p>
-          <a:p>
-            <a:pPr lvl="1"/>
-            <a:r>
-              <a:rPr lang="en-US" dirty="0"/>
-              <a:t>Cancer </a:t>
-            </a:r>
-            <a:r>
-              <a:rPr lang="en-US" dirty="0" smtClean="0"/>
-              <a:t>detection</a:t>
-            </a:r>
-          </a:p>
-          <a:p>
-            <a:pPr lvl="1"/>
-            <a:r>
-              <a:rPr lang="en-US" dirty="0" smtClean="0"/>
-              <a:t>Predicting credit defaults</a:t>
+              <a:t>Fraud </a:t>
+            </a:r>
+            <a:r>
+              <a:rPr lang="en-US" dirty="0" smtClean="0"/>
+              <a:t>detection, anomaly detection, cancer detection, predicting credit defaults</a:t>
             </a:r>
             <a:endParaRPr lang="en-US" dirty="0"/>
           </a:p>
@@ -7790,7 +8803,7 @@
         </p:spPr>
         <p:txBody>
           <a:bodyPr>
-            <a:normAutofit fontScale="92500" lnSpcReduction="10000"/>
+            <a:normAutofit lnSpcReduction="10000"/>
           </a:bodyPr>
           <a:lstStyle/>
           <a:p>

</xml_diff>